<commit_message>
Updated and exported diversity metrics figure
</commit_message>
<xml_diff>
--- a/Figures/Figure1_full.pptx
+++ b/Figures/Figure1_full.pptx
@@ -197,7 +197,7 @@
           <a:p>
             <a:fld id="{B81506D6-8878-0945-9216-E4F5AFA6BC99}" type="datetimeFigureOut">
               <a:rPr lang="en-US" smtClean="0"/>
-              <a:t>2/6/20</a:t>
+              <a:t>4/16/21</a:t>
             </a:fld>
             <a:endParaRPr lang="en-US"/>
           </a:p>
@@ -679,7 +679,7 @@
           <a:p>
             <a:fld id="{B5B0AC65-3CE8-4749-B0D7-AFCFDEE36239}" type="datetimeFigureOut">
               <a:rPr lang="en-US" smtClean="0"/>
-              <a:t>2/6/20</a:t>
+              <a:t>4/16/21</a:t>
             </a:fld>
             <a:endParaRPr lang="en-US"/>
           </a:p>
@@ -849,7 +849,7 @@
           <a:p>
             <a:fld id="{B5B0AC65-3CE8-4749-B0D7-AFCFDEE36239}" type="datetimeFigureOut">
               <a:rPr lang="en-US" smtClean="0"/>
-              <a:t>2/6/20</a:t>
+              <a:t>4/16/21</a:t>
             </a:fld>
             <a:endParaRPr lang="en-US"/>
           </a:p>
@@ -1029,7 +1029,7 @@
           <a:p>
             <a:fld id="{B5B0AC65-3CE8-4749-B0D7-AFCFDEE36239}" type="datetimeFigureOut">
               <a:rPr lang="en-US" smtClean="0"/>
-              <a:t>2/6/20</a:t>
+              <a:t>4/16/21</a:t>
             </a:fld>
             <a:endParaRPr lang="en-US"/>
           </a:p>
@@ -1199,7 +1199,7 @@
           <a:p>
             <a:fld id="{B5B0AC65-3CE8-4749-B0D7-AFCFDEE36239}" type="datetimeFigureOut">
               <a:rPr lang="en-US" smtClean="0"/>
-              <a:t>2/6/20</a:t>
+              <a:t>4/16/21</a:t>
             </a:fld>
             <a:endParaRPr lang="en-US"/>
           </a:p>
@@ -1445,7 +1445,7 @@
           <a:p>
             <a:fld id="{B5B0AC65-3CE8-4749-B0D7-AFCFDEE36239}" type="datetimeFigureOut">
               <a:rPr lang="en-US" smtClean="0"/>
-              <a:t>2/6/20</a:t>
+              <a:t>4/16/21</a:t>
             </a:fld>
             <a:endParaRPr lang="en-US"/>
           </a:p>
@@ -1677,7 +1677,7 @@
           <a:p>
             <a:fld id="{B5B0AC65-3CE8-4749-B0D7-AFCFDEE36239}" type="datetimeFigureOut">
               <a:rPr lang="en-US" smtClean="0"/>
-              <a:t>2/6/20</a:t>
+              <a:t>4/16/21</a:t>
             </a:fld>
             <a:endParaRPr lang="en-US"/>
           </a:p>
@@ -2044,7 +2044,7 @@
           <a:p>
             <a:fld id="{B5B0AC65-3CE8-4749-B0D7-AFCFDEE36239}" type="datetimeFigureOut">
               <a:rPr lang="en-US" smtClean="0"/>
-              <a:t>2/6/20</a:t>
+              <a:t>4/16/21</a:t>
             </a:fld>
             <a:endParaRPr lang="en-US"/>
           </a:p>
@@ -2162,7 +2162,7 @@
           <a:p>
             <a:fld id="{B5B0AC65-3CE8-4749-B0D7-AFCFDEE36239}" type="datetimeFigureOut">
               <a:rPr lang="en-US" smtClean="0"/>
-              <a:t>2/6/20</a:t>
+              <a:t>4/16/21</a:t>
             </a:fld>
             <a:endParaRPr lang="en-US"/>
           </a:p>
@@ -2257,7 +2257,7 @@
           <a:p>
             <a:fld id="{B5B0AC65-3CE8-4749-B0D7-AFCFDEE36239}" type="datetimeFigureOut">
               <a:rPr lang="en-US" smtClean="0"/>
-              <a:t>2/6/20</a:t>
+              <a:t>4/16/21</a:t>
             </a:fld>
             <a:endParaRPr lang="en-US"/>
           </a:p>
@@ -2534,7 +2534,7 @@
           <a:p>
             <a:fld id="{B5B0AC65-3CE8-4749-B0D7-AFCFDEE36239}" type="datetimeFigureOut">
               <a:rPr lang="en-US" smtClean="0"/>
-              <a:t>2/6/20</a:t>
+              <a:t>4/16/21</a:t>
             </a:fld>
             <a:endParaRPr lang="en-US"/>
           </a:p>
@@ -2791,7 +2791,7 @@
           <a:p>
             <a:fld id="{B5B0AC65-3CE8-4749-B0D7-AFCFDEE36239}" type="datetimeFigureOut">
               <a:rPr lang="en-US" smtClean="0"/>
-              <a:t>2/6/20</a:t>
+              <a:t>4/16/21</a:t>
             </a:fld>
             <a:endParaRPr lang="en-US"/>
           </a:p>
@@ -3004,7 +3004,7 @@
           <a:p>
             <a:fld id="{B5B0AC65-3CE8-4749-B0D7-AFCFDEE36239}" type="datetimeFigureOut">
               <a:rPr lang="en-US" smtClean="0"/>
-              <a:t>2/6/20</a:t>
+              <a:t>4/16/21</a:t>
             </a:fld>
             <a:endParaRPr lang="en-US"/>
           </a:p>
@@ -3565,7 +3565,7 @@
         </p:nvSpPr>
         <p:spPr>
           <a:xfrm>
-            <a:off x="3835953" y="-1045"/>
+            <a:off x="3826415" y="433927"/>
             <a:ext cx="327334" cy="369332"/>
           </a:xfrm>
           <a:prstGeom prst="rect">
@@ -3582,41 +3582,6 @@
             <a:r>
               <a:rPr lang="en-US" dirty="0"/>
               <a:t>D</a:t>
-            </a:r>
-          </a:p>
-        </p:txBody>
-      </p:sp>
-      <p:sp>
-        <p:nvSpPr>
-          <p:cNvPr id="26" name="TextBox 25">
-            <a:extLst>
-              <a:ext uri="{FF2B5EF4-FFF2-40B4-BE49-F238E27FC236}">
-                <a16:creationId xmlns:a16="http://schemas.microsoft.com/office/drawing/2014/main" id="{431FFD38-83F0-954D-913D-2E5F11215EE3}"/>
-              </a:ext>
-            </a:extLst>
-          </p:cNvPr>
-          <p:cNvSpPr txBox="1"/>
-          <p:nvPr/>
-        </p:nvSpPr>
-        <p:spPr>
-          <a:xfrm>
-            <a:off x="3851182" y="584298"/>
-            <a:ext cx="296876" cy="369332"/>
-          </a:xfrm>
-          <a:prstGeom prst="rect">
-            <a:avLst/>
-          </a:prstGeom>
-          <a:noFill/>
-        </p:spPr>
-        <p:txBody>
-          <a:bodyPr wrap="none" rtlCol="0">
-            <a:spAutoFit/>
-          </a:bodyPr>
-          <a:lstStyle/>
-          <a:p>
-            <a:r>
-              <a:rPr lang="en-US" dirty="0"/>
-              <a:t>E</a:t>
             </a:r>
           </a:p>
         </p:txBody>
@@ -3635,7 +3600,7 @@
         </p:nvSpPr>
         <p:spPr>
           <a:xfrm>
-            <a:off x="3851182" y="1571738"/>
+            <a:off x="3816304" y="1183169"/>
             <a:ext cx="296876" cy="369332"/>
           </a:xfrm>
           <a:prstGeom prst="rect">
@@ -3651,552 +3616,8 @@
           <a:p>
             <a:r>
               <a:rPr lang="en-US" dirty="0"/>
-              <a:t>F</a:t>
+              <a:t>E</a:t>
             </a:r>
-          </a:p>
-        </p:txBody>
-      </p:sp>
-      <p:sp>
-        <p:nvSpPr>
-          <p:cNvPr id="63" name="Rectangle 62">
-            <a:extLst>
-              <a:ext uri="{FF2B5EF4-FFF2-40B4-BE49-F238E27FC236}">
-                <a16:creationId xmlns:a16="http://schemas.microsoft.com/office/drawing/2014/main" id="{45A760C9-10C1-3D4A-AD3D-D443847FB264}"/>
-              </a:ext>
-            </a:extLst>
-          </p:cNvPr>
-          <p:cNvSpPr/>
-          <p:nvPr/>
-        </p:nvSpPr>
-        <p:spPr>
-          <a:xfrm>
-            <a:off x="4328755" y="693034"/>
-            <a:ext cx="494106" cy="376397"/>
-          </a:xfrm>
-          <a:prstGeom prst="rect">
-            <a:avLst/>
-          </a:prstGeom>
-          <a:solidFill>
-            <a:schemeClr val="bg1"/>
-          </a:solidFill>
-          <a:ln>
-            <a:solidFill>
-              <a:schemeClr val="tx1"/>
-            </a:solidFill>
-          </a:ln>
-        </p:spPr>
-        <p:style>
-          <a:lnRef idx="2">
-            <a:schemeClr val="accent1">
-              <a:shade val="50000"/>
-            </a:schemeClr>
-          </a:lnRef>
-          <a:fillRef idx="1">
-            <a:schemeClr val="accent1"/>
-          </a:fillRef>
-          <a:effectRef idx="0">
-            <a:schemeClr val="accent1"/>
-          </a:effectRef>
-          <a:fontRef idx="minor">
-            <a:schemeClr val="lt1"/>
-          </a:fontRef>
-        </p:style>
-        <p:txBody>
-          <a:bodyPr rtlCol="0" anchor="ctr"/>
-          <a:lstStyle/>
-          <a:p>
-            <a:pPr algn="ctr"/>
-            <a:endParaRPr lang="en-US">
-              <a:latin typeface="Avenir Book" panose="02000503020000020003" pitchFamily="2" charset="0"/>
-            </a:endParaRPr>
-          </a:p>
-        </p:txBody>
-      </p:sp>
-      <p:sp>
-        <p:nvSpPr>
-          <p:cNvPr id="102" name="Oval 101">
-            <a:extLst>
-              <a:ext uri="{FF2B5EF4-FFF2-40B4-BE49-F238E27FC236}">
-                <a16:creationId xmlns:a16="http://schemas.microsoft.com/office/drawing/2014/main" id="{336197FA-4211-1F4E-8A57-23B3E0B27298}"/>
-              </a:ext>
-            </a:extLst>
-          </p:cNvPr>
-          <p:cNvSpPr/>
-          <p:nvPr/>
-        </p:nvSpPr>
-        <p:spPr>
-          <a:xfrm>
-            <a:off x="4426280" y="735390"/>
-            <a:ext cx="130591" cy="130591"/>
-          </a:xfrm>
-          <a:prstGeom prst="ellipse">
-            <a:avLst/>
-          </a:prstGeom>
-          <a:solidFill>
-            <a:srgbClr val="7F7F7F"/>
-          </a:solidFill>
-          <a:ln>
-            <a:noFill/>
-          </a:ln>
-        </p:spPr>
-        <p:style>
-          <a:lnRef idx="2">
-            <a:schemeClr val="accent1">
-              <a:shade val="50000"/>
-            </a:schemeClr>
-          </a:lnRef>
-          <a:fillRef idx="1">
-            <a:schemeClr val="accent1"/>
-          </a:fillRef>
-          <a:effectRef idx="0">
-            <a:schemeClr val="accent1"/>
-          </a:effectRef>
-          <a:fontRef idx="minor">
-            <a:schemeClr val="lt1"/>
-          </a:fontRef>
-        </p:style>
-        <p:txBody>
-          <a:bodyPr rtlCol="0" anchor="ctr"/>
-          <a:lstStyle/>
-          <a:p>
-            <a:pPr algn="ctr"/>
-            <a:endParaRPr lang="en-US"/>
-          </a:p>
-        </p:txBody>
-      </p:sp>
-      <p:sp>
-        <p:nvSpPr>
-          <p:cNvPr id="103" name="Oval 102">
-            <a:extLst>
-              <a:ext uri="{FF2B5EF4-FFF2-40B4-BE49-F238E27FC236}">
-                <a16:creationId xmlns:a16="http://schemas.microsoft.com/office/drawing/2014/main" id="{8B1D63D5-481B-5545-B179-C5F0284F2A34}"/>
-              </a:ext>
-            </a:extLst>
-          </p:cNvPr>
-          <p:cNvSpPr/>
-          <p:nvPr/>
-        </p:nvSpPr>
-        <p:spPr>
-          <a:xfrm>
-            <a:off x="4599447" y="735391"/>
-            <a:ext cx="130591" cy="130591"/>
-          </a:xfrm>
-          <a:prstGeom prst="ellipse">
-            <a:avLst/>
-          </a:prstGeom>
-          <a:solidFill>
-            <a:srgbClr val="7F7F7F"/>
-          </a:solidFill>
-          <a:ln>
-            <a:noFill/>
-          </a:ln>
-        </p:spPr>
-        <p:style>
-          <a:lnRef idx="2">
-            <a:schemeClr val="accent1">
-              <a:shade val="50000"/>
-            </a:schemeClr>
-          </a:lnRef>
-          <a:fillRef idx="1">
-            <a:schemeClr val="accent1"/>
-          </a:fillRef>
-          <a:effectRef idx="0">
-            <a:schemeClr val="accent1"/>
-          </a:effectRef>
-          <a:fontRef idx="minor">
-            <a:schemeClr val="lt1"/>
-          </a:fontRef>
-        </p:style>
-        <p:txBody>
-          <a:bodyPr rtlCol="0" anchor="ctr"/>
-          <a:lstStyle/>
-          <a:p>
-            <a:pPr algn="ctr"/>
-            <a:endParaRPr lang="en-US"/>
-          </a:p>
-        </p:txBody>
-      </p:sp>
-      <p:sp>
-        <p:nvSpPr>
-          <p:cNvPr id="104" name="Oval 103">
-            <a:extLst>
-              <a:ext uri="{FF2B5EF4-FFF2-40B4-BE49-F238E27FC236}">
-                <a16:creationId xmlns:a16="http://schemas.microsoft.com/office/drawing/2014/main" id="{7F621E3B-84F5-4347-A90B-658CDC4BBFF9}"/>
-              </a:ext>
-            </a:extLst>
-          </p:cNvPr>
-          <p:cNvSpPr/>
-          <p:nvPr/>
-        </p:nvSpPr>
-        <p:spPr>
-          <a:xfrm>
-            <a:off x="4599448" y="894273"/>
-            <a:ext cx="130591" cy="130591"/>
-          </a:xfrm>
-          <a:prstGeom prst="ellipse">
-            <a:avLst/>
-          </a:prstGeom>
-          <a:solidFill>
-            <a:srgbClr val="7F7F7F"/>
-          </a:solidFill>
-          <a:ln>
-            <a:noFill/>
-          </a:ln>
-        </p:spPr>
-        <p:style>
-          <a:lnRef idx="2">
-            <a:schemeClr val="accent1">
-              <a:shade val="50000"/>
-            </a:schemeClr>
-          </a:lnRef>
-          <a:fillRef idx="1">
-            <a:schemeClr val="accent1"/>
-          </a:fillRef>
-          <a:effectRef idx="0">
-            <a:schemeClr val="accent1"/>
-          </a:effectRef>
-          <a:fontRef idx="minor">
-            <a:schemeClr val="lt1"/>
-          </a:fontRef>
-        </p:style>
-        <p:txBody>
-          <a:bodyPr rtlCol="0" anchor="ctr"/>
-          <a:lstStyle/>
-          <a:p>
-            <a:pPr algn="ctr"/>
-            <a:endParaRPr lang="en-US"/>
-          </a:p>
-        </p:txBody>
-      </p:sp>
-      <p:sp>
-        <p:nvSpPr>
-          <p:cNvPr id="105" name="Oval 104">
-            <a:extLst>
-              <a:ext uri="{FF2B5EF4-FFF2-40B4-BE49-F238E27FC236}">
-                <a16:creationId xmlns:a16="http://schemas.microsoft.com/office/drawing/2014/main" id="{9AE3619A-BB7F-9C47-BC70-224926C274A5}"/>
-              </a:ext>
-            </a:extLst>
-          </p:cNvPr>
-          <p:cNvSpPr/>
-          <p:nvPr/>
-        </p:nvSpPr>
-        <p:spPr>
-          <a:xfrm>
-            <a:off x="4427535" y="894271"/>
-            <a:ext cx="130591" cy="130591"/>
-          </a:xfrm>
-          <a:prstGeom prst="ellipse">
-            <a:avLst/>
-          </a:prstGeom>
-          <a:solidFill>
-            <a:srgbClr val="7F7F7F"/>
-          </a:solidFill>
-          <a:ln>
-            <a:noFill/>
-          </a:ln>
-        </p:spPr>
-        <p:style>
-          <a:lnRef idx="2">
-            <a:schemeClr val="accent1">
-              <a:shade val="50000"/>
-            </a:schemeClr>
-          </a:lnRef>
-          <a:fillRef idx="1">
-            <a:schemeClr val="accent1"/>
-          </a:fillRef>
-          <a:effectRef idx="0">
-            <a:schemeClr val="accent1"/>
-          </a:effectRef>
-          <a:fontRef idx="minor">
-            <a:schemeClr val="lt1"/>
-          </a:fontRef>
-        </p:style>
-        <p:txBody>
-          <a:bodyPr rtlCol="0" anchor="ctr"/>
-          <a:lstStyle/>
-          <a:p>
-            <a:pPr algn="ctr"/>
-            <a:endParaRPr lang="en-US"/>
-          </a:p>
-        </p:txBody>
-      </p:sp>
-      <p:sp>
-        <p:nvSpPr>
-          <p:cNvPr id="106" name="Rectangle 105">
-            <a:extLst>
-              <a:ext uri="{FF2B5EF4-FFF2-40B4-BE49-F238E27FC236}">
-                <a16:creationId xmlns:a16="http://schemas.microsoft.com/office/drawing/2014/main" id="{EF9EA4EC-207A-1B4E-B537-BBBDB339AC82}"/>
-              </a:ext>
-            </a:extLst>
-          </p:cNvPr>
-          <p:cNvSpPr/>
-          <p:nvPr/>
-        </p:nvSpPr>
-        <p:spPr>
-          <a:xfrm>
-            <a:off x="4874823" y="693034"/>
-            <a:ext cx="494106" cy="376397"/>
-          </a:xfrm>
-          <a:prstGeom prst="rect">
-            <a:avLst/>
-          </a:prstGeom>
-          <a:solidFill>
-            <a:schemeClr val="bg1"/>
-          </a:solidFill>
-          <a:ln>
-            <a:solidFill>
-              <a:schemeClr val="tx1"/>
-            </a:solidFill>
-          </a:ln>
-        </p:spPr>
-        <p:style>
-          <a:lnRef idx="2">
-            <a:schemeClr val="accent1">
-              <a:shade val="50000"/>
-            </a:schemeClr>
-          </a:lnRef>
-          <a:fillRef idx="1">
-            <a:schemeClr val="accent1"/>
-          </a:fillRef>
-          <a:effectRef idx="0">
-            <a:schemeClr val="accent1"/>
-          </a:effectRef>
-          <a:fontRef idx="minor">
-            <a:schemeClr val="lt1"/>
-          </a:fontRef>
-        </p:style>
-        <p:txBody>
-          <a:bodyPr rtlCol="0" anchor="ctr"/>
-          <a:lstStyle/>
-          <a:p>
-            <a:pPr algn="ctr"/>
-            <a:endParaRPr lang="en-US">
-              <a:latin typeface="Avenir Book" panose="02000503020000020003" pitchFamily="2" charset="0"/>
-            </a:endParaRPr>
-          </a:p>
-        </p:txBody>
-      </p:sp>
-      <p:sp>
-        <p:nvSpPr>
-          <p:cNvPr id="111" name="Rectangle 110">
-            <a:extLst>
-              <a:ext uri="{FF2B5EF4-FFF2-40B4-BE49-F238E27FC236}">
-                <a16:creationId xmlns:a16="http://schemas.microsoft.com/office/drawing/2014/main" id="{16A29677-4E6C-E74E-9F6F-2CD18FCCD0EA}"/>
-              </a:ext>
-            </a:extLst>
-          </p:cNvPr>
-          <p:cNvSpPr/>
-          <p:nvPr/>
-        </p:nvSpPr>
-        <p:spPr>
-          <a:xfrm>
-            <a:off x="4874823" y="1108613"/>
-            <a:ext cx="494106" cy="376397"/>
-          </a:xfrm>
-          <a:prstGeom prst="rect">
-            <a:avLst/>
-          </a:prstGeom>
-          <a:solidFill>
-            <a:schemeClr val="bg1"/>
-          </a:solidFill>
-          <a:ln>
-            <a:solidFill>
-              <a:schemeClr val="tx1"/>
-            </a:solidFill>
-          </a:ln>
-        </p:spPr>
-        <p:style>
-          <a:lnRef idx="2">
-            <a:schemeClr val="accent1">
-              <a:shade val="50000"/>
-            </a:schemeClr>
-          </a:lnRef>
-          <a:fillRef idx="1">
-            <a:schemeClr val="accent1"/>
-          </a:fillRef>
-          <a:effectRef idx="0">
-            <a:schemeClr val="accent1"/>
-          </a:effectRef>
-          <a:fontRef idx="minor">
-            <a:schemeClr val="lt1"/>
-          </a:fontRef>
-        </p:style>
-        <p:txBody>
-          <a:bodyPr rtlCol="0" anchor="ctr"/>
-          <a:lstStyle/>
-          <a:p>
-            <a:pPr algn="ctr"/>
-            <a:endParaRPr lang="en-US">
-              <a:latin typeface="Avenir Book" panose="02000503020000020003" pitchFamily="2" charset="0"/>
-            </a:endParaRPr>
-          </a:p>
-        </p:txBody>
-      </p:sp>
-      <p:sp>
-        <p:nvSpPr>
-          <p:cNvPr id="116" name="Rectangle 115">
-            <a:extLst>
-              <a:ext uri="{FF2B5EF4-FFF2-40B4-BE49-F238E27FC236}">
-                <a16:creationId xmlns:a16="http://schemas.microsoft.com/office/drawing/2014/main" id="{58ECA641-16D4-CA47-8B1E-F88A58656E35}"/>
-              </a:ext>
-            </a:extLst>
-          </p:cNvPr>
-          <p:cNvSpPr/>
-          <p:nvPr/>
-        </p:nvSpPr>
-        <p:spPr>
-          <a:xfrm>
-            <a:off x="4323966" y="1108613"/>
-            <a:ext cx="494106" cy="376397"/>
-          </a:xfrm>
-          <a:prstGeom prst="rect">
-            <a:avLst/>
-          </a:prstGeom>
-          <a:solidFill>
-            <a:schemeClr val="bg1"/>
-          </a:solidFill>
-          <a:ln>
-            <a:solidFill>
-              <a:schemeClr val="tx1"/>
-            </a:solidFill>
-          </a:ln>
-        </p:spPr>
-        <p:style>
-          <a:lnRef idx="2">
-            <a:schemeClr val="accent1">
-              <a:shade val="50000"/>
-            </a:schemeClr>
-          </a:lnRef>
-          <a:fillRef idx="1">
-            <a:schemeClr val="accent1"/>
-          </a:fillRef>
-          <a:effectRef idx="0">
-            <a:schemeClr val="accent1"/>
-          </a:effectRef>
-          <a:fontRef idx="minor">
-            <a:schemeClr val="lt1"/>
-          </a:fontRef>
-        </p:style>
-        <p:txBody>
-          <a:bodyPr rtlCol="0" anchor="ctr"/>
-          <a:lstStyle/>
-          <a:p>
-            <a:pPr algn="ctr"/>
-            <a:endParaRPr lang="en-US">
-              <a:latin typeface="Avenir Book" panose="02000503020000020003" pitchFamily="2" charset="0"/>
-            </a:endParaRPr>
-          </a:p>
-        </p:txBody>
-      </p:sp>
-      <p:sp>
-        <p:nvSpPr>
-          <p:cNvPr id="121" name="Rectangle 120">
-            <a:extLst>
-              <a:ext uri="{FF2B5EF4-FFF2-40B4-BE49-F238E27FC236}">
-                <a16:creationId xmlns:a16="http://schemas.microsoft.com/office/drawing/2014/main" id="{A0234D82-B057-9848-942D-D8C55687F9FA}"/>
-              </a:ext>
-            </a:extLst>
-          </p:cNvPr>
-          <p:cNvSpPr/>
-          <p:nvPr/>
-        </p:nvSpPr>
-        <p:spPr>
-          <a:xfrm>
-            <a:off x="5420693" y="693034"/>
-            <a:ext cx="494106" cy="376397"/>
-          </a:xfrm>
-          <a:prstGeom prst="rect">
-            <a:avLst/>
-          </a:prstGeom>
-          <a:solidFill>
-            <a:schemeClr val="bg1"/>
-          </a:solidFill>
-          <a:ln>
-            <a:solidFill>
-              <a:schemeClr val="tx1"/>
-            </a:solidFill>
-          </a:ln>
-        </p:spPr>
-        <p:style>
-          <a:lnRef idx="2">
-            <a:schemeClr val="accent1">
-              <a:shade val="50000"/>
-            </a:schemeClr>
-          </a:lnRef>
-          <a:fillRef idx="1">
-            <a:schemeClr val="accent1"/>
-          </a:fillRef>
-          <a:effectRef idx="0">
-            <a:schemeClr val="accent1"/>
-          </a:effectRef>
-          <a:fontRef idx="minor">
-            <a:schemeClr val="lt1"/>
-          </a:fontRef>
-        </p:style>
-        <p:txBody>
-          <a:bodyPr rtlCol="0" anchor="ctr"/>
-          <a:lstStyle/>
-          <a:p>
-            <a:pPr algn="ctr"/>
-            <a:endParaRPr lang="en-US">
-              <a:latin typeface="Avenir Book" panose="02000503020000020003" pitchFamily="2" charset="0"/>
-            </a:endParaRPr>
-          </a:p>
-        </p:txBody>
-      </p:sp>
-      <p:sp>
-        <p:nvSpPr>
-          <p:cNvPr id="126" name="Rectangle 125">
-            <a:extLst>
-              <a:ext uri="{FF2B5EF4-FFF2-40B4-BE49-F238E27FC236}">
-                <a16:creationId xmlns:a16="http://schemas.microsoft.com/office/drawing/2014/main" id="{BA6A346A-C97E-884E-9712-7D8DDF54E041}"/>
-              </a:ext>
-            </a:extLst>
-          </p:cNvPr>
-          <p:cNvSpPr/>
-          <p:nvPr/>
-        </p:nvSpPr>
-        <p:spPr>
-          <a:xfrm>
-            <a:off x="5420693" y="1108613"/>
-            <a:ext cx="494106" cy="376397"/>
-          </a:xfrm>
-          <a:prstGeom prst="rect">
-            <a:avLst/>
-          </a:prstGeom>
-          <a:solidFill>
-            <a:schemeClr val="bg1"/>
-          </a:solidFill>
-          <a:ln>
-            <a:solidFill>
-              <a:schemeClr val="tx1"/>
-            </a:solidFill>
-          </a:ln>
-        </p:spPr>
-        <p:style>
-          <a:lnRef idx="2">
-            <a:schemeClr val="accent1">
-              <a:shade val="50000"/>
-            </a:schemeClr>
-          </a:lnRef>
-          <a:fillRef idx="1">
-            <a:schemeClr val="accent1"/>
-          </a:fillRef>
-          <a:effectRef idx="0">
-            <a:schemeClr val="accent1"/>
-          </a:effectRef>
-          <a:fontRef idx="minor">
-            <a:schemeClr val="lt1"/>
-          </a:fontRef>
-        </p:style>
-        <p:txBody>
-          <a:bodyPr rtlCol="0" anchor="ctr"/>
-          <a:lstStyle/>
-          <a:p>
-            <a:pPr algn="ctr"/>
-            <a:endParaRPr lang="en-US">
-              <a:latin typeface="Avenir Book" panose="02000503020000020003" pitchFamily="2" charset="0"/>
-            </a:endParaRPr>
           </a:p>
         </p:txBody>
       </p:sp>
@@ -4214,7 +3635,7 @@
         </p:nvSpPr>
         <p:spPr>
           <a:xfrm>
-            <a:off x="4089249" y="1683461"/>
+            <a:off x="4090647" y="1285075"/>
             <a:ext cx="346605" cy="798873"/>
           </a:xfrm>
           <a:prstGeom prst="rect">
@@ -4270,7 +3691,7 @@
         </p:nvSpPr>
         <p:spPr>
           <a:xfrm>
-            <a:off x="4139241" y="1720808"/>
+            <a:off x="4140639" y="1322422"/>
             <a:ext cx="90826" cy="90826"/>
           </a:xfrm>
           <a:prstGeom prst="rect">
@@ -4322,7 +3743,7 @@
         </p:nvSpPr>
         <p:spPr>
           <a:xfrm>
-            <a:off x="4297090" y="1720808"/>
+            <a:off x="4298488" y="1322422"/>
             <a:ext cx="90826" cy="90826"/>
           </a:xfrm>
           <a:prstGeom prst="rect">
@@ -4371,7 +3792,7 @@
         </p:nvSpPr>
         <p:spPr>
           <a:xfrm>
-            <a:off x="4139241" y="1881152"/>
+            <a:off x="4140639" y="1482766"/>
             <a:ext cx="90826" cy="90826"/>
           </a:xfrm>
           <a:prstGeom prst="rect">
@@ -4423,7 +3844,7 @@
         </p:nvSpPr>
         <p:spPr>
           <a:xfrm>
-            <a:off x="4297090" y="1881152"/>
+            <a:off x="4298488" y="1482766"/>
             <a:ext cx="90826" cy="90826"/>
           </a:xfrm>
           <a:prstGeom prst="rect">
@@ -4475,7 +3896,7 @@
         </p:nvSpPr>
         <p:spPr>
           <a:xfrm>
-            <a:off x="4139241" y="2041496"/>
+            <a:off x="4140639" y="1643110"/>
             <a:ext cx="90826" cy="90826"/>
           </a:xfrm>
           <a:prstGeom prst="rect">
@@ -4527,7 +3948,7 @@
         </p:nvSpPr>
         <p:spPr>
           <a:xfrm>
-            <a:off x="4297090" y="2041496"/>
+            <a:off x="4298488" y="1643110"/>
             <a:ext cx="90826" cy="90826"/>
           </a:xfrm>
           <a:prstGeom prst="rect">
@@ -4579,7 +4000,7 @@
         </p:nvSpPr>
         <p:spPr>
           <a:xfrm>
-            <a:off x="4139241" y="2201840"/>
+            <a:off x="4140639" y="1803454"/>
             <a:ext cx="90826" cy="90826"/>
           </a:xfrm>
           <a:prstGeom prst="rect">
@@ -4634,7 +4055,7 @@
         </p:nvSpPr>
         <p:spPr>
           <a:xfrm>
-            <a:off x="4297090" y="2201840"/>
+            <a:off x="4298488" y="1803454"/>
             <a:ext cx="90826" cy="90826"/>
           </a:xfrm>
           <a:prstGeom prst="rect">
@@ -4689,7 +4110,7 @@
         </p:nvSpPr>
         <p:spPr>
           <a:xfrm>
-            <a:off x="4139241" y="2362185"/>
+            <a:off x="4140639" y="1963799"/>
             <a:ext cx="90826" cy="90826"/>
           </a:xfrm>
           <a:prstGeom prst="rect">
@@ -4744,7 +4165,7 @@
         </p:nvSpPr>
         <p:spPr>
           <a:xfrm>
-            <a:off x="4297090" y="2362185"/>
+            <a:off x="4298488" y="1963799"/>
             <a:ext cx="90826" cy="90826"/>
           </a:xfrm>
           <a:prstGeom prst="rect">
@@ -4796,7 +4217,7 @@
         </p:nvSpPr>
         <p:spPr>
           <a:xfrm>
-            <a:off x="4498384" y="1683461"/>
+            <a:off x="4499782" y="1285075"/>
             <a:ext cx="342753" cy="798873"/>
           </a:xfrm>
           <a:prstGeom prst="rect">
@@ -4852,7 +4273,7 @@
         </p:nvSpPr>
         <p:spPr>
           <a:xfrm>
-            <a:off x="4555288" y="1720808"/>
+            <a:off x="4556686" y="1322422"/>
             <a:ext cx="90826" cy="90826"/>
           </a:xfrm>
           <a:prstGeom prst="rect">
@@ -4904,7 +4325,7 @@
         </p:nvSpPr>
         <p:spPr>
           <a:xfrm>
-            <a:off x="4702977" y="1720808"/>
+            <a:off x="4704375" y="1322422"/>
             <a:ext cx="90826" cy="90826"/>
           </a:xfrm>
           <a:prstGeom prst="rect">
@@ -4956,7 +4377,7 @@
         </p:nvSpPr>
         <p:spPr>
           <a:xfrm>
-            <a:off x="4555288" y="1881152"/>
+            <a:off x="4556686" y="1482766"/>
             <a:ext cx="90826" cy="90826"/>
           </a:xfrm>
           <a:prstGeom prst="rect">
@@ -5008,7 +4429,7 @@
         </p:nvSpPr>
         <p:spPr>
           <a:xfrm>
-            <a:off x="4702977" y="1881152"/>
+            <a:off x="4704375" y="1482766"/>
             <a:ext cx="90826" cy="90826"/>
           </a:xfrm>
           <a:prstGeom prst="rect">
@@ -5060,7 +4481,7 @@
         </p:nvSpPr>
         <p:spPr>
           <a:xfrm>
-            <a:off x="4555288" y="2041496"/>
+            <a:off x="4556686" y="1643110"/>
             <a:ext cx="90826" cy="90826"/>
           </a:xfrm>
           <a:prstGeom prst="rect">
@@ -5112,7 +4533,7 @@
         </p:nvSpPr>
         <p:spPr>
           <a:xfrm>
-            <a:off x="4702977" y="2041496"/>
+            <a:off x="4704375" y="1643110"/>
             <a:ext cx="90826" cy="90826"/>
           </a:xfrm>
           <a:prstGeom prst="rect">
@@ -5164,7 +4585,7 @@
         </p:nvSpPr>
         <p:spPr>
           <a:xfrm>
-            <a:off x="4555288" y="2201840"/>
+            <a:off x="4556686" y="1803454"/>
             <a:ext cx="90826" cy="90826"/>
           </a:xfrm>
           <a:prstGeom prst="rect">
@@ -5216,7 +4637,7 @@
         </p:nvSpPr>
         <p:spPr>
           <a:xfrm>
-            <a:off x="4702977" y="2201840"/>
+            <a:off x="4704375" y="1803454"/>
             <a:ext cx="90826" cy="90826"/>
           </a:xfrm>
           <a:prstGeom prst="rect">
@@ -5268,7 +4689,7 @@
         </p:nvSpPr>
         <p:spPr>
           <a:xfrm>
-            <a:off x="4555288" y="2362185"/>
+            <a:off x="4556686" y="1963799"/>
             <a:ext cx="90826" cy="90826"/>
           </a:xfrm>
           <a:prstGeom prst="rect">
@@ -5320,7 +4741,7 @@
         </p:nvSpPr>
         <p:spPr>
           <a:xfrm>
-            <a:off x="4702977" y="2362185"/>
+            <a:off x="4704375" y="1963799"/>
             <a:ext cx="90826" cy="90826"/>
           </a:xfrm>
           <a:prstGeom prst="rect">
@@ -5372,7 +4793,7 @@
         </p:nvSpPr>
         <p:spPr>
           <a:xfrm>
-            <a:off x="4903667" y="1683461"/>
+            <a:off x="4905065" y="1285075"/>
             <a:ext cx="342753" cy="798873"/>
           </a:xfrm>
           <a:prstGeom prst="rect">
@@ -5428,7 +4849,7 @@
         </p:nvSpPr>
         <p:spPr>
           <a:xfrm>
-            <a:off x="4957323" y="1720808"/>
+            <a:off x="4958721" y="1322422"/>
             <a:ext cx="90826" cy="90826"/>
           </a:xfrm>
           <a:prstGeom prst="rect">
@@ -5480,7 +4901,7 @@
         </p:nvSpPr>
         <p:spPr>
           <a:xfrm>
-            <a:off x="5115172" y="1720808"/>
+            <a:off x="5116570" y="1322422"/>
             <a:ext cx="90826" cy="90826"/>
           </a:xfrm>
           <a:prstGeom prst="rect">
@@ -5532,7 +4953,7 @@
         </p:nvSpPr>
         <p:spPr>
           <a:xfrm>
-            <a:off x="4957323" y="1881152"/>
+            <a:off x="4958721" y="1482766"/>
             <a:ext cx="90826" cy="90826"/>
           </a:xfrm>
           <a:prstGeom prst="rect">
@@ -5584,7 +5005,7 @@
         </p:nvSpPr>
         <p:spPr>
           <a:xfrm>
-            <a:off x="5115172" y="1881152"/>
+            <a:off x="5116570" y="1482766"/>
             <a:ext cx="90826" cy="90826"/>
           </a:xfrm>
           <a:prstGeom prst="rect">
@@ -5636,7 +5057,7 @@
         </p:nvSpPr>
         <p:spPr>
           <a:xfrm>
-            <a:off x="4957323" y="2041496"/>
+            <a:off x="4958721" y="1643110"/>
             <a:ext cx="90826" cy="90826"/>
           </a:xfrm>
           <a:prstGeom prst="rect">
@@ -5688,7 +5109,7 @@
         </p:nvSpPr>
         <p:spPr>
           <a:xfrm>
-            <a:off x="5115172" y="2041496"/>
+            <a:off x="5116570" y="1643110"/>
             <a:ext cx="90826" cy="90826"/>
           </a:xfrm>
           <a:prstGeom prst="rect">
@@ -5740,7 +5161,7 @@
         </p:nvSpPr>
         <p:spPr>
           <a:xfrm>
-            <a:off x="4957323" y="2201840"/>
+            <a:off x="4958721" y="1803454"/>
             <a:ext cx="90826" cy="90826"/>
           </a:xfrm>
           <a:prstGeom prst="rect">
@@ -5792,7 +5213,7 @@
         </p:nvSpPr>
         <p:spPr>
           <a:xfrm>
-            <a:off x="5115172" y="2201840"/>
+            <a:off x="5116570" y="1803454"/>
             <a:ext cx="90826" cy="90826"/>
           </a:xfrm>
           <a:prstGeom prst="rect">
@@ -5844,7 +5265,7 @@
         </p:nvSpPr>
         <p:spPr>
           <a:xfrm>
-            <a:off x="4957323" y="2362185"/>
+            <a:off x="4958721" y="1963799"/>
             <a:ext cx="90826" cy="90826"/>
           </a:xfrm>
           <a:prstGeom prst="rect">
@@ -5896,7 +5317,7 @@
         </p:nvSpPr>
         <p:spPr>
           <a:xfrm>
-            <a:off x="5115172" y="2362185"/>
+            <a:off x="5116570" y="1963799"/>
             <a:ext cx="90826" cy="90826"/>
           </a:xfrm>
           <a:prstGeom prst="rect">
@@ -5948,7 +5369,7 @@
         </p:nvSpPr>
         <p:spPr>
           <a:xfrm>
-            <a:off x="5308950" y="1683461"/>
+            <a:off x="5310348" y="1285075"/>
             <a:ext cx="359390" cy="798873"/>
           </a:xfrm>
           <a:prstGeom prst="rect">
@@ -6004,7 +5425,7 @@
         </p:nvSpPr>
         <p:spPr>
           <a:xfrm>
-            <a:off x="5367017" y="1720808"/>
+            <a:off x="5368415" y="1322422"/>
             <a:ext cx="90826" cy="90826"/>
           </a:xfrm>
           <a:prstGeom prst="rect">
@@ -6056,7 +5477,7 @@
         </p:nvSpPr>
         <p:spPr>
           <a:xfrm>
-            <a:off x="5524866" y="1720808"/>
+            <a:off x="5526264" y="1322422"/>
             <a:ext cx="90826" cy="90826"/>
           </a:xfrm>
           <a:prstGeom prst="rect">
@@ -6108,7 +5529,7 @@
         </p:nvSpPr>
         <p:spPr>
           <a:xfrm>
-            <a:off x="5365713" y="1881152"/>
+            <a:off x="5367111" y="1482766"/>
             <a:ext cx="90826" cy="90826"/>
           </a:xfrm>
           <a:prstGeom prst="rect">
@@ -6160,7 +5581,7 @@
         </p:nvSpPr>
         <p:spPr>
           <a:xfrm>
-            <a:off x="5523562" y="1881152"/>
+            <a:off x="5524960" y="1482766"/>
             <a:ext cx="90826" cy="90826"/>
           </a:xfrm>
           <a:prstGeom prst="rect">
@@ -6212,7 +5633,7 @@
         </p:nvSpPr>
         <p:spPr>
           <a:xfrm>
-            <a:off x="5371620" y="2041496"/>
+            <a:off x="5373018" y="1643110"/>
             <a:ext cx="90826" cy="90826"/>
           </a:xfrm>
           <a:prstGeom prst="rect">
@@ -6264,7 +5685,7 @@
         </p:nvSpPr>
         <p:spPr>
           <a:xfrm>
-            <a:off x="5529469" y="2041496"/>
+            <a:off x="5530867" y="1643110"/>
             <a:ext cx="90826" cy="90826"/>
           </a:xfrm>
           <a:prstGeom prst="rect">
@@ -6316,7 +5737,7 @@
         </p:nvSpPr>
         <p:spPr>
           <a:xfrm>
-            <a:off x="5365713" y="2201840"/>
+            <a:off x="5367111" y="1803454"/>
             <a:ext cx="90826" cy="90826"/>
           </a:xfrm>
           <a:prstGeom prst="rect">
@@ -6368,7 +5789,7 @@
         </p:nvSpPr>
         <p:spPr>
           <a:xfrm>
-            <a:off x="5523562" y="2201840"/>
+            <a:off x="5524960" y="1803454"/>
             <a:ext cx="90826" cy="90826"/>
           </a:xfrm>
           <a:prstGeom prst="rect">
@@ -6420,7 +5841,7 @@
         </p:nvSpPr>
         <p:spPr>
           <a:xfrm>
-            <a:off x="5365713" y="2362185"/>
+            <a:off x="5367111" y="1963799"/>
             <a:ext cx="90826" cy="90826"/>
           </a:xfrm>
           <a:prstGeom prst="rect">
@@ -6472,7 +5893,7 @@
         </p:nvSpPr>
         <p:spPr>
           <a:xfrm>
-            <a:off x="5523562" y="2362185"/>
+            <a:off x="5524960" y="1963799"/>
             <a:ext cx="90826" cy="90826"/>
           </a:xfrm>
           <a:prstGeom prst="rect">
@@ -6524,7 +5945,7 @@
         </p:nvSpPr>
         <p:spPr>
           <a:xfrm>
-            <a:off x="5730869" y="1683461"/>
+            <a:off x="5732267" y="1285075"/>
             <a:ext cx="353585" cy="798873"/>
           </a:xfrm>
           <a:prstGeom prst="rect">
@@ -6580,7 +6001,7 @@
         </p:nvSpPr>
         <p:spPr>
           <a:xfrm>
-            <a:off x="5780861" y="1720808"/>
+            <a:off x="5782259" y="1322422"/>
             <a:ext cx="90826" cy="90826"/>
           </a:xfrm>
           <a:prstGeom prst="rect">
@@ -6635,7 +6056,7 @@
         </p:nvSpPr>
         <p:spPr>
           <a:xfrm>
-            <a:off x="5938710" y="1720808"/>
+            <a:off x="5940108" y="1322422"/>
             <a:ext cx="90826" cy="90826"/>
           </a:xfrm>
           <a:prstGeom prst="rect">
@@ -6690,7 +6111,7 @@
         </p:nvSpPr>
         <p:spPr>
           <a:xfrm>
-            <a:off x="5780861" y="1881152"/>
+            <a:off x="5782259" y="1482766"/>
             <a:ext cx="90826" cy="90826"/>
           </a:xfrm>
           <a:prstGeom prst="rect">
@@ -6745,7 +6166,7 @@
         </p:nvSpPr>
         <p:spPr>
           <a:xfrm>
-            <a:off x="5938710" y="1881152"/>
+            <a:off x="5940108" y="1482766"/>
             <a:ext cx="90826" cy="90826"/>
           </a:xfrm>
           <a:prstGeom prst="rect">
@@ -6800,7 +6221,7 @@
         </p:nvSpPr>
         <p:spPr>
           <a:xfrm>
-            <a:off x="5780861" y="2041496"/>
+            <a:off x="5782259" y="1643110"/>
             <a:ext cx="90826" cy="90826"/>
           </a:xfrm>
           <a:prstGeom prst="rect">
@@ -6855,7 +6276,7 @@
         </p:nvSpPr>
         <p:spPr>
           <a:xfrm>
-            <a:off x="5938710" y="2041496"/>
+            <a:off x="5940108" y="1643110"/>
             <a:ext cx="90826" cy="90826"/>
           </a:xfrm>
           <a:prstGeom prst="rect">
@@ -6910,7 +6331,7 @@
         </p:nvSpPr>
         <p:spPr>
           <a:xfrm>
-            <a:off x="5780861" y="2201840"/>
+            <a:off x="5782259" y="1803454"/>
             <a:ext cx="90826" cy="90826"/>
           </a:xfrm>
           <a:prstGeom prst="rect">
@@ -6965,7 +6386,7 @@
         </p:nvSpPr>
         <p:spPr>
           <a:xfrm>
-            <a:off x="5938710" y="2201840"/>
+            <a:off x="5940108" y="1803454"/>
             <a:ext cx="90826" cy="90826"/>
           </a:xfrm>
           <a:prstGeom prst="rect">
@@ -7020,7 +6441,7 @@
         </p:nvSpPr>
         <p:spPr>
           <a:xfrm>
-            <a:off x="5780861" y="2362185"/>
+            <a:off x="5782259" y="1963799"/>
             <a:ext cx="90826" cy="90826"/>
           </a:xfrm>
           <a:prstGeom prst="rect">
@@ -7075,7 +6496,7 @@
         </p:nvSpPr>
         <p:spPr>
           <a:xfrm>
-            <a:off x="5938710" y="2362185"/>
+            <a:off x="5940108" y="1963799"/>
             <a:ext cx="90826" cy="90826"/>
           </a:xfrm>
           <a:prstGeom prst="rect">
@@ -7130,7 +6551,7 @@
         </p:nvSpPr>
         <p:spPr>
           <a:xfrm>
-            <a:off x="6084454" y="1926565"/>
+            <a:off x="6085852" y="1528179"/>
             <a:ext cx="340158" cy="276999"/>
           </a:xfrm>
           <a:prstGeom prst="rect">
@@ -7165,7 +6586,7 @@
         </p:nvSpPr>
         <p:spPr>
           <a:xfrm>
-            <a:off x="4098787" y="104664"/>
+            <a:off x="4089249" y="539636"/>
             <a:ext cx="494106" cy="376397"/>
           </a:xfrm>
           <a:prstGeom prst="rect">
@@ -7221,7 +6642,7 @@
         </p:nvSpPr>
         <p:spPr>
           <a:xfrm rot="2562045">
-            <a:off x="4243753" y="189024"/>
+            <a:off x="4234215" y="623996"/>
             <a:ext cx="79505" cy="162622"/>
           </a:xfrm>
           <a:prstGeom prst="ellipse">
@@ -7273,7 +6694,7 @@
         </p:nvSpPr>
         <p:spPr>
           <a:xfrm>
-            <a:off x="4644855" y="104664"/>
+            <a:off x="4635317" y="539636"/>
             <a:ext cx="494106" cy="376397"/>
           </a:xfrm>
           <a:prstGeom prst="rect">
@@ -7329,7 +6750,7 @@
         </p:nvSpPr>
         <p:spPr>
           <a:xfrm>
-            <a:off x="5190725" y="104664"/>
+            <a:off x="5181187" y="539636"/>
             <a:ext cx="494106" cy="376397"/>
           </a:xfrm>
           <a:prstGeom prst="rect">
@@ -7385,7 +6806,7 @@
         </p:nvSpPr>
         <p:spPr>
           <a:xfrm>
-            <a:off x="5728266" y="104664"/>
+            <a:off x="5718728" y="539636"/>
             <a:ext cx="494106" cy="376397"/>
           </a:xfrm>
           <a:prstGeom prst="rect">
@@ -7510,7 +6931,7 @@
         </p:nvSpPr>
         <p:spPr>
           <a:xfrm rot="2562045">
-            <a:off x="4385655" y="146982"/>
+            <a:off x="4376117" y="581954"/>
             <a:ext cx="79505" cy="162622"/>
           </a:xfrm>
           <a:prstGeom prst="ellipse">
@@ -7562,7 +6983,7 @@
         </p:nvSpPr>
         <p:spPr>
           <a:xfrm rot="2562045">
-            <a:off x="4345448" y="281213"/>
+            <a:off x="4335910" y="716185"/>
             <a:ext cx="79505" cy="162622"/>
           </a:xfrm>
           <a:prstGeom prst="ellipse">
@@ -7614,7 +7035,7 @@
         </p:nvSpPr>
         <p:spPr>
           <a:xfrm rot="2562045">
-            <a:off x="4782138" y="195659"/>
+            <a:off x="4772600" y="630631"/>
             <a:ext cx="79505" cy="162622"/>
           </a:xfrm>
           <a:prstGeom prst="ellipse">
@@ -7666,7 +7087,7 @@
         </p:nvSpPr>
         <p:spPr>
           <a:xfrm rot="2562045">
-            <a:off x="4924040" y="153617"/>
+            <a:off x="4914502" y="588589"/>
             <a:ext cx="79505" cy="162622"/>
           </a:xfrm>
           <a:prstGeom prst="ellipse">
@@ -7718,7 +7139,7 @@
         </p:nvSpPr>
         <p:spPr>
           <a:xfrm rot="2562045">
-            <a:off x="4883833" y="287848"/>
+            <a:off x="4874295" y="722820"/>
             <a:ext cx="79505" cy="162622"/>
           </a:xfrm>
           <a:prstGeom prst="ellipse">
@@ -7770,7 +7191,7 @@
         </p:nvSpPr>
         <p:spPr>
           <a:xfrm rot="2562045">
-            <a:off x="5314417" y="195660"/>
+            <a:off x="5304879" y="630632"/>
             <a:ext cx="79505" cy="162622"/>
           </a:xfrm>
           <a:prstGeom prst="ellipse">
@@ -7822,7 +7243,7 @@
         </p:nvSpPr>
         <p:spPr>
           <a:xfrm rot="2562045">
-            <a:off x="5456319" y="153618"/>
+            <a:off x="5446781" y="588590"/>
             <a:ext cx="79505" cy="162622"/>
           </a:xfrm>
           <a:prstGeom prst="ellipse">
@@ -7874,7 +7295,7 @@
         </p:nvSpPr>
         <p:spPr>
           <a:xfrm rot="2562045">
-            <a:off x="5416112" y="287849"/>
+            <a:off x="5406574" y="722821"/>
             <a:ext cx="79505" cy="162622"/>
           </a:xfrm>
           <a:prstGeom prst="ellipse">
@@ -7926,7 +7347,7 @@
         </p:nvSpPr>
         <p:spPr>
           <a:xfrm rot="2562045">
-            <a:off x="5841412" y="197963"/>
+            <a:off x="5831874" y="632935"/>
             <a:ext cx="79505" cy="162622"/>
           </a:xfrm>
           <a:prstGeom prst="ellipse">
@@ -7978,7 +7399,7 @@
         </p:nvSpPr>
         <p:spPr>
           <a:xfrm rot="2562045">
-            <a:off x="5983314" y="155921"/>
+            <a:off x="5973776" y="590893"/>
             <a:ext cx="79505" cy="162622"/>
           </a:xfrm>
           <a:prstGeom prst="ellipse">
@@ -8030,7 +7451,7 @@
         </p:nvSpPr>
         <p:spPr>
           <a:xfrm rot="2562045">
-            <a:off x="5943107" y="290152"/>
+            <a:off x="5933569" y="725124"/>
             <a:ext cx="79505" cy="162622"/>
           </a:xfrm>
           <a:prstGeom prst="ellipse">
@@ -8038,734 +7459,6 @@
           </a:prstGeom>
           <a:solidFill>
             <a:srgbClr val="F8C219"/>
-          </a:solidFill>
-          <a:ln>
-            <a:noFill/>
-          </a:ln>
-        </p:spPr>
-        <p:style>
-          <a:lnRef idx="2">
-            <a:schemeClr val="accent1">
-              <a:shade val="50000"/>
-            </a:schemeClr>
-          </a:lnRef>
-          <a:fillRef idx="1">
-            <a:schemeClr val="accent1"/>
-          </a:fillRef>
-          <a:effectRef idx="0">
-            <a:schemeClr val="accent1"/>
-          </a:effectRef>
-          <a:fontRef idx="minor">
-            <a:schemeClr val="lt1"/>
-          </a:fontRef>
-        </p:style>
-        <p:txBody>
-          <a:bodyPr rtlCol="0" anchor="ctr"/>
-          <a:lstStyle/>
-          <a:p>
-            <a:pPr algn="ctr"/>
-            <a:endParaRPr lang="en-US"/>
-          </a:p>
-        </p:txBody>
-      </p:sp>
-      <p:sp>
-        <p:nvSpPr>
-          <p:cNvPr id="201" name="Oval 200">
-            <a:extLst>
-              <a:ext uri="{FF2B5EF4-FFF2-40B4-BE49-F238E27FC236}">
-                <a16:creationId xmlns:a16="http://schemas.microsoft.com/office/drawing/2014/main" id="{E8BA85B8-42AB-E341-B1D4-41C6899B0494}"/>
-              </a:ext>
-            </a:extLst>
-          </p:cNvPr>
-          <p:cNvSpPr/>
-          <p:nvPr/>
-        </p:nvSpPr>
-        <p:spPr>
-          <a:xfrm>
-            <a:off x="4431463" y="1153110"/>
-            <a:ext cx="130591" cy="130591"/>
-          </a:xfrm>
-          <a:prstGeom prst="ellipse">
-            <a:avLst/>
-          </a:prstGeom>
-          <a:solidFill>
-            <a:srgbClr val="F8C219"/>
-          </a:solidFill>
-          <a:ln>
-            <a:noFill/>
-          </a:ln>
-        </p:spPr>
-        <p:style>
-          <a:lnRef idx="2">
-            <a:schemeClr val="accent1">
-              <a:shade val="50000"/>
-            </a:schemeClr>
-          </a:lnRef>
-          <a:fillRef idx="1">
-            <a:schemeClr val="accent1"/>
-          </a:fillRef>
-          <a:effectRef idx="0">
-            <a:schemeClr val="accent1"/>
-          </a:effectRef>
-          <a:fontRef idx="minor">
-            <a:schemeClr val="lt1"/>
-          </a:fontRef>
-        </p:style>
-        <p:txBody>
-          <a:bodyPr rtlCol="0" anchor="ctr"/>
-          <a:lstStyle/>
-          <a:p>
-            <a:pPr algn="ctr"/>
-            <a:endParaRPr lang="en-US"/>
-          </a:p>
-        </p:txBody>
-      </p:sp>
-      <p:sp>
-        <p:nvSpPr>
-          <p:cNvPr id="202" name="Oval 201">
-            <a:extLst>
-              <a:ext uri="{FF2B5EF4-FFF2-40B4-BE49-F238E27FC236}">
-                <a16:creationId xmlns:a16="http://schemas.microsoft.com/office/drawing/2014/main" id="{ABF116E9-E2F6-3545-9DBD-34FE71A7B142}"/>
-              </a:ext>
-            </a:extLst>
-          </p:cNvPr>
-          <p:cNvSpPr/>
-          <p:nvPr/>
-        </p:nvSpPr>
-        <p:spPr>
-          <a:xfrm>
-            <a:off x="4604630" y="1153111"/>
-            <a:ext cx="130591" cy="130591"/>
-          </a:xfrm>
-          <a:prstGeom prst="ellipse">
-            <a:avLst/>
-          </a:prstGeom>
-          <a:solidFill>
-            <a:srgbClr val="7124A0"/>
-          </a:solidFill>
-          <a:ln>
-            <a:noFill/>
-          </a:ln>
-        </p:spPr>
-        <p:style>
-          <a:lnRef idx="2">
-            <a:schemeClr val="accent1">
-              <a:shade val="50000"/>
-            </a:schemeClr>
-          </a:lnRef>
-          <a:fillRef idx="1">
-            <a:schemeClr val="accent1"/>
-          </a:fillRef>
-          <a:effectRef idx="0">
-            <a:schemeClr val="accent1"/>
-          </a:effectRef>
-          <a:fontRef idx="minor">
-            <a:schemeClr val="lt1"/>
-          </a:fontRef>
-        </p:style>
-        <p:txBody>
-          <a:bodyPr rtlCol="0" anchor="ctr"/>
-          <a:lstStyle/>
-          <a:p>
-            <a:pPr algn="ctr"/>
-            <a:endParaRPr lang="en-US"/>
-          </a:p>
-        </p:txBody>
-      </p:sp>
-      <p:sp>
-        <p:nvSpPr>
-          <p:cNvPr id="206" name="Oval 205">
-            <a:extLst>
-              <a:ext uri="{FF2B5EF4-FFF2-40B4-BE49-F238E27FC236}">
-                <a16:creationId xmlns:a16="http://schemas.microsoft.com/office/drawing/2014/main" id="{A31DBD2D-3BA2-504D-B41A-7E1B3D5CC58F}"/>
-              </a:ext>
-            </a:extLst>
-          </p:cNvPr>
-          <p:cNvSpPr/>
-          <p:nvPr/>
-        </p:nvSpPr>
-        <p:spPr>
-          <a:xfrm>
-            <a:off x="4604631" y="1311993"/>
-            <a:ext cx="130591" cy="130591"/>
-          </a:xfrm>
-          <a:prstGeom prst="ellipse">
-            <a:avLst/>
-          </a:prstGeom>
-          <a:solidFill>
-            <a:srgbClr val="E67E38"/>
-          </a:solidFill>
-          <a:ln>
-            <a:noFill/>
-          </a:ln>
-        </p:spPr>
-        <p:style>
-          <a:lnRef idx="2">
-            <a:schemeClr val="accent1">
-              <a:shade val="50000"/>
-            </a:schemeClr>
-          </a:lnRef>
-          <a:fillRef idx="1">
-            <a:schemeClr val="accent1"/>
-          </a:fillRef>
-          <a:effectRef idx="0">
-            <a:schemeClr val="accent1"/>
-          </a:effectRef>
-          <a:fontRef idx="minor">
-            <a:schemeClr val="lt1"/>
-          </a:fontRef>
-        </p:style>
-        <p:txBody>
-          <a:bodyPr rtlCol="0" anchor="ctr"/>
-          <a:lstStyle/>
-          <a:p>
-            <a:pPr algn="ctr"/>
-            <a:endParaRPr lang="en-US"/>
-          </a:p>
-        </p:txBody>
-      </p:sp>
-      <p:sp>
-        <p:nvSpPr>
-          <p:cNvPr id="207" name="Oval 206">
-            <a:extLst>
-              <a:ext uri="{FF2B5EF4-FFF2-40B4-BE49-F238E27FC236}">
-                <a16:creationId xmlns:a16="http://schemas.microsoft.com/office/drawing/2014/main" id="{B63538E7-FEB1-0C48-A7AE-B513C07C1D18}"/>
-              </a:ext>
-            </a:extLst>
-          </p:cNvPr>
-          <p:cNvSpPr/>
-          <p:nvPr/>
-        </p:nvSpPr>
-        <p:spPr>
-          <a:xfrm>
-            <a:off x="4432718" y="1311991"/>
-            <a:ext cx="130591" cy="130591"/>
-          </a:xfrm>
-          <a:prstGeom prst="ellipse">
-            <a:avLst/>
-          </a:prstGeom>
-          <a:solidFill>
-            <a:srgbClr val="7F7F7F"/>
-          </a:solidFill>
-          <a:ln>
-            <a:noFill/>
-          </a:ln>
-        </p:spPr>
-        <p:style>
-          <a:lnRef idx="2">
-            <a:schemeClr val="accent1">
-              <a:shade val="50000"/>
-            </a:schemeClr>
-          </a:lnRef>
-          <a:fillRef idx="1">
-            <a:schemeClr val="accent1"/>
-          </a:fillRef>
-          <a:effectRef idx="0">
-            <a:schemeClr val="accent1"/>
-          </a:effectRef>
-          <a:fontRef idx="minor">
-            <a:schemeClr val="lt1"/>
-          </a:fontRef>
-        </p:style>
-        <p:txBody>
-          <a:bodyPr rtlCol="0" anchor="ctr"/>
-          <a:lstStyle/>
-          <a:p>
-            <a:pPr algn="ctr"/>
-            <a:endParaRPr lang="en-US"/>
-          </a:p>
-        </p:txBody>
-      </p:sp>
-      <p:sp>
-        <p:nvSpPr>
-          <p:cNvPr id="208" name="Oval 207">
-            <a:extLst>
-              <a:ext uri="{FF2B5EF4-FFF2-40B4-BE49-F238E27FC236}">
-                <a16:creationId xmlns:a16="http://schemas.microsoft.com/office/drawing/2014/main" id="{8CD042AA-F309-1640-A3D5-EDA39160DC05}"/>
-              </a:ext>
-            </a:extLst>
-          </p:cNvPr>
-          <p:cNvSpPr/>
-          <p:nvPr/>
-        </p:nvSpPr>
-        <p:spPr>
-          <a:xfrm>
-            <a:off x="5051858" y="732995"/>
-            <a:ext cx="130591" cy="130591"/>
-          </a:xfrm>
-          <a:prstGeom prst="ellipse">
-            <a:avLst/>
-          </a:prstGeom>
-          <a:solidFill>
-            <a:srgbClr val="7030A0"/>
-          </a:solidFill>
-          <a:ln>
-            <a:noFill/>
-          </a:ln>
-        </p:spPr>
-        <p:style>
-          <a:lnRef idx="2">
-            <a:schemeClr val="accent1">
-              <a:shade val="50000"/>
-            </a:schemeClr>
-          </a:lnRef>
-          <a:fillRef idx="1">
-            <a:schemeClr val="accent1"/>
-          </a:fillRef>
-          <a:effectRef idx="0">
-            <a:schemeClr val="accent1"/>
-          </a:effectRef>
-          <a:fontRef idx="minor">
-            <a:schemeClr val="lt1"/>
-          </a:fontRef>
-        </p:style>
-        <p:txBody>
-          <a:bodyPr rtlCol="0" anchor="ctr"/>
-          <a:lstStyle/>
-          <a:p>
-            <a:pPr algn="ctr"/>
-            <a:endParaRPr lang="en-US"/>
-          </a:p>
-        </p:txBody>
-      </p:sp>
-      <p:sp>
-        <p:nvSpPr>
-          <p:cNvPr id="210" name="Oval 209">
-            <a:extLst>
-              <a:ext uri="{FF2B5EF4-FFF2-40B4-BE49-F238E27FC236}">
-                <a16:creationId xmlns:a16="http://schemas.microsoft.com/office/drawing/2014/main" id="{FF4D6D56-6085-D644-9F52-E4A6D622ACF3}"/>
-              </a:ext>
-            </a:extLst>
-          </p:cNvPr>
-          <p:cNvSpPr/>
-          <p:nvPr/>
-        </p:nvSpPr>
-        <p:spPr>
-          <a:xfrm>
-            <a:off x="5137750" y="893329"/>
-            <a:ext cx="130591" cy="130591"/>
-          </a:xfrm>
-          <a:prstGeom prst="ellipse">
-            <a:avLst/>
-          </a:prstGeom>
-          <a:solidFill>
-            <a:srgbClr val="7030A0"/>
-          </a:solidFill>
-          <a:ln>
-            <a:noFill/>
-          </a:ln>
-        </p:spPr>
-        <p:style>
-          <a:lnRef idx="2">
-            <a:schemeClr val="accent1">
-              <a:shade val="50000"/>
-            </a:schemeClr>
-          </a:lnRef>
-          <a:fillRef idx="1">
-            <a:schemeClr val="accent1"/>
-          </a:fillRef>
-          <a:effectRef idx="0">
-            <a:schemeClr val="accent1"/>
-          </a:effectRef>
-          <a:fontRef idx="minor">
-            <a:schemeClr val="lt1"/>
-          </a:fontRef>
-        </p:style>
-        <p:txBody>
-          <a:bodyPr rtlCol="0" anchor="ctr"/>
-          <a:lstStyle/>
-          <a:p>
-            <a:pPr algn="ctr"/>
-            <a:endParaRPr lang="en-US"/>
-          </a:p>
-        </p:txBody>
-      </p:sp>
-      <p:sp>
-        <p:nvSpPr>
-          <p:cNvPr id="211" name="Oval 210">
-            <a:extLst>
-              <a:ext uri="{FF2B5EF4-FFF2-40B4-BE49-F238E27FC236}">
-                <a16:creationId xmlns:a16="http://schemas.microsoft.com/office/drawing/2014/main" id="{A9F0E998-D6E8-D14C-9C60-5FB5BB424438}"/>
-              </a:ext>
-            </a:extLst>
-          </p:cNvPr>
-          <p:cNvSpPr/>
-          <p:nvPr/>
-        </p:nvSpPr>
-        <p:spPr>
-          <a:xfrm>
-            <a:off x="4965837" y="893327"/>
-            <a:ext cx="130591" cy="130591"/>
-          </a:xfrm>
-          <a:prstGeom prst="ellipse">
-            <a:avLst/>
-          </a:prstGeom>
-          <a:solidFill>
-            <a:srgbClr val="7030A0"/>
-          </a:solidFill>
-          <a:ln>
-            <a:noFill/>
-          </a:ln>
-        </p:spPr>
-        <p:style>
-          <a:lnRef idx="2">
-            <a:schemeClr val="accent1">
-              <a:shade val="50000"/>
-            </a:schemeClr>
-          </a:lnRef>
-          <a:fillRef idx="1">
-            <a:schemeClr val="accent1"/>
-          </a:fillRef>
-          <a:effectRef idx="0">
-            <a:schemeClr val="accent1"/>
-          </a:effectRef>
-          <a:fontRef idx="minor">
-            <a:schemeClr val="lt1"/>
-          </a:fontRef>
-        </p:style>
-        <p:txBody>
-          <a:bodyPr rtlCol="0" anchor="ctr"/>
-          <a:lstStyle/>
-          <a:p>
-            <a:pPr algn="ctr"/>
-            <a:endParaRPr lang="en-US"/>
-          </a:p>
-        </p:txBody>
-      </p:sp>
-      <p:sp>
-        <p:nvSpPr>
-          <p:cNvPr id="212" name="Oval 211">
-            <a:extLst>
-              <a:ext uri="{FF2B5EF4-FFF2-40B4-BE49-F238E27FC236}">
-                <a16:creationId xmlns:a16="http://schemas.microsoft.com/office/drawing/2014/main" id="{99A0FBA5-D9E6-0545-A2D1-3DA4C7A1D907}"/>
-              </a:ext>
-            </a:extLst>
-          </p:cNvPr>
-          <p:cNvSpPr/>
-          <p:nvPr/>
-        </p:nvSpPr>
-        <p:spPr>
-          <a:xfrm>
-            <a:off x="5053227" y="1147850"/>
-            <a:ext cx="130591" cy="130591"/>
-          </a:xfrm>
-          <a:prstGeom prst="ellipse">
-            <a:avLst/>
-          </a:prstGeom>
-          <a:solidFill>
-            <a:srgbClr val="7030A0"/>
-          </a:solidFill>
-          <a:ln>
-            <a:noFill/>
-          </a:ln>
-        </p:spPr>
-        <p:style>
-          <a:lnRef idx="2">
-            <a:schemeClr val="accent1">
-              <a:shade val="50000"/>
-            </a:schemeClr>
-          </a:lnRef>
-          <a:fillRef idx="1">
-            <a:schemeClr val="accent1"/>
-          </a:fillRef>
-          <a:effectRef idx="0">
-            <a:schemeClr val="accent1"/>
-          </a:effectRef>
-          <a:fontRef idx="minor">
-            <a:schemeClr val="lt1"/>
-          </a:fontRef>
-        </p:style>
-        <p:txBody>
-          <a:bodyPr rtlCol="0" anchor="ctr"/>
-          <a:lstStyle/>
-          <a:p>
-            <a:pPr algn="ctr"/>
-            <a:endParaRPr lang="en-US"/>
-          </a:p>
-        </p:txBody>
-      </p:sp>
-      <p:sp>
-        <p:nvSpPr>
-          <p:cNvPr id="213" name="Oval 212">
-            <a:extLst>
-              <a:ext uri="{FF2B5EF4-FFF2-40B4-BE49-F238E27FC236}">
-                <a16:creationId xmlns:a16="http://schemas.microsoft.com/office/drawing/2014/main" id="{84CAB951-8CCF-FB44-A4D5-568168556E15}"/>
-              </a:ext>
-            </a:extLst>
-          </p:cNvPr>
-          <p:cNvSpPr/>
-          <p:nvPr/>
-        </p:nvSpPr>
-        <p:spPr>
-          <a:xfrm>
-            <a:off x="5139119" y="1308184"/>
-            <a:ext cx="130591" cy="130591"/>
-          </a:xfrm>
-          <a:prstGeom prst="ellipse">
-            <a:avLst/>
-          </a:prstGeom>
-          <a:solidFill>
-            <a:srgbClr val="7F7F7F"/>
-          </a:solidFill>
-          <a:ln>
-            <a:noFill/>
-          </a:ln>
-        </p:spPr>
-        <p:style>
-          <a:lnRef idx="2">
-            <a:schemeClr val="accent1">
-              <a:shade val="50000"/>
-            </a:schemeClr>
-          </a:lnRef>
-          <a:fillRef idx="1">
-            <a:schemeClr val="accent1"/>
-          </a:fillRef>
-          <a:effectRef idx="0">
-            <a:schemeClr val="accent1"/>
-          </a:effectRef>
-          <a:fontRef idx="minor">
-            <a:schemeClr val="lt1"/>
-          </a:fontRef>
-        </p:style>
-        <p:txBody>
-          <a:bodyPr rtlCol="0" anchor="ctr"/>
-          <a:lstStyle/>
-          <a:p>
-            <a:pPr algn="ctr"/>
-            <a:endParaRPr lang="en-US"/>
-          </a:p>
-        </p:txBody>
-      </p:sp>
-      <p:sp>
-        <p:nvSpPr>
-          <p:cNvPr id="215" name="Oval 214">
-            <a:extLst>
-              <a:ext uri="{FF2B5EF4-FFF2-40B4-BE49-F238E27FC236}">
-                <a16:creationId xmlns:a16="http://schemas.microsoft.com/office/drawing/2014/main" id="{C6344B51-3000-C94F-B9BB-821337E549A0}"/>
-              </a:ext>
-            </a:extLst>
-          </p:cNvPr>
-          <p:cNvSpPr/>
-          <p:nvPr/>
-        </p:nvSpPr>
-        <p:spPr>
-          <a:xfrm>
-            <a:off x="4967206" y="1308182"/>
-            <a:ext cx="130591" cy="130591"/>
-          </a:xfrm>
-          <a:prstGeom prst="ellipse">
-            <a:avLst/>
-          </a:prstGeom>
-          <a:solidFill>
-            <a:srgbClr val="F8C219"/>
-          </a:solidFill>
-          <a:ln>
-            <a:noFill/>
-          </a:ln>
-        </p:spPr>
-        <p:style>
-          <a:lnRef idx="2">
-            <a:schemeClr val="accent1">
-              <a:shade val="50000"/>
-            </a:schemeClr>
-          </a:lnRef>
-          <a:fillRef idx="1">
-            <a:schemeClr val="accent1"/>
-          </a:fillRef>
-          <a:effectRef idx="0">
-            <a:schemeClr val="accent1"/>
-          </a:effectRef>
-          <a:fontRef idx="minor">
-            <a:schemeClr val="lt1"/>
-          </a:fontRef>
-        </p:style>
-        <p:txBody>
-          <a:bodyPr rtlCol="0" anchor="ctr"/>
-          <a:lstStyle/>
-          <a:p>
-            <a:pPr algn="ctr"/>
-            <a:endParaRPr lang="en-US"/>
-          </a:p>
-        </p:txBody>
-      </p:sp>
-      <p:sp>
-        <p:nvSpPr>
-          <p:cNvPr id="216" name="Oval 215">
-            <a:extLst>
-              <a:ext uri="{FF2B5EF4-FFF2-40B4-BE49-F238E27FC236}">
-                <a16:creationId xmlns:a16="http://schemas.microsoft.com/office/drawing/2014/main" id="{FB429D49-66E0-D849-85B7-54371CC01F2D}"/>
-              </a:ext>
-            </a:extLst>
-          </p:cNvPr>
-          <p:cNvSpPr/>
-          <p:nvPr/>
-        </p:nvSpPr>
-        <p:spPr>
-          <a:xfrm>
-            <a:off x="5684831" y="821411"/>
-            <a:ext cx="130591" cy="130591"/>
-          </a:xfrm>
-          <a:prstGeom prst="ellipse">
-            <a:avLst/>
-          </a:prstGeom>
-          <a:solidFill>
-            <a:schemeClr val="accent2"/>
-          </a:solidFill>
-          <a:ln>
-            <a:noFill/>
-          </a:ln>
-        </p:spPr>
-        <p:style>
-          <a:lnRef idx="2">
-            <a:schemeClr val="accent1">
-              <a:shade val="50000"/>
-            </a:schemeClr>
-          </a:lnRef>
-          <a:fillRef idx="1">
-            <a:schemeClr val="accent1"/>
-          </a:fillRef>
-          <a:effectRef idx="0">
-            <a:schemeClr val="accent1"/>
-          </a:effectRef>
-          <a:fontRef idx="minor">
-            <a:schemeClr val="lt1"/>
-          </a:fontRef>
-        </p:style>
-        <p:txBody>
-          <a:bodyPr rtlCol="0" anchor="ctr"/>
-          <a:lstStyle/>
-          <a:p>
-            <a:pPr algn="ctr"/>
-            <a:endParaRPr lang="en-US"/>
-          </a:p>
-        </p:txBody>
-      </p:sp>
-      <p:sp>
-        <p:nvSpPr>
-          <p:cNvPr id="217" name="Oval 216">
-            <a:extLst>
-              <a:ext uri="{FF2B5EF4-FFF2-40B4-BE49-F238E27FC236}">
-                <a16:creationId xmlns:a16="http://schemas.microsoft.com/office/drawing/2014/main" id="{627FF477-12F9-8348-969C-7FFBADB03511}"/>
-              </a:ext>
-            </a:extLst>
-          </p:cNvPr>
-          <p:cNvSpPr/>
-          <p:nvPr/>
-        </p:nvSpPr>
-        <p:spPr>
-          <a:xfrm>
-            <a:off x="5528887" y="823039"/>
-            <a:ext cx="130591" cy="130591"/>
-          </a:xfrm>
-          <a:prstGeom prst="ellipse">
-            <a:avLst/>
-          </a:prstGeom>
-          <a:solidFill>
-            <a:schemeClr val="accent2"/>
-          </a:solidFill>
-          <a:ln>
-            <a:noFill/>
-          </a:ln>
-        </p:spPr>
-        <p:style>
-          <a:lnRef idx="2">
-            <a:schemeClr val="accent1">
-              <a:shade val="50000"/>
-            </a:schemeClr>
-          </a:lnRef>
-          <a:fillRef idx="1">
-            <a:schemeClr val="accent1"/>
-          </a:fillRef>
-          <a:effectRef idx="0">
-            <a:schemeClr val="accent1"/>
-          </a:effectRef>
-          <a:fontRef idx="minor">
-            <a:schemeClr val="lt1"/>
-          </a:fontRef>
-        </p:style>
-        <p:txBody>
-          <a:bodyPr rtlCol="0" anchor="ctr"/>
-          <a:lstStyle/>
-          <a:p>
-            <a:pPr algn="ctr"/>
-            <a:endParaRPr lang="en-US"/>
-          </a:p>
-        </p:txBody>
-      </p:sp>
-      <p:sp>
-        <p:nvSpPr>
-          <p:cNvPr id="218" name="Oval 217">
-            <a:extLst>
-              <a:ext uri="{FF2B5EF4-FFF2-40B4-BE49-F238E27FC236}">
-                <a16:creationId xmlns:a16="http://schemas.microsoft.com/office/drawing/2014/main" id="{43B96EA7-62E8-ED45-B589-3EF18BB7BCF6}"/>
-              </a:ext>
-            </a:extLst>
-          </p:cNvPr>
-          <p:cNvSpPr/>
-          <p:nvPr/>
-        </p:nvSpPr>
-        <p:spPr>
-          <a:xfrm>
-            <a:off x="5684482" y="1239472"/>
-            <a:ext cx="130591" cy="130591"/>
-          </a:xfrm>
-          <a:prstGeom prst="ellipse">
-            <a:avLst/>
-          </a:prstGeom>
-          <a:solidFill>
-            <a:srgbClr val="7F7F7F"/>
-          </a:solidFill>
-          <a:ln>
-            <a:noFill/>
-          </a:ln>
-        </p:spPr>
-        <p:style>
-          <a:lnRef idx="2">
-            <a:schemeClr val="accent1">
-              <a:shade val="50000"/>
-            </a:schemeClr>
-          </a:lnRef>
-          <a:fillRef idx="1">
-            <a:schemeClr val="accent1"/>
-          </a:fillRef>
-          <a:effectRef idx="0">
-            <a:schemeClr val="accent1"/>
-          </a:effectRef>
-          <a:fontRef idx="minor">
-            <a:schemeClr val="lt1"/>
-          </a:fontRef>
-        </p:style>
-        <p:txBody>
-          <a:bodyPr rtlCol="0" anchor="ctr"/>
-          <a:lstStyle/>
-          <a:p>
-            <a:pPr algn="ctr"/>
-            <a:endParaRPr lang="en-US"/>
-          </a:p>
-        </p:txBody>
-      </p:sp>
-      <p:sp>
-        <p:nvSpPr>
-          <p:cNvPr id="219" name="Oval 218">
-            <a:extLst>
-              <a:ext uri="{FF2B5EF4-FFF2-40B4-BE49-F238E27FC236}">
-                <a16:creationId xmlns:a16="http://schemas.microsoft.com/office/drawing/2014/main" id="{51EFA1BB-82A4-004E-82E3-74B0AA9997B9}"/>
-              </a:ext>
-            </a:extLst>
-          </p:cNvPr>
-          <p:cNvSpPr/>
-          <p:nvPr/>
-        </p:nvSpPr>
-        <p:spPr>
-          <a:xfrm>
-            <a:off x="5528538" y="1241100"/>
-            <a:ext cx="130591" cy="130591"/>
-          </a:xfrm>
-          <a:prstGeom prst="ellipse">
-            <a:avLst/>
-          </a:prstGeom>
-          <a:solidFill>
-            <a:schemeClr val="accent2"/>
           </a:solidFill>
           <a:ln>
             <a:noFill/>

</xml_diff>

<commit_message>
Updated scripts to include full figures and univariate analyses
</commit_message>
<xml_diff>
--- a/Figures/Figure1_full.pptx
+++ b/Figures/Figure1_full.pptx
@@ -197,7 +197,7 @@
           <a:p>
             <a:fld id="{B81506D6-8878-0945-9216-E4F5AFA6BC99}" type="datetimeFigureOut">
               <a:rPr lang="en-US" smtClean="0"/>
-              <a:t>4/16/21</a:t>
+              <a:t>4/22/21</a:t>
             </a:fld>
             <a:endParaRPr lang="en-US"/>
           </a:p>
@@ -679,7 +679,7 @@
           <a:p>
             <a:fld id="{B5B0AC65-3CE8-4749-B0D7-AFCFDEE36239}" type="datetimeFigureOut">
               <a:rPr lang="en-US" smtClean="0"/>
-              <a:t>4/16/21</a:t>
+              <a:t>4/22/21</a:t>
             </a:fld>
             <a:endParaRPr lang="en-US"/>
           </a:p>
@@ -849,7 +849,7 @@
           <a:p>
             <a:fld id="{B5B0AC65-3CE8-4749-B0D7-AFCFDEE36239}" type="datetimeFigureOut">
               <a:rPr lang="en-US" smtClean="0"/>
-              <a:t>4/16/21</a:t>
+              <a:t>4/22/21</a:t>
             </a:fld>
             <a:endParaRPr lang="en-US"/>
           </a:p>
@@ -1029,7 +1029,7 @@
           <a:p>
             <a:fld id="{B5B0AC65-3CE8-4749-B0D7-AFCFDEE36239}" type="datetimeFigureOut">
               <a:rPr lang="en-US" smtClean="0"/>
-              <a:t>4/16/21</a:t>
+              <a:t>4/22/21</a:t>
             </a:fld>
             <a:endParaRPr lang="en-US"/>
           </a:p>
@@ -1199,7 +1199,7 @@
           <a:p>
             <a:fld id="{B5B0AC65-3CE8-4749-B0D7-AFCFDEE36239}" type="datetimeFigureOut">
               <a:rPr lang="en-US" smtClean="0"/>
-              <a:t>4/16/21</a:t>
+              <a:t>4/22/21</a:t>
             </a:fld>
             <a:endParaRPr lang="en-US"/>
           </a:p>
@@ -1445,7 +1445,7 @@
           <a:p>
             <a:fld id="{B5B0AC65-3CE8-4749-B0D7-AFCFDEE36239}" type="datetimeFigureOut">
               <a:rPr lang="en-US" smtClean="0"/>
-              <a:t>4/16/21</a:t>
+              <a:t>4/22/21</a:t>
             </a:fld>
             <a:endParaRPr lang="en-US"/>
           </a:p>
@@ -1677,7 +1677,7 @@
           <a:p>
             <a:fld id="{B5B0AC65-3CE8-4749-B0D7-AFCFDEE36239}" type="datetimeFigureOut">
               <a:rPr lang="en-US" smtClean="0"/>
-              <a:t>4/16/21</a:t>
+              <a:t>4/22/21</a:t>
             </a:fld>
             <a:endParaRPr lang="en-US"/>
           </a:p>
@@ -2044,7 +2044,7 @@
           <a:p>
             <a:fld id="{B5B0AC65-3CE8-4749-B0D7-AFCFDEE36239}" type="datetimeFigureOut">
               <a:rPr lang="en-US" smtClean="0"/>
-              <a:t>4/16/21</a:t>
+              <a:t>4/22/21</a:t>
             </a:fld>
             <a:endParaRPr lang="en-US"/>
           </a:p>
@@ -2162,7 +2162,7 @@
           <a:p>
             <a:fld id="{B5B0AC65-3CE8-4749-B0D7-AFCFDEE36239}" type="datetimeFigureOut">
               <a:rPr lang="en-US" smtClean="0"/>
-              <a:t>4/16/21</a:t>
+              <a:t>4/22/21</a:t>
             </a:fld>
             <a:endParaRPr lang="en-US"/>
           </a:p>
@@ -2257,7 +2257,7 @@
           <a:p>
             <a:fld id="{B5B0AC65-3CE8-4749-B0D7-AFCFDEE36239}" type="datetimeFigureOut">
               <a:rPr lang="en-US" smtClean="0"/>
-              <a:t>4/16/21</a:t>
+              <a:t>4/22/21</a:t>
             </a:fld>
             <a:endParaRPr lang="en-US"/>
           </a:p>
@@ -2534,7 +2534,7 @@
           <a:p>
             <a:fld id="{B5B0AC65-3CE8-4749-B0D7-AFCFDEE36239}" type="datetimeFigureOut">
               <a:rPr lang="en-US" smtClean="0"/>
-              <a:t>4/16/21</a:t>
+              <a:t>4/22/21</a:t>
             </a:fld>
             <a:endParaRPr lang="en-US"/>
           </a:p>
@@ -2791,7 +2791,7 @@
           <a:p>
             <a:fld id="{B5B0AC65-3CE8-4749-B0D7-AFCFDEE36239}" type="datetimeFigureOut">
               <a:rPr lang="en-US" smtClean="0"/>
-              <a:t>4/16/21</a:t>
+              <a:t>4/22/21</a:t>
             </a:fld>
             <a:endParaRPr lang="en-US"/>
           </a:p>
@@ -3004,7 +3004,7 @@
           <a:p>
             <a:fld id="{B5B0AC65-3CE8-4749-B0D7-AFCFDEE36239}" type="datetimeFigureOut">
               <a:rPr lang="en-US" smtClean="0"/>
-              <a:t>4/16/21</a:t>
+              <a:t>4/22/21</a:t>
             </a:fld>
             <a:endParaRPr lang="en-US"/>
           </a:p>
@@ -3565,7 +3565,7 @@
         </p:nvSpPr>
         <p:spPr>
           <a:xfrm>
-            <a:off x="3826415" y="433927"/>
+            <a:off x="3815088" y="-37301"/>
             <a:ext cx="327334" cy="369332"/>
           </a:xfrm>
           <a:prstGeom prst="rect">
@@ -3600,7 +3600,7 @@
         </p:nvSpPr>
         <p:spPr>
           <a:xfrm>
-            <a:off x="3816304" y="1183169"/>
+            <a:off x="3816304" y="885851"/>
             <a:ext cx="296876" cy="369332"/>
           </a:xfrm>
           <a:prstGeom prst="rect">
@@ -3635,7 +3635,7 @@
         </p:nvSpPr>
         <p:spPr>
           <a:xfrm>
-            <a:off x="4090647" y="1285075"/>
+            <a:off x="4090647" y="987757"/>
             <a:ext cx="346605" cy="798873"/>
           </a:xfrm>
           <a:prstGeom prst="rect">
@@ -3691,7 +3691,7 @@
         </p:nvSpPr>
         <p:spPr>
           <a:xfrm>
-            <a:off x="4140639" y="1322422"/>
+            <a:off x="4140639" y="1025104"/>
             <a:ext cx="90826" cy="90826"/>
           </a:xfrm>
           <a:prstGeom prst="rect">
@@ -3743,7 +3743,7 @@
         </p:nvSpPr>
         <p:spPr>
           <a:xfrm>
-            <a:off x="4298488" y="1322422"/>
+            <a:off x="4298488" y="1025104"/>
             <a:ext cx="90826" cy="90826"/>
           </a:xfrm>
           <a:prstGeom prst="rect">
@@ -3792,7 +3792,7 @@
         </p:nvSpPr>
         <p:spPr>
           <a:xfrm>
-            <a:off x="4140639" y="1482766"/>
+            <a:off x="4140639" y="1185448"/>
             <a:ext cx="90826" cy="90826"/>
           </a:xfrm>
           <a:prstGeom prst="rect">
@@ -3844,7 +3844,7 @@
         </p:nvSpPr>
         <p:spPr>
           <a:xfrm>
-            <a:off x="4298488" y="1482766"/>
+            <a:off x="4298488" y="1185448"/>
             <a:ext cx="90826" cy="90826"/>
           </a:xfrm>
           <a:prstGeom prst="rect">
@@ -3896,7 +3896,7 @@
         </p:nvSpPr>
         <p:spPr>
           <a:xfrm>
-            <a:off x="4140639" y="1643110"/>
+            <a:off x="4140639" y="1345792"/>
             <a:ext cx="90826" cy="90826"/>
           </a:xfrm>
           <a:prstGeom prst="rect">
@@ -3948,7 +3948,7 @@
         </p:nvSpPr>
         <p:spPr>
           <a:xfrm>
-            <a:off x="4298488" y="1643110"/>
+            <a:off x="4298488" y="1345792"/>
             <a:ext cx="90826" cy="90826"/>
           </a:xfrm>
           <a:prstGeom prst="rect">
@@ -4000,7 +4000,7 @@
         </p:nvSpPr>
         <p:spPr>
           <a:xfrm>
-            <a:off x="4140639" y="1803454"/>
+            <a:off x="4140639" y="1506136"/>
             <a:ext cx="90826" cy="90826"/>
           </a:xfrm>
           <a:prstGeom prst="rect">
@@ -4055,7 +4055,7 @@
         </p:nvSpPr>
         <p:spPr>
           <a:xfrm>
-            <a:off x="4298488" y="1803454"/>
+            <a:off x="4298488" y="1506136"/>
             <a:ext cx="90826" cy="90826"/>
           </a:xfrm>
           <a:prstGeom prst="rect">
@@ -4110,7 +4110,7 @@
         </p:nvSpPr>
         <p:spPr>
           <a:xfrm>
-            <a:off x="4140639" y="1963799"/>
+            <a:off x="4140639" y="1666481"/>
             <a:ext cx="90826" cy="90826"/>
           </a:xfrm>
           <a:prstGeom prst="rect">
@@ -4165,7 +4165,7 @@
         </p:nvSpPr>
         <p:spPr>
           <a:xfrm>
-            <a:off x="4298488" y="1963799"/>
+            <a:off x="4298488" y="1666481"/>
             <a:ext cx="90826" cy="90826"/>
           </a:xfrm>
           <a:prstGeom prst="rect">
@@ -4217,7 +4217,7 @@
         </p:nvSpPr>
         <p:spPr>
           <a:xfrm>
-            <a:off x="4499782" y="1285075"/>
+            <a:off x="4499782" y="987757"/>
             <a:ext cx="342753" cy="798873"/>
           </a:xfrm>
           <a:prstGeom prst="rect">
@@ -4273,7 +4273,7 @@
         </p:nvSpPr>
         <p:spPr>
           <a:xfrm>
-            <a:off x="4556686" y="1322422"/>
+            <a:off x="4556686" y="1025104"/>
             <a:ext cx="90826" cy="90826"/>
           </a:xfrm>
           <a:prstGeom prst="rect">
@@ -4325,7 +4325,7 @@
         </p:nvSpPr>
         <p:spPr>
           <a:xfrm>
-            <a:off x="4704375" y="1322422"/>
+            <a:off x="4704375" y="1025104"/>
             <a:ext cx="90826" cy="90826"/>
           </a:xfrm>
           <a:prstGeom prst="rect">
@@ -4377,7 +4377,7 @@
         </p:nvSpPr>
         <p:spPr>
           <a:xfrm>
-            <a:off x="4556686" y="1482766"/>
+            <a:off x="4556686" y="1185448"/>
             <a:ext cx="90826" cy="90826"/>
           </a:xfrm>
           <a:prstGeom prst="rect">
@@ -4429,7 +4429,7 @@
         </p:nvSpPr>
         <p:spPr>
           <a:xfrm>
-            <a:off x="4704375" y="1482766"/>
+            <a:off x="4704375" y="1185448"/>
             <a:ext cx="90826" cy="90826"/>
           </a:xfrm>
           <a:prstGeom prst="rect">
@@ -4481,7 +4481,7 @@
         </p:nvSpPr>
         <p:spPr>
           <a:xfrm>
-            <a:off x="4556686" y="1643110"/>
+            <a:off x="4556686" y="1345792"/>
             <a:ext cx="90826" cy="90826"/>
           </a:xfrm>
           <a:prstGeom prst="rect">
@@ -4533,7 +4533,7 @@
         </p:nvSpPr>
         <p:spPr>
           <a:xfrm>
-            <a:off x="4704375" y="1643110"/>
+            <a:off x="4704375" y="1345792"/>
             <a:ext cx="90826" cy="90826"/>
           </a:xfrm>
           <a:prstGeom prst="rect">
@@ -4585,7 +4585,7 @@
         </p:nvSpPr>
         <p:spPr>
           <a:xfrm>
-            <a:off x="4556686" y="1803454"/>
+            <a:off x="4556686" y="1506136"/>
             <a:ext cx="90826" cy="90826"/>
           </a:xfrm>
           <a:prstGeom prst="rect">
@@ -4637,7 +4637,7 @@
         </p:nvSpPr>
         <p:spPr>
           <a:xfrm>
-            <a:off x="4704375" y="1803454"/>
+            <a:off x="4704375" y="1506136"/>
             <a:ext cx="90826" cy="90826"/>
           </a:xfrm>
           <a:prstGeom prst="rect">
@@ -4689,7 +4689,7 @@
         </p:nvSpPr>
         <p:spPr>
           <a:xfrm>
-            <a:off x="4556686" y="1963799"/>
+            <a:off x="4556686" y="1666481"/>
             <a:ext cx="90826" cy="90826"/>
           </a:xfrm>
           <a:prstGeom prst="rect">
@@ -4741,7 +4741,7 @@
         </p:nvSpPr>
         <p:spPr>
           <a:xfrm>
-            <a:off x="4704375" y="1963799"/>
+            <a:off x="4704375" y="1666481"/>
             <a:ext cx="90826" cy="90826"/>
           </a:xfrm>
           <a:prstGeom prst="rect">
@@ -4793,7 +4793,7 @@
         </p:nvSpPr>
         <p:spPr>
           <a:xfrm>
-            <a:off x="4905065" y="1285075"/>
+            <a:off x="4905065" y="987757"/>
             <a:ext cx="342753" cy="798873"/>
           </a:xfrm>
           <a:prstGeom prst="rect">
@@ -4849,7 +4849,7 @@
         </p:nvSpPr>
         <p:spPr>
           <a:xfrm>
-            <a:off x="4958721" y="1322422"/>
+            <a:off x="4958721" y="1025104"/>
             <a:ext cx="90826" cy="90826"/>
           </a:xfrm>
           <a:prstGeom prst="rect">
@@ -4901,7 +4901,7 @@
         </p:nvSpPr>
         <p:spPr>
           <a:xfrm>
-            <a:off x="5116570" y="1322422"/>
+            <a:off x="5116570" y="1025104"/>
             <a:ext cx="90826" cy="90826"/>
           </a:xfrm>
           <a:prstGeom prst="rect">
@@ -4953,7 +4953,7 @@
         </p:nvSpPr>
         <p:spPr>
           <a:xfrm>
-            <a:off x="4958721" y="1482766"/>
+            <a:off x="4958721" y="1185448"/>
             <a:ext cx="90826" cy="90826"/>
           </a:xfrm>
           <a:prstGeom prst="rect">
@@ -5005,7 +5005,7 @@
         </p:nvSpPr>
         <p:spPr>
           <a:xfrm>
-            <a:off x="5116570" y="1482766"/>
+            <a:off x="5116570" y="1185448"/>
             <a:ext cx="90826" cy="90826"/>
           </a:xfrm>
           <a:prstGeom prst="rect">
@@ -5057,7 +5057,7 @@
         </p:nvSpPr>
         <p:spPr>
           <a:xfrm>
-            <a:off x="4958721" y="1643110"/>
+            <a:off x="4958721" y="1345792"/>
             <a:ext cx="90826" cy="90826"/>
           </a:xfrm>
           <a:prstGeom prst="rect">
@@ -5109,7 +5109,7 @@
         </p:nvSpPr>
         <p:spPr>
           <a:xfrm>
-            <a:off x="5116570" y="1643110"/>
+            <a:off x="5116570" y="1345792"/>
             <a:ext cx="90826" cy="90826"/>
           </a:xfrm>
           <a:prstGeom prst="rect">
@@ -5161,7 +5161,7 @@
         </p:nvSpPr>
         <p:spPr>
           <a:xfrm>
-            <a:off x="4958721" y="1803454"/>
+            <a:off x="4958721" y="1506136"/>
             <a:ext cx="90826" cy="90826"/>
           </a:xfrm>
           <a:prstGeom prst="rect">
@@ -5213,7 +5213,7 @@
         </p:nvSpPr>
         <p:spPr>
           <a:xfrm>
-            <a:off x="5116570" y="1803454"/>
+            <a:off x="5116570" y="1506136"/>
             <a:ext cx="90826" cy="90826"/>
           </a:xfrm>
           <a:prstGeom prst="rect">
@@ -5265,7 +5265,7 @@
         </p:nvSpPr>
         <p:spPr>
           <a:xfrm>
-            <a:off x="4958721" y="1963799"/>
+            <a:off x="4958721" y="1666481"/>
             <a:ext cx="90826" cy="90826"/>
           </a:xfrm>
           <a:prstGeom prst="rect">
@@ -5317,7 +5317,7 @@
         </p:nvSpPr>
         <p:spPr>
           <a:xfrm>
-            <a:off x="5116570" y="1963799"/>
+            <a:off x="5116570" y="1666481"/>
             <a:ext cx="90826" cy="90826"/>
           </a:xfrm>
           <a:prstGeom prst="rect">
@@ -5369,7 +5369,7 @@
         </p:nvSpPr>
         <p:spPr>
           <a:xfrm>
-            <a:off x="5310348" y="1285075"/>
+            <a:off x="5310348" y="987757"/>
             <a:ext cx="359390" cy="798873"/>
           </a:xfrm>
           <a:prstGeom prst="rect">
@@ -5425,7 +5425,7 @@
         </p:nvSpPr>
         <p:spPr>
           <a:xfrm>
-            <a:off x="5368415" y="1322422"/>
+            <a:off x="5368415" y="1025104"/>
             <a:ext cx="90826" cy="90826"/>
           </a:xfrm>
           <a:prstGeom prst="rect">
@@ -5477,7 +5477,7 @@
         </p:nvSpPr>
         <p:spPr>
           <a:xfrm>
-            <a:off x="5526264" y="1322422"/>
+            <a:off x="5526264" y="1025104"/>
             <a:ext cx="90826" cy="90826"/>
           </a:xfrm>
           <a:prstGeom prst="rect">
@@ -5529,7 +5529,7 @@
         </p:nvSpPr>
         <p:spPr>
           <a:xfrm>
-            <a:off x="5367111" y="1482766"/>
+            <a:off x="5367111" y="1185448"/>
             <a:ext cx="90826" cy="90826"/>
           </a:xfrm>
           <a:prstGeom prst="rect">
@@ -5581,7 +5581,7 @@
         </p:nvSpPr>
         <p:spPr>
           <a:xfrm>
-            <a:off x="5524960" y="1482766"/>
+            <a:off x="5524960" y="1185448"/>
             <a:ext cx="90826" cy="90826"/>
           </a:xfrm>
           <a:prstGeom prst="rect">
@@ -5633,7 +5633,7 @@
         </p:nvSpPr>
         <p:spPr>
           <a:xfrm>
-            <a:off x="5373018" y="1643110"/>
+            <a:off x="5373018" y="1345792"/>
             <a:ext cx="90826" cy="90826"/>
           </a:xfrm>
           <a:prstGeom prst="rect">
@@ -5685,7 +5685,7 @@
         </p:nvSpPr>
         <p:spPr>
           <a:xfrm>
-            <a:off x="5530867" y="1643110"/>
+            <a:off x="5530867" y="1345792"/>
             <a:ext cx="90826" cy="90826"/>
           </a:xfrm>
           <a:prstGeom prst="rect">
@@ -5737,7 +5737,7 @@
         </p:nvSpPr>
         <p:spPr>
           <a:xfrm>
-            <a:off x="5367111" y="1803454"/>
+            <a:off x="5367111" y="1506136"/>
             <a:ext cx="90826" cy="90826"/>
           </a:xfrm>
           <a:prstGeom prst="rect">
@@ -5789,7 +5789,7 @@
         </p:nvSpPr>
         <p:spPr>
           <a:xfrm>
-            <a:off x="5524960" y="1803454"/>
+            <a:off x="5524960" y="1506136"/>
             <a:ext cx="90826" cy="90826"/>
           </a:xfrm>
           <a:prstGeom prst="rect">
@@ -5841,7 +5841,7 @@
         </p:nvSpPr>
         <p:spPr>
           <a:xfrm>
-            <a:off x="5367111" y="1963799"/>
+            <a:off x="5367111" y="1666481"/>
             <a:ext cx="90826" cy="90826"/>
           </a:xfrm>
           <a:prstGeom prst="rect">
@@ -5893,7 +5893,7 @@
         </p:nvSpPr>
         <p:spPr>
           <a:xfrm>
-            <a:off x="5524960" y="1963799"/>
+            <a:off x="5524960" y="1666481"/>
             <a:ext cx="90826" cy="90826"/>
           </a:xfrm>
           <a:prstGeom prst="rect">
@@ -5945,7 +5945,7 @@
         </p:nvSpPr>
         <p:spPr>
           <a:xfrm>
-            <a:off x="5732267" y="1285075"/>
+            <a:off x="5732267" y="987757"/>
             <a:ext cx="353585" cy="798873"/>
           </a:xfrm>
           <a:prstGeom prst="rect">
@@ -6001,7 +6001,7 @@
         </p:nvSpPr>
         <p:spPr>
           <a:xfrm>
-            <a:off x="5782259" y="1322422"/>
+            <a:off x="5782259" y="1025104"/>
             <a:ext cx="90826" cy="90826"/>
           </a:xfrm>
           <a:prstGeom prst="rect">
@@ -6056,7 +6056,7 @@
         </p:nvSpPr>
         <p:spPr>
           <a:xfrm>
-            <a:off x="5940108" y="1322422"/>
+            <a:off x="5940108" y="1025104"/>
             <a:ext cx="90826" cy="90826"/>
           </a:xfrm>
           <a:prstGeom prst="rect">
@@ -6111,7 +6111,7 @@
         </p:nvSpPr>
         <p:spPr>
           <a:xfrm>
-            <a:off x="5782259" y="1482766"/>
+            <a:off x="5782259" y="1185448"/>
             <a:ext cx="90826" cy="90826"/>
           </a:xfrm>
           <a:prstGeom prst="rect">
@@ -6166,7 +6166,7 @@
         </p:nvSpPr>
         <p:spPr>
           <a:xfrm>
-            <a:off x="5940108" y="1482766"/>
+            <a:off x="5940108" y="1185448"/>
             <a:ext cx="90826" cy="90826"/>
           </a:xfrm>
           <a:prstGeom prst="rect">
@@ -6221,7 +6221,7 @@
         </p:nvSpPr>
         <p:spPr>
           <a:xfrm>
-            <a:off x="5782259" y="1643110"/>
+            <a:off x="5782259" y="1345792"/>
             <a:ext cx="90826" cy="90826"/>
           </a:xfrm>
           <a:prstGeom prst="rect">
@@ -6276,7 +6276,7 @@
         </p:nvSpPr>
         <p:spPr>
           <a:xfrm>
-            <a:off x="5940108" y="1643110"/>
+            <a:off x="5940108" y="1345792"/>
             <a:ext cx="90826" cy="90826"/>
           </a:xfrm>
           <a:prstGeom prst="rect">
@@ -6331,7 +6331,7 @@
         </p:nvSpPr>
         <p:spPr>
           <a:xfrm>
-            <a:off x="5782259" y="1803454"/>
+            <a:off x="5782259" y="1506136"/>
             <a:ext cx="90826" cy="90826"/>
           </a:xfrm>
           <a:prstGeom prst="rect">
@@ -6386,7 +6386,7 @@
         </p:nvSpPr>
         <p:spPr>
           <a:xfrm>
-            <a:off x="5940108" y="1803454"/>
+            <a:off x="5940108" y="1506136"/>
             <a:ext cx="90826" cy="90826"/>
           </a:xfrm>
           <a:prstGeom prst="rect">
@@ -6441,7 +6441,7 @@
         </p:nvSpPr>
         <p:spPr>
           <a:xfrm>
-            <a:off x="5782259" y="1963799"/>
+            <a:off x="5782259" y="1666481"/>
             <a:ext cx="90826" cy="90826"/>
           </a:xfrm>
           <a:prstGeom prst="rect">
@@ -6496,7 +6496,7 @@
         </p:nvSpPr>
         <p:spPr>
           <a:xfrm>
-            <a:off x="5940108" y="1963799"/>
+            <a:off x="5940108" y="1666481"/>
             <a:ext cx="90826" cy="90826"/>
           </a:xfrm>
           <a:prstGeom prst="rect">
@@ -6551,7 +6551,7 @@
         </p:nvSpPr>
         <p:spPr>
           <a:xfrm>
-            <a:off x="6085852" y="1528179"/>
+            <a:off x="6085852" y="1230861"/>
             <a:ext cx="340158" cy="276999"/>
           </a:xfrm>
           <a:prstGeom prst="rect">
@@ -6586,7 +6586,7 @@
         </p:nvSpPr>
         <p:spPr>
           <a:xfrm>
-            <a:off x="4089249" y="539636"/>
+            <a:off x="4089249" y="68409"/>
             <a:ext cx="494106" cy="376397"/>
           </a:xfrm>
           <a:prstGeom prst="rect">
@@ -6642,7 +6642,7 @@
         </p:nvSpPr>
         <p:spPr>
           <a:xfrm rot="2562045">
-            <a:off x="4234215" y="623996"/>
+            <a:off x="4234215" y="152769"/>
             <a:ext cx="79505" cy="162622"/>
           </a:xfrm>
           <a:prstGeom prst="ellipse">
@@ -6694,7 +6694,7 @@
         </p:nvSpPr>
         <p:spPr>
           <a:xfrm>
-            <a:off x="4635317" y="539636"/>
+            <a:off x="4635317" y="68409"/>
             <a:ext cx="494106" cy="376397"/>
           </a:xfrm>
           <a:prstGeom prst="rect">
@@ -6750,7 +6750,7 @@
         </p:nvSpPr>
         <p:spPr>
           <a:xfrm>
-            <a:off x="5181187" y="539636"/>
+            <a:off x="5181187" y="68409"/>
             <a:ext cx="494106" cy="376397"/>
           </a:xfrm>
           <a:prstGeom prst="rect">
@@ -6806,7 +6806,7 @@
         </p:nvSpPr>
         <p:spPr>
           <a:xfrm>
-            <a:off x="5718728" y="539636"/>
+            <a:off x="5718728" y="68409"/>
             <a:ext cx="494106" cy="376397"/>
           </a:xfrm>
           <a:prstGeom prst="rect">
@@ -6931,7 +6931,7 @@
         </p:nvSpPr>
         <p:spPr>
           <a:xfrm rot="2562045">
-            <a:off x="4376117" y="581954"/>
+            <a:off x="4376117" y="110727"/>
             <a:ext cx="79505" cy="162622"/>
           </a:xfrm>
           <a:prstGeom prst="ellipse">
@@ -6983,7 +6983,7 @@
         </p:nvSpPr>
         <p:spPr>
           <a:xfrm rot="2562045">
-            <a:off x="4335910" y="716185"/>
+            <a:off x="4335910" y="244958"/>
             <a:ext cx="79505" cy="162622"/>
           </a:xfrm>
           <a:prstGeom prst="ellipse">
@@ -7035,7 +7035,7 @@
         </p:nvSpPr>
         <p:spPr>
           <a:xfrm rot="2562045">
-            <a:off x="4772600" y="630631"/>
+            <a:off x="4772600" y="159404"/>
             <a:ext cx="79505" cy="162622"/>
           </a:xfrm>
           <a:prstGeom prst="ellipse">
@@ -7087,7 +7087,7 @@
         </p:nvSpPr>
         <p:spPr>
           <a:xfrm rot="2562045">
-            <a:off x="4914502" y="588589"/>
+            <a:off x="4914502" y="117362"/>
             <a:ext cx="79505" cy="162622"/>
           </a:xfrm>
           <a:prstGeom prst="ellipse">
@@ -7139,7 +7139,7 @@
         </p:nvSpPr>
         <p:spPr>
           <a:xfrm rot="2562045">
-            <a:off x="4874295" y="722820"/>
+            <a:off x="4874295" y="251593"/>
             <a:ext cx="79505" cy="162622"/>
           </a:xfrm>
           <a:prstGeom prst="ellipse">
@@ -7191,7 +7191,7 @@
         </p:nvSpPr>
         <p:spPr>
           <a:xfrm rot="2562045">
-            <a:off x="5304879" y="630632"/>
+            <a:off x="5304879" y="159405"/>
             <a:ext cx="79505" cy="162622"/>
           </a:xfrm>
           <a:prstGeom prst="ellipse">
@@ -7243,7 +7243,7 @@
         </p:nvSpPr>
         <p:spPr>
           <a:xfrm rot="2562045">
-            <a:off x="5446781" y="588590"/>
+            <a:off x="5446781" y="117363"/>
             <a:ext cx="79505" cy="162622"/>
           </a:xfrm>
           <a:prstGeom prst="ellipse">
@@ -7295,7 +7295,7 @@
         </p:nvSpPr>
         <p:spPr>
           <a:xfrm rot="2562045">
-            <a:off x="5406574" y="722821"/>
+            <a:off x="5406574" y="251594"/>
             <a:ext cx="79505" cy="162622"/>
           </a:xfrm>
           <a:prstGeom prst="ellipse">
@@ -7347,7 +7347,7 @@
         </p:nvSpPr>
         <p:spPr>
           <a:xfrm rot="2562045">
-            <a:off x="5831874" y="632935"/>
+            <a:off x="5831874" y="161708"/>
             <a:ext cx="79505" cy="162622"/>
           </a:xfrm>
           <a:prstGeom prst="ellipse">
@@ -7399,7 +7399,7 @@
         </p:nvSpPr>
         <p:spPr>
           <a:xfrm rot="2562045">
-            <a:off x="5973776" y="590893"/>
+            <a:off x="5973776" y="119666"/>
             <a:ext cx="79505" cy="162622"/>
           </a:xfrm>
           <a:prstGeom prst="ellipse">
@@ -7451,7 +7451,7 @@
         </p:nvSpPr>
         <p:spPr>
           <a:xfrm rot="2562045">
-            <a:off x="5933569" y="725124"/>
+            <a:off x="5933569" y="253897"/>
             <a:ext cx="79505" cy="162622"/>
           </a:xfrm>
           <a:prstGeom prst="ellipse">
@@ -7486,6 +7486,3805 @@
           <a:p>
             <a:pPr algn="ctr"/>
             <a:endParaRPr lang="en-US"/>
+          </a:p>
+        </p:txBody>
+      </p:sp>
+      <p:sp>
+        <p:nvSpPr>
+          <p:cNvPr id="82" name="Rectangle 81">
+            <a:extLst>
+              <a:ext uri="{FF2B5EF4-FFF2-40B4-BE49-F238E27FC236}">
+                <a16:creationId xmlns:a16="http://schemas.microsoft.com/office/drawing/2014/main" id="{C39722EB-A773-BC40-9F3C-0574839C9461}"/>
+              </a:ext>
+            </a:extLst>
+          </p:cNvPr>
+          <p:cNvSpPr/>
+          <p:nvPr/>
+        </p:nvSpPr>
+        <p:spPr>
+          <a:xfrm>
+            <a:off x="4090184" y="478858"/>
+            <a:ext cx="494106" cy="376397"/>
+          </a:xfrm>
+          <a:prstGeom prst="rect">
+            <a:avLst/>
+          </a:prstGeom>
+          <a:solidFill>
+            <a:schemeClr val="bg1"/>
+          </a:solidFill>
+          <a:ln>
+            <a:solidFill>
+              <a:srgbClr val="C00000"/>
+            </a:solidFill>
+          </a:ln>
+        </p:spPr>
+        <p:style>
+          <a:lnRef idx="2">
+            <a:schemeClr val="accent1">
+              <a:shade val="50000"/>
+            </a:schemeClr>
+          </a:lnRef>
+          <a:fillRef idx="1">
+            <a:schemeClr val="accent1"/>
+          </a:fillRef>
+          <a:effectRef idx="0">
+            <a:schemeClr val="accent1"/>
+          </a:effectRef>
+          <a:fontRef idx="minor">
+            <a:schemeClr val="lt1"/>
+          </a:fontRef>
+        </p:style>
+        <p:txBody>
+          <a:bodyPr rtlCol="0" anchor="ctr"/>
+          <a:lstStyle/>
+          <a:p>
+            <a:pPr algn="ctr"/>
+            <a:endParaRPr lang="en-US">
+              <a:latin typeface="Avenir Book" panose="02000503020000020003" pitchFamily="2" charset="0"/>
+            </a:endParaRPr>
+          </a:p>
+        </p:txBody>
+      </p:sp>
+      <p:sp>
+        <p:nvSpPr>
+          <p:cNvPr id="83" name="Oval 82">
+            <a:extLst>
+              <a:ext uri="{FF2B5EF4-FFF2-40B4-BE49-F238E27FC236}">
+                <a16:creationId xmlns:a16="http://schemas.microsoft.com/office/drawing/2014/main" id="{80FB36F6-BA30-2F49-949B-E2CCE7D82D27}"/>
+              </a:ext>
+            </a:extLst>
+          </p:cNvPr>
+          <p:cNvSpPr/>
+          <p:nvPr/>
+        </p:nvSpPr>
+        <p:spPr>
+          <a:xfrm rot="2562045">
+            <a:off x="4235150" y="563218"/>
+            <a:ext cx="79505" cy="162622"/>
+          </a:xfrm>
+          <a:prstGeom prst="ellipse">
+            <a:avLst/>
+          </a:prstGeom>
+          <a:solidFill>
+            <a:srgbClr val="E67E38"/>
+          </a:solidFill>
+          <a:ln>
+            <a:noFill/>
+          </a:ln>
+        </p:spPr>
+        <p:style>
+          <a:lnRef idx="2">
+            <a:schemeClr val="accent1">
+              <a:shade val="50000"/>
+            </a:schemeClr>
+          </a:lnRef>
+          <a:fillRef idx="1">
+            <a:schemeClr val="accent1"/>
+          </a:fillRef>
+          <a:effectRef idx="0">
+            <a:schemeClr val="accent1"/>
+          </a:effectRef>
+          <a:fontRef idx="minor">
+            <a:schemeClr val="lt1"/>
+          </a:fontRef>
+        </p:style>
+        <p:txBody>
+          <a:bodyPr rtlCol="0" anchor="ctr"/>
+          <a:lstStyle/>
+          <a:p>
+            <a:pPr algn="ctr"/>
+            <a:endParaRPr lang="en-US"/>
+          </a:p>
+        </p:txBody>
+      </p:sp>
+      <p:sp>
+        <p:nvSpPr>
+          <p:cNvPr id="84" name="Rectangle 83">
+            <a:extLst>
+              <a:ext uri="{FF2B5EF4-FFF2-40B4-BE49-F238E27FC236}">
+                <a16:creationId xmlns:a16="http://schemas.microsoft.com/office/drawing/2014/main" id="{151691F9-74D7-A649-851F-FD0849102165}"/>
+              </a:ext>
+            </a:extLst>
+          </p:cNvPr>
+          <p:cNvSpPr/>
+          <p:nvPr/>
+        </p:nvSpPr>
+        <p:spPr>
+          <a:xfrm>
+            <a:off x="4636252" y="478858"/>
+            <a:ext cx="494106" cy="376397"/>
+          </a:xfrm>
+          <a:prstGeom prst="rect">
+            <a:avLst/>
+          </a:prstGeom>
+          <a:solidFill>
+            <a:schemeClr val="bg1"/>
+          </a:solidFill>
+          <a:ln>
+            <a:solidFill>
+              <a:srgbClr val="C00000"/>
+            </a:solidFill>
+          </a:ln>
+        </p:spPr>
+        <p:style>
+          <a:lnRef idx="2">
+            <a:schemeClr val="accent1">
+              <a:shade val="50000"/>
+            </a:schemeClr>
+          </a:lnRef>
+          <a:fillRef idx="1">
+            <a:schemeClr val="accent1"/>
+          </a:fillRef>
+          <a:effectRef idx="0">
+            <a:schemeClr val="accent1"/>
+          </a:effectRef>
+          <a:fontRef idx="minor">
+            <a:schemeClr val="lt1"/>
+          </a:fontRef>
+        </p:style>
+        <p:txBody>
+          <a:bodyPr rtlCol="0" anchor="ctr"/>
+          <a:lstStyle/>
+          <a:p>
+            <a:pPr algn="ctr"/>
+            <a:endParaRPr lang="en-US">
+              <a:latin typeface="Avenir Book" panose="02000503020000020003" pitchFamily="2" charset="0"/>
+            </a:endParaRPr>
+          </a:p>
+        </p:txBody>
+      </p:sp>
+      <p:sp>
+        <p:nvSpPr>
+          <p:cNvPr id="85" name="Rectangle 84">
+            <a:extLst>
+              <a:ext uri="{FF2B5EF4-FFF2-40B4-BE49-F238E27FC236}">
+                <a16:creationId xmlns:a16="http://schemas.microsoft.com/office/drawing/2014/main" id="{9155B420-9097-F342-AD51-0151D72EA0E2}"/>
+              </a:ext>
+            </a:extLst>
+          </p:cNvPr>
+          <p:cNvSpPr/>
+          <p:nvPr/>
+        </p:nvSpPr>
+        <p:spPr>
+          <a:xfrm>
+            <a:off x="5182122" y="478858"/>
+            <a:ext cx="494106" cy="376397"/>
+          </a:xfrm>
+          <a:prstGeom prst="rect">
+            <a:avLst/>
+          </a:prstGeom>
+          <a:solidFill>
+            <a:schemeClr val="bg1"/>
+          </a:solidFill>
+          <a:ln>
+            <a:solidFill>
+              <a:srgbClr val="C00000"/>
+            </a:solidFill>
+          </a:ln>
+        </p:spPr>
+        <p:style>
+          <a:lnRef idx="2">
+            <a:schemeClr val="accent1">
+              <a:shade val="50000"/>
+            </a:schemeClr>
+          </a:lnRef>
+          <a:fillRef idx="1">
+            <a:schemeClr val="accent1"/>
+          </a:fillRef>
+          <a:effectRef idx="0">
+            <a:schemeClr val="accent1"/>
+          </a:effectRef>
+          <a:fontRef idx="minor">
+            <a:schemeClr val="lt1"/>
+          </a:fontRef>
+        </p:style>
+        <p:txBody>
+          <a:bodyPr rtlCol="0" anchor="ctr"/>
+          <a:lstStyle/>
+          <a:p>
+            <a:pPr algn="ctr"/>
+            <a:endParaRPr lang="en-US">
+              <a:latin typeface="Avenir Book" panose="02000503020000020003" pitchFamily="2" charset="0"/>
+            </a:endParaRPr>
+          </a:p>
+        </p:txBody>
+      </p:sp>
+      <p:sp>
+        <p:nvSpPr>
+          <p:cNvPr id="86" name="Rectangle 85">
+            <a:extLst>
+              <a:ext uri="{FF2B5EF4-FFF2-40B4-BE49-F238E27FC236}">
+                <a16:creationId xmlns:a16="http://schemas.microsoft.com/office/drawing/2014/main" id="{D64AC4CD-7351-F647-81F2-5FA7E6DF5AF9}"/>
+              </a:ext>
+            </a:extLst>
+          </p:cNvPr>
+          <p:cNvSpPr/>
+          <p:nvPr/>
+        </p:nvSpPr>
+        <p:spPr>
+          <a:xfrm>
+            <a:off x="5719663" y="478858"/>
+            <a:ext cx="494106" cy="376397"/>
+          </a:xfrm>
+          <a:prstGeom prst="rect">
+            <a:avLst/>
+          </a:prstGeom>
+          <a:solidFill>
+            <a:schemeClr val="bg1"/>
+          </a:solidFill>
+          <a:ln>
+            <a:solidFill>
+              <a:srgbClr val="C00000"/>
+            </a:solidFill>
+          </a:ln>
+        </p:spPr>
+        <p:style>
+          <a:lnRef idx="2">
+            <a:schemeClr val="accent1">
+              <a:shade val="50000"/>
+            </a:schemeClr>
+          </a:lnRef>
+          <a:fillRef idx="1">
+            <a:schemeClr val="accent1"/>
+          </a:fillRef>
+          <a:effectRef idx="0">
+            <a:schemeClr val="accent1"/>
+          </a:effectRef>
+          <a:fontRef idx="minor">
+            <a:schemeClr val="lt1"/>
+          </a:fontRef>
+        </p:style>
+        <p:txBody>
+          <a:bodyPr rtlCol="0" anchor="ctr"/>
+          <a:lstStyle/>
+          <a:p>
+            <a:pPr algn="ctr"/>
+            <a:endParaRPr lang="en-US">
+              <a:latin typeface="Avenir Book" panose="02000503020000020003" pitchFamily="2" charset="0"/>
+            </a:endParaRPr>
+          </a:p>
+        </p:txBody>
+      </p:sp>
+      <p:sp>
+        <p:nvSpPr>
+          <p:cNvPr id="87" name="Oval 86">
+            <a:extLst>
+              <a:ext uri="{FF2B5EF4-FFF2-40B4-BE49-F238E27FC236}">
+                <a16:creationId xmlns:a16="http://schemas.microsoft.com/office/drawing/2014/main" id="{2E7A0F9F-4E23-864D-A025-C6346D9904CB}"/>
+              </a:ext>
+            </a:extLst>
+          </p:cNvPr>
+          <p:cNvSpPr/>
+          <p:nvPr/>
+        </p:nvSpPr>
+        <p:spPr>
+          <a:xfrm rot="2562045">
+            <a:off x="4377052" y="521176"/>
+            <a:ext cx="79505" cy="162622"/>
+          </a:xfrm>
+          <a:prstGeom prst="ellipse">
+            <a:avLst/>
+          </a:prstGeom>
+          <a:solidFill>
+            <a:schemeClr val="accent4"/>
+          </a:solidFill>
+          <a:ln>
+            <a:noFill/>
+          </a:ln>
+        </p:spPr>
+        <p:style>
+          <a:lnRef idx="2">
+            <a:schemeClr val="accent1">
+              <a:shade val="50000"/>
+            </a:schemeClr>
+          </a:lnRef>
+          <a:fillRef idx="1">
+            <a:schemeClr val="accent1"/>
+          </a:fillRef>
+          <a:effectRef idx="0">
+            <a:schemeClr val="accent1"/>
+          </a:effectRef>
+          <a:fontRef idx="minor">
+            <a:schemeClr val="lt1"/>
+          </a:fontRef>
+        </p:style>
+        <p:txBody>
+          <a:bodyPr rtlCol="0" anchor="ctr"/>
+          <a:lstStyle/>
+          <a:p>
+            <a:pPr algn="ctr"/>
+            <a:endParaRPr lang="en-US"/>
+          </a:p>
+        </p:txBody>
+      </p:sp>
+      <p:sp>
+        <p:nvSpPr>
+          <p:cNvPr id="88" name="Oval 87">
+            <a:extLst>
+              <a:ext uri="{FF2B5EF4-FFF2-40B4-BE49-F238E27FC236}">
+                <a16:creationId xmlns:a16="http://schemas.microsoft.com/office/drawing/2014/main" id="{4AE143A9-B1E1-374E-B72D-489D34BEB9A0}"/>
+              </a:ext>
+            </a:extLst>
+          </p:cNvPr>
+          <p:cNvSpPr/>
+          <p:nvPr/>
+        </p:nvSpPr>
+        <p:spPr>
+          <a:xfrm rot="2562045">
+            <a:off x="4336845" y="655407"/>
+            <a:ext cx="79505" cy="162622"/>
+          </a:xfrm>
+          <a:prstGeom prst="ellipse">
+            <a:avLst/>
+          </a:prstGeom>
+          <a:solidFill>
+            <a:srgbClr val="7030A0"/>
+          </a:solidFill>
+          <a:ln>
+            <a:noFill/>
+          </a:ln>
+        </p:spPr>
+        <p:style>
+          <a:lnRef idx="2">
+            <a:schemeClr val="accent1">
+              <a:shade val="50000"/>
+            </a:schemeClr>
+          </a:lnRef>
+          <a:fillRef idx="1">
+            <a:schemeClr val="accent1"/>
+          </a:fillRef>
+          <a:effectRef idx="0">
+            <a:schemeClr val="accent1"/>
+          </a:effectRef>
+          <a:fontRef idx="minor">
+            <a:schemeClr val="lt1"/>
+          </a:fontRef>
+        </p:style>
+        <p:txBody>
+          <a:bodyPr rtlCol="0" anchor="ctr"/>
+          <a:lstStyle/>
+          <a:p>
+            <a:pPr algn="ctr"/>
+            <a:endParaRPr lang="en-US"/>
+          </a:p>
+        </p:txBody>
+      </p:sp>
+      <p:sp>
+        <p:nvSpPr>
+          <p:cNvPr id="89" name="Oval 88">
+            <a:extLst>
+              <a:ext uri="{FF2B5EF4-FFF2-40B4-BE49-F238E27FC236}">
+                <a16:creationId xmlns:a16="http://schemas.microsoft.com/office/drawing/2014/main" id="{782258EA-2131-0F47-ABF6-0A31FCCD4DA1}"/>
+              </a:ext>
+            </a:extLst>
+          </p:cNvPr>
+          <p:cNvSpPr/>
+          <p:nvPr/>
+        </p:nvSpPr>
+        <p:spPr>
+          <a:xfrm rot="2562045">
+            <a:off x="4773535" y="569853"/>
+            <a:ext cx="79505" cy="162622"/>
+          </a:xfrm>
+          <a:prstGeom prst="ellipse">
+            <a:avLst/>
+          </a:prstGeom>
+          <a:solidFill>
+            <a:srgbClr val="7030A0"/>
+          </a:solidFill>
+          <a:ln>
+            <a:noFill/>
+          </a:ln>
+        </p:spPr>
+        <p:style>
+          <a:lnRef idx="2">
+            <a:schemeClr val="accent1">
+              <a:shade val="50000"/>
+            </a:schemeClr>
+          </a:lnRef>
+          <a:fillRef idx="1">
+            <a:schemeClr val="accent1"/>
+          </a:fillRef>
+          <a:effectRef idx="0">
+            <a:schemeClr val="accent1"/>
+          </a:effectRef>
+          <a:fontRef idx="minor">
+            <a:schemeClr val="lt1"/>
+          </a:fontRef>
+        </p:style>
+        <p:txBody>
+          <a:bodyPr rtlCol="0" anchor="ctr"/>
+          <a:lstStyle/>
+          <a:p>
+            <a:pPr algn="ctr"/>
+            <a:endParaRPr lang="en-US"/>
+          </a:p>
+        </p:txBody>
+      </p:sp>
+      <p:sp>
+        <p:nvSpPr>
+          <p:cNvPr id="90" name="Oval 89">
+            <a:extLst>
+              <a:ext uri="{FF2B5EF4-FFF2-40B4-BE49-F238E27FC236}">
+                <a16:creationId xmlns:a16="http://schemas.microsoft.com/office/drawing/2014/main" id="{120C5A83-B17C-5B45-ABEF-E7A5514B2330}"/>
+              </a:ext>
+            </a:extLst>
+          </p:cNvPr>
+          <p:cNvSpPr/>
+          <p:nvPr/>
+        </p:nvSpPr>
+        <p:spPr>
+          <a:xfrm rot="2562045">
+            <a:off x="4915437" y="527811"/>
+            <a:ext cx="79505" cy="162622"/>
+          </a:xfrm>
+          <a:prstGeom prst="ellipse">
+            <a:avLst/>
+          </a:prstGeom>
+          <a:solidFill>
+            <a:srgbClr val="7030A0"/>
+          </a:solidFill>
+          <a:ln>
+            <a:noFill/>
+          </a:ln>
+        </p:spPr>
+        <p:style>
+          <a:lnRef idx="2">
+            <a:schemeClr val="accent1">
+              <a:shade val="50000"/>
+            </a:schemeClr>
+          </a:lnRef>
+          <a:fillRef idx="1">
+            <a:schemeClr val="accent1"/>
+          </a:fillRef>
+          <a:effectRef idx="0">
+            <a:schemeClr val="accent1"/>
+          </a:effectRef>
+          <a:fontRef idx="minor">
+            <a:schemeClr val="lt1"/>
+          </a:fontRef>
+        </p:style>
+        <p:txBody>
+          <a:bodyPr rtlCol="0" anchor="ctr"/>
+          <a:lstStyle/>
+          <a:p>
+            <a:pPr algn="ctr"/>
+            <a:endParaRPr lang="en-US"/>
+          </a:p>
+        </p:txBody>
+      </p:sp>
+      <p:sp>
+        <p:nvSpPr>
+          <p:cNvPr id="91" name="Oval 90">
+            <a:extLst>
+              <a:ext uri="{FF2B5EF4-FFF2-40B4-BE49-F238E27FC236}">
+                <a16:creationId xmlns:a16="http://schemas.microsoft.com/office/drawing/2014/main" id="{39A12B0A-42FB-7945-B7BC-B659D3065AE0}"/>
+              </a:ext>
+            </a:extLst>
+          </p:cNvPr>
+          <p:cNvSpPr/>
+          <p:nvPr/>
+        </p:nvSpPr>
+        <p:spPr>
+          <a:xfrm rot="2562045">
+            <a:off x="4875230" y="662042"/>
+            <a:ext cx="79505" cy="162622"/>
+          </a:xfrm>
+          <a:prstGeom prst="ellipse">
+            <a:avLst/>
+          </a:prstGeom>
+          <a:solidFill>
+            <a:srgbClr val="7030A0"/>
+          </a:solidFill>
+          <a:ln>
+            <a:noFill/>
+          </a:ln>
+        </p:spPr>
+        <p:style>
+          <a:lnRef idx="2">
+            <a:schemeClr val="accent1">
+              <a:shade val="50000"/>
+            </a:schemeClr>
+          </a:lnRef>
+          <a:fillRef idx="1">
+            <a:schemeClr val="accent1"/>
+          </a:fillRef>
+          <a:effectRef idx="0">
+            <a:schemeClr val="accent1"/>
+          </a:effectRef>
+          <a:fontRef idx="minor">
+            <a:schemeClr val="lt1"/>
+          </a:fontRef>
+        </p:style>
+        <p:txBody>
+          <a:bodyPr rtlCol="0" anchor="ctr"/>
+          <a:lstStyle/>
+          <a:p>
+            <a:pPr algn="ctr"/>
+            <a:endParaRPr lang="en-US"/>
+          </a:p>
+        </p:txBody>
+      </p:sp>
+      <p:sp>
+        <p:nvSpPr>
+          <p:cNvPr id="92" name="Oval 91">
+            <a:extLst>
+              <a:ext uri="{FF2B5EF4-FFF2-40B4-BE49-F238E27FC236}">
+                <a16:creationId xmlns:a16="http://schemas.microsoft.com/office/drawing/2014/main" id="{BFC57BA3-EA46-C147-A185-6C80F4DF0A76}"/>
+              </a:ext>
+            </a:extLst>
+          </p:cNvPr>
+          <p:cNvSpPr/>
+          <p:nvPr/>
+        </p:nvSpPr>
+        <p:spPr>
+          <a:xfrm rot="2562045">
+            <a:off x="5305814" y="569854"/>
+            <a:ext cx="79505" cy="162622"/>
+          </a:xfrm>
+          <a:prstGeom prst="ellipse">
+            <a:avLst/>
+          </a:prstGeom>
+          <a:solidFill>
+            <a:srgbClr val="7F7F7F"/>
+          </a:solidFill>
+          <a:ln>
+            <a:noFill/>
+          </a:ln>
+        </p:spPr>
+        <p:style>
+          <a:lnRef idx="2">
+            <a:schemeClr val="accent1">
+              <a:shade val="50000"/>
+            </a:schemeClr>
+          </a:lnRef>
+          <a:fillRef idx="1">
+            <a:schemeClr val="accent1"/>
+          </a:fillRef>
+          <a:effectRef idx="0">
+            <a:schemeClr val="accent1"/>
+          </a:effectRef>
+          <a:fontRef idx="minor">
+            <a:schemeClr val="lt1"/>
+          </a:fontRef>
+        </p:style>
+        <p:txBody>
+          <a:bodyPr rtlCol="0" anchor="ctr"/>
+          <a:lstStyle/>
+          <a:p>
+            <a:pPr algn="ctr"/>
+            <a:endParaRPr lang="en-US"/>
+          </a:p>
+        </p:txBody>
+      </p:sp>
+      <p:sp>
+        <p:nvSpPr>
+          <p:cNvPr id="93" name="Oval 92">
+            <a:extLst>
+              <a:ext uri="{FF2B5EF4-FFF2-40B4-BE49-F238E27FC236}">
+                <a16:creationId xmlns:a16="http://schemas.microsoft.com/office/drawing/2014/main" id="{4FAF3B25-FC8D-0841-BA4D-6E219045557D}"/>
+              </a:ext>
+            </a:extLst>
+          </p:cNvPr>
+          <p:cNvSpPr/>
+          <p:nvPr/>
+        </p:nvSpPr>
+        <p:spPr>
+          <a:xfrm rot="2562045">
+            <a:off x="5447716" y="527812"/>
+            <a:ext cx="79505" cy="162622"/>
+          </a:xfrm>
+          <a:prstGeom prst="ellipse">
+            <a:avLst/>
+          </a:prstGeom>
+          <a:solidFill>
+            <a:srgbClr val="7F7F7F"/>
+          </a:solidFill>
+          <a:ln>
+            <a:noFill/>
+          </a:ln>
+        </p:spPr>
+        <p:style>
+          <a:lnRef idx="2">
+            <a:schemeClr val="accent1">
+              <a:shade val="50000"/>
+            </a:schemeClr>
+          </a:lnRef>
+          <a:fillRef idx="1">
+            <a:schemeClr val="accent1"/>
+          </a:fillRef>
+          <a:effectRef idx="0">
+            <a:schemeClr val="accent1"/>
+          </a:effectRef>
+          <a:fontRef idx="minor">
+            <a:schemeClr val="lt1"/>
+          </a:fontRef>
+        </p:style>
+        <p:txBody>
+          <a:bodyPr rtlCol="0" anchor="ctr"/>
+          <a:lstStyle/>
+          <a:p>
+            <a:pPr algn="ctr"/>
+            <a:endParaRPr lang="en-US"/>
+          </a:p>
+        </p:txBody>
+      </p:sp>
+      <p:sp>
+        <p:nvSpPr>
+          <p:cNvPr id="94" name="Oval 93">
+            <a:extLst>
+              <a:ext uri="{FF2B5EF4-FFF2-40B4-BE49-F238E27FC236}">
+                <a16:creationId xmlns:a16="http://schemas.microsoft.com/office/drawing/2014/main" id="{CFD9B2EF-33D5-E54F-B9C8-62C623997504}"/>
+              </a:ext>
+            </a:extLst>
+          </p:cNvPr>
+          <p:cNvSpPr/>
+          <p:nvPr/>
+        </p:nvSpPr>
+        <p:spPr>
+          <a:xfrm rot="2562045">
+            <a:off x="5407509" y="662043"/>
+            <a:ext cx="79505" cy="162622"/>
+          </a:xfrm>
+          <a:prstGeom prst="ellipse">
+            <a:avLst/>
+          </a:prstGeom>
+          <a:solidFill>
+            <a:srgbClr val="7F7F7F"/>
+          </a:solidFill>
+          <a:ln>
+            <a:noFill/>
+          </a:ln>
+        </p:spPr>
+        <p:style>
+          <a:lnRef idx="2">
+            <a:schemeClr val="accent1">
+              <a:shade val="50000"/>
+            </a:schemeClr>
+          </a:lnRef>
+          <a:fillRef idx="1">
+            <a:schemeClr val="accent1"/>
+          </a:fillRef>
+          <a:effectRef idx="0">
+            <a:schemeClr val="accent1"/>
+          </a:effectRef>
+          <a:fontRef idx="minor">
+            <a:schemeClr val="lt1"/>
+          </a:fontRef>
+        </p:style>
+        <p:txBody>
+          <a:bodyPr rtlCol="0" anchor="ctr"/>
+          <a:lstStyle/>
+          <a:p>
+            <a:pPr algn="ctr"/>
+            <a:endParaRPr lang="en-US"/>
+          </a:p>
+        </p:txBody>
+      </p:sp>
+      <p:sp>
+        <p:nvSpPr>
+          <p:cNvPr id="95" name="Oval 94">
+            <a:extLst>
+              <a:ext uri="{FF2B5EF4-FFF2-40B4-BE49-F238E27FC236}">
+                <a16:creationId xmlns:a16="http://schemas.microsoft.com/office/drawing/2014/main" id="{A292A81A-4EC2-1145-AB43-8E1688823DB5}"/>
+              </a:ext>
+            </a:extLst>
+          </p:cNvPr>
+          <p:cNvSpPr/>
+          <p:nvPr/>
+        </p:nvSpPr>
+        <p:spPr>
+          <a:xfrm rot="2562045">
+            <a:off x="5832809" y="572157"/>
+            <a:ext cx="79505" cy="162622"/>
+          </a:xfrm>
+          <a:prstGeom prst="ellipse">
+            <a:avLst/>
+          </a:prstGeom>
+          <a:solidFill>
+            <a:srgbClr val="F8C219"/>
+          </a:solidFill>
+          <a:ln>
+            <a:noFill/>
+          </a:ln>
+        </p:spPr>
+        <p:style>
+          <a:lnRef idx="2">
+            <a:schemeClr val="accent1">
+              <a:shade val="50000"/>
+            </a:schemeClr>
+          </a:lnRef>
+          <a:fillRef idx="1">
+            <a:schemeClr val="accent1"/>
+          </a:fillRef>
+          <a:effectRef idx="0">
+            <a:schemeClr val="accent1"/>
+          </a:effectRef>
+          <a:fontRef idx="minor">
+            <a:schemeClr val="lt1"/>
+          </a:fontRef>
+        </p:style>
+        <p:txBody>
+          <a:bodyPr rtlCol="0" anchor="ctr"/>
+          <a:lstStyle/>
+          <a:p>
+            <a:pPr algn="ctr"/>
+            <a:endParaRPr lang="en-US"/>
+          </a:p>
+        </p:txBody>
+      </p:sp>
+      <p:sp>
+        <p:nvSpPr>
+          <p:cNvPr id="96" name="Oval 95">
+            <a:extLst>
+              <a:ext uri="{FF2B5EF4-FFF2-40B4-BE49-F238E27FC236}">
+                <a16:creationId xmlns:a16="http://schemas.microsoft.com/office/drawing/2014/main" id="{FD92E987-56B2-114B-829E-0F526820B14D}"/>
+              </a:ext>
+            </a:extLst>
+          </p:cNvPr>
+          <p:cNvSpPr/>
+          <p:nvPr/>
+        </p:nvSpPr>
+        <p:spPr>
+          <a:xfrm rot="2562045">
+            <a:off x="5974711" y="530115"/>
+            <a:ext cx="79505" cy="162622"/>
+          </a:xfrm>
+          <a:prstGeom prst="ellipse">
+            <a:avLst/>
+          </a:prstGeom>
+          <a:solidFill>
+            <a:srgbClr val="F8C219"/>
+          </a:solidFill>
+          <a:ln>
+            <a:noFill/>
+          </a:ln>
+        </p:spPr>
+        <p:style>
+          <a:lnRef idx="2">
+            <a:schemeClr val="accent1">
+              <a:shade val="50000"/>
+            </a:schemeClr>
+          </a:lnRef>
+          <a:fillRef idx="1">
+            <a:schemeClr val="accent1"/>
+          </a:fillRef>
+          <a:effectRef idx="0">
+            <a:schemeClr val="accent1"/>
+          </a:effectRef>
+          <a:fontRef idx="minor">
+            <a:schemeClr val="lt1"/>
+          </a:fontRef>
+        </p:style>
+        <p:txBody>
+          <a:bodyPr rtlCol="0" anchor="ctr"/>
+          <a:lstStyle/>
+          <a:p>
+            <a:pPr algn="ctr"/>
+            <a:endParaRPr lang="en-US"/>
+          </a:p>
+        </p:txBody>
+      </p:sp>
+      <p:sp>
+        <p:nvSpPr>
+          <p:cNvPr id="97" name="Oval 96">
+            <a:extLst>
+              <a:ext uri="{FF2B5EF4-FFF2-40B4-BE49-F238E27FC236}">
+                <a16:creationId xmlns:a16="http://schemas.microsoft.com/office/drawing/2014/main" id="{A611C628-2118-6E46-AEC7-8748A9B1E7C9}"/>
+              </a:ext>
+            </a:extLst>
+          </p:cNvPr>
+          <p:cNvSpPr/>
+          <p:nvPr/>
+        </p:nvSpPr>
+        <p:spPr>
+          <a:xfrm rot="2562045">
+            <a:off x="5934504" y="664346"/>
+            <a:ext cx="79505" cy="162622"/>
+          </a:xfrm>
+          <a:prstGeom prst="ellipse">
+            <a:avLst/>
+          </a:prstGeom>
+          <a:solidFill>
+            <a:srgbClr val="F8C219"/>
+          </a:solidFill>
+          <a:ln>
+            <a:noFill/>
+          </a:ln>
+        </p:spPr>
+        <p:style>
+          <a:lnRef idx="2">
+            <a:schemeClr val="accent1">
+              <a:shade val="50000"/>
+            </a:schemeClr>
+          </a:lnRef>
+          <a:fillRef idx="1">
+            <a:schemeClr val="accent1"/>
+          </a:fillRef>
+          <a:effectRef idx="0">
+            <a:schemeClr val="accent1"/>
+          </a:effectRef>
+          <a:fontRef idx="minor">
+            <a:schemeClr val="lt1"/>
+          </a:fontRef>
+        </p:style>
+        <p:txBody>
+          <a:bodyPr rtlCol="0" anchor="ctr"/>
+          <a:lstStyle/>
+          <a:p>
+            <a:pPr algn="ctr"/>
+            <a:endParaRPr lang="en-US"/>
+          </a:p>
+        </p:txBody>
+      </p:sp>
+      <p:sp>
+        <p:nvSpPr>
+          <p:cNvPr id="98" name="Rectangle 97">
+            <a:extLst>
+              <a:ext uri="{FF2B5EF4-FFF2-40B4-BE49-F238E27FC236}">
+                <a16:creationId xmlns:a16="http://schemas.microsoft.com/office/drawing/2014/main" id="{F6D6EE2B-0A71-5E44-8717-5EB666A82BF3}"/>
+              </a:ext>
+            </a:extLst>
+          </p:cNvPr>
+          <p:cNvSpPr/>
+          <p:nvPr/>
+        </p:nvSpPr>
+        <p:spPr>
+          <a:xfrm>
+            <a:off x="4091583" y="1824556"/>
+            <a:ext cx="346605" cy="798873"/>
+          </a:xfrm>
+          <a:prstGeom prst="rect">
+            <a:avLst/>
+          </a:prstGeom>
+          <a:solidFill>
+            <a:schemeClr val="bg1"/>
+          </a:solidFill>
+          <a:ln>
+            <a:solidFill>
+              <a:srgbClr val="C00000"/>
+            </a:solidFill>
+          </a:ln>
+        </p:spPr>
+        <p:style>
+          <a:lnRef idx="2">
+            <a:schemeClr val="accent1">
+              <a:shade val="50000"/>
+            </a:schemeClr>
+          </a:lnRef>
+          <a:fillRef idx="1">
+            <a:schemeClr val="accent1"/>
+          </a:fillRef>
+          <a:effectRef idx="0">
+            <a:schemeClr val="accent1"/>
+          </a:effectRef>
+          <a:fontRef idx="minor">
+            <a:schemeClr val="lt1"/>
+          </a:fontRef>
+        </p:style>
+        <p:txBody>
+          <a:bodyPr rtlCol="0" anchor="ctr"/>
+          <a:lstStyle/>
+          <a:p>
+            <a:pPr algn="ctr"/>
+            <a:endParaRPr lang="en-US">
+              <a:latin typeface="Avenir Book" panose="02000503020000020003" pitchFamily="2" charset="0"/>
+            </a:endParaRPr>
+          </a:p>
+        </p:txBody>
+      </p:sp>
+      <p:sp>
+        <p:nvSpPr>
+          <p:cNvPr id="99" name="Rectangle 98">
+            <a:extLst>
+              <a:ext uri="{FF2B5EF4-FFF2-40B4-BE49-F238E27FC236}">
+                <a16:creationId xmlns:a16="http://schemas.microsoft.com/office/drawing/2014/main" id="{C20A2F3A-C0A1-9345-8D7F-DBA8D7159D9E}"/>
+              </a:ext>
+            </a:extLst>
+          </p:cNvPr>
+          <p:cNvSpPr/>
+          <p:nvPr/>
+        </p:nvSpPr>
+        <p:spPr>
+          <a:xfrm>
+            <a:off x="4141575" y="1861903"/>
+            <a:ext cx="90826" cy="90826"/>
+          </a:xfrm>
+          <a:prstGeom prst="rect">
+            <a:avLst/>
+          </a:prstGeom>
+          <a:solidFill>
+            <a:srgbClr val="E67E38"/>
+          </a:solidFill>
+          <a:ln>
+            <a:noFill/>
+          </a:ln>
+        </p:spPr>
+        <p:style>
+          <a:lnRef idx="2">
+            <a:schemeClr val="accent1">
+              <a:shade val="50000"/>
+            </a:schemeClr>
+          </a:lnRef>
+          <a:fillRef idx="1">
+            <a:schemeClr val="accent1"/>
+          </a:fillRef>
+          <a:effectRef idx="0">
+            <a:schemeClr val="accent1"/>
+          </a:effectRef>
+          <a:fontRef idx="minor">
+            <a:schemeClr val="lt1"/>
+          </a:fontRef>
+        </p:style>
+        <p:txBody>
+          <a:bodyPr rtlCol="0" anchor="ctr"/>
+          <a:lstStyle/>
+          <a:p>
+            <a:pPr algn="ctr"/>
+            <a:endParaRPr lang="en-US"/>
+          </a:p>
+        </p:txBody>
+      </p:sp>
+      <p:sp>
+        <p:nvSpPr>
+          <p:cNvPr id="100" name="Rectangle 99">
+            <a:extLst>
+              <a:ext uri="{FF2B5EF4-FFF2-40B4-BE49-F238E27FC236}">
+                <a16:creationId xmlns:a16="http://schemas.microsoft.com/office/drawing/2014/main" id="{FACFC8A8-4AE5-4643-95D3-BBDE76D7C094}"/>
+              </a:ext>
+            </a:extLst>
+          </p:cNvPr>
+          <p:cNvSpPr/>
+          <p:nvPr/>
+        </p:nvSpPr>
+        <p:spPr>
+          <a:xfrm>
+            <a:off x="4299424" y="1861903"/>
+            <a:ext cx="90826" cy="90826"/>
+          </a:xfrm>
+          <a:prstGeom prst="rect">
+            <a:avLst/>
+          </a:prstGeom>
+          <a:ln>
+            <a:noFill/>
+          </a:ln>
+        </p:spPr>
+        <p:style>
+          <a:lnRef idx="2">
+            <a:schemeClr val="accent1">
+              <a:shade val="50000"/>
+            </a:schemeClr>
+          </a:lnRef>
+          <a:fillRef idx="1">
+            <a:schemeClr val="accent1"/>
+          </a:fillRef>
+          <a:effectRef idx="0">
+            <a:schemeClr val="accent1"/>
+          </a:effectRef>
+          <a:fontRef idx="minor">
+            <a:schemeClr val="lt1"/>
+          </a:fontRef>
+        </p:style>
+        <p:txBody>
+          <a:bodyPr rtlCol="0" anchor="ctr"/>
+          <a:lstStyle/>
+          <a:p>
+            <a:pPr algn="ctr"/>
+            <a:endParaRPr lang="en-US"/>
+          </a:p>
+        </p:txBody>
+      </p:sp>
+      <p:sp>
+        <p:nvSpPr>
+          <p:cNvPr id="101" name="Rectangle 100">
+            <a:extLst>
+              <a:ext uri="{FF2B5EF4-FFF2-40B4-BE49-F238E27FC236}">
+                <a16:creationId xmlns:a16="http://schemas.microsoft.com/office/drawing/2014/main" id="{9177D8E2-31E7-684D-9C48-E529D12AA0F5}"/>
+              </a:ext>
+            </a:extLst>
+          </p:cNvPr>
+          <p:cNvSpPr/>
+          <p:nvPr/>
+        </p:nvSpPr>
+        <p:spPr>
+          <a:xfrm>
+            <a:off x="4141575" y="2022247"/>
+            <a:ext cx="90826" cy="90826"/>
+          </a:xfrm>
+          <a:prstGeom prst="rect">
+            <a:avLst/>
+          </a:prstGeom>
+          <a:solidFill>
+            <a:schemeClr val="accent6"/>
+          </a:solidFill>
+          <a:ln>
+            <a:noFill/>
+          </a:ln>
+        </p:spPr>
+        <p:style>
+          <a:lnRef idx="2">
+            <a:schemeClr val="accent1">
+              <a:shade val="50000"/>
+            </a:schemeClr>
+          </a:lnRef>
+          <a:fillRef idx="1">
+            <a:schemeClr val="accent1"/>
+          </a:fillRef>
+          <a:effectRef idx="0">
+            <a:schemeClr val="accent1"/>
+          </a:effectRef>
+          <a:fontRef idx="minor">
+            <a:schemeClr val="lt1"/>
+          </a:fontRef>
+        </p:style>
+        <p:txBody>
+          <a:bodyPr rtlCol="0" anchor="ctr"/>
+          <a:lstStyle/>
+          <a:p>
+            <a:pPr algn="ctr"/>
+            <a:endParaRPr lang="en-US"/>
+          </a:p>
+        </p:txBody>
+      </p:sp>
+      <p:sp>
+        <p:nvSpPr>
+          <p:cNvPr id="102" name="Rectangle 101">
+            <a:extLst>
+              <a:ext uri="{FF2B5EF4-FFF2-40B4-BE49-F238E27FC236}">
+                <a16:creationId xmlns:a16="http://schemas.microsoft.com/office/drawing/2014/main" id="{A0FAA814-9117-2F4D-96DB-A170E6ABD318}"/>
+              </a:ext>
+            </a:extLst>
+          </p:cNvPr>
+          <p:cNvSpPr/>
+          <p:nvPr/>
+        </p:nvSpPr>
+        <p:spPr>
+          <a:xfrm>
+            <a:off x="4299424" y="2022247"/>
+            <a:ext cx="90826" cy="90826"/>
+          </a:xfrm>
+          <a:prstGeom prst="rect">
+            <a:avLst/>
+          </a:prstGeom>
+          <a:solidFill>
+            <a:srgbClr val="7124A0"/>
+          </a:solidFill>
+          <a:ln>
+            <a:noFill/>
+          </a:ln>
+        </p:spPr>
+        <p:style>
+          <a:lnRef idx="2">
+            <a:schemeClr val="accent1">
+              <a:shade val="50000"/>
+            </a:schemeClr>
+          </a:lnRef>
+          <a:fillRef idx="1">
+            <a:schemeClr val="accent1"/>
+          </a:fillRef>
+          <a:effectRef idx="0">
+            <a:schemeClr val="accent1"/>
+          </a:effectRef>
+          <a:fontRef idx="minor">
+            <a:schemeClr val="lt1"/>
+          </a:fontRef>
+        </p:style>
+        <p:txBody>
+          <a:bodyPr rtlCol="0" anchor="ctr"/>
+          <a:lstStyle/>
+          <a:p>
+            <a:pPr algn="ctr"/>
+            <a:endParaRPr lang="en-US"/>
+          </a:p>
+        </p:txBody>
+      </p:sp>
+      <p:sp>
+        <p:nvSpPr>
+          <p:cNvPr id="103" name="Rectangle 102">
+            <a:extLst>
+              <a:ext uri="{FF2B5EF4-FFF2-40B4-BE49-F238E27FC236}">
+                <a16:creationId xmlns:a16="http://schemas.microsoft.com/office/drawing/2014/main" id="{2BE94B8A-8733-2C42-BEFD-6185595A7518}"/>
+              </a:ext>
+            </a:extLst>
+          </p:cNvPr>
+          <p:cNvSpPr/>
+          <p:nvPr/>
+        </p:nvSpPr>
+        <p:spPr>
+          <a:xfrm>
+            <a:off x="4141575" y="2182591"/>
+            <a:ext cx="90826" cy="90826"/>
+          </a:xfrm>
+          <a:prstGeom prst="rect">
+            <a:avLst/>
+          </a:prstGeom>
+          <a:solidFill>
+            <a:srgbClr val="7F7F7F"/>
+          </a:solidFill>
+          <a:ln>
+            <a:noFill/>
+          </a:ln>
+        </p:spPr>
+        <p:style>
+          <a:lnRef idx="2">
+            <a:schemeClr val="accent1">
+              <a:shade val="50000"/>
+            </a:schemeClr>
+          </a:lnRef>
+          <a:fillRef idx="1">
+            <a:schemeClr val="accent1"/>
+          </a:fillRef>
+          <a:effectRef idx="0">
+            <a:schemeClr val="accent1"/>
+          </a:effectRef>
+          <a:fontRef idx="minor">
+            <a:schemeClr val="lt1"/>
+          </a:fontRef>
+        </p:style>
+        <p:txBody>
+          <a:bodyPr rtlCol="0" anchor="ctr"/>
+          <a:lstStyle/>
+          <a:p>
+            <a:pPr algn="ctr"/>
+            <a:endParaRPr lang="en-US"/>
+          </a:p>
+        </p:txBody>
+      </p:sp>
+      <p:sp>
+        <p:nvSpPr>
+          <p:cNvPr id="104" name="Rectangle 103">
+            <a:extLst>
+              <a:ext uri="{FF2B5EF4-FFF2-40B4-BE49-F238E27FC236}">
+                <a16:creationId xmlns:a16="http://schemas.microsoft.com/office/drawing/2014/main" id="{4C785318-907E-054C-A868-41F7414D9445}"/>
+              </a:ext>
+            </a:extLst>
+          </p:cNvPr>
+          <p:cNvSpPr/>
+          <p:nvPr/>
+        </p:nvSpPr>
+        <p:spPr>
+          <a:xfrm>
+            <a:off x="4299424" y="2182591"/>
+            <a:ext cx="90826" cy="90826"/>
+          </a:xfrm>
+          <a:prstGeom prst="rect">
+            <a:avLst/>
+          </a:prstGeom>
+          <a:solidFill>
+            <a:schemeClr val="accent4"/>
+          </a:solidFill>
+          <a:ln>
+            <a:noFill/>
+          </a:ln>
+        </p:spPr>
+        <p:style>
+          <a:lnRef idx="2">
+            <a:schemeClr val="accent1">
+              <a:shade val="50000"/>
+            </a:schemeClr>
+          </a:lnRef>
+          <a:fillRef idx="1">
+            <a:schemeClr val="accent1"/>
+          </a:fillRef>
+          <a:effectRef idx="0">
+            <a:schemeClr val="accent1"/>
+          </a:effectRef>
+          <a:fontRef idx="minor">
+            <a:schemeClr val="lt1"/>
+          </a:fontRef>
+        </p:style>
+        <p:txBody>
+          <a:bodyPr rtlCol="0" anchor="ctr"/>
+          <a:lstStyle/>
+          <a:p>
+            <a:pPr algn="ctr"/>
+            <a:endParaRPr lang="en-US"/>
+          </a:p>
+        </p:txBody>
+      </p:sp>
+      <p:sp>
+        <p:nvSpPr>
+          <p:cNvPr id="105" name="Rectangle 104">
+            <a:extLst>
+              <a:ext uri="{FF2B5EF4-FFF2-40B4-BE49-F238E27FC236}">
+                <a16:creationId xmlns:a16="http://schemas.microsoft.com/office/drawing/2014/main" id="{88069885-CC28-4B4A-A985-039B36A97034}"/>
+              </a:ext>
+            </a:extLst>
+          </p:cNvPr>
+          <p:cNvSpPr/>
+          <p:nvPr/>
+        </p:nvSpPr>
+        <p:spPr>
+          <a:xfrm>
+            <a:off x="4141575" y="2342935"/>
+            <a:ext cx="90826" cy="90826"/>
+          </a:xfrm>
+          <a:prstGeom prst="rect">
+            <a:avLst/>
+          </a:prstGeom>
+          <a:solidFill>
+            <a:schemeClr val="accent1">
+              <a:lumMod val="20000"/>
+              <a:lumOff val="80000"/>
+            </a:schemeClr>
+          </a:solidFill>
+          <a:ln>
+            <a:noFill/>
+          </a:ln>
+        </p:spPr>
+        <p:style>
+          <a:lnRef idx="2">
+            <a:schemeClr val="accent1">
+              <a:shade val="50000"/>
+            </a:schemeClr>
+          </a:lnRef>
+          <a:fillRef idx="1">
+            <a:schemeClr val="accent1"/>
+          </a:fillRef>
+          <a:effectRef idx="0">
+            <a:schemeClr val="accent1"/>
+          </a:effectRef>
+          <a:fontRef idx="minor">
+            <a:schemeClr val="lt1"/>
+          </a:fontRef>
+        </p:style>
+        <p:txBody>
+          <a:bodyPr rtlCol="0" anchor="ctr"/>
+          <a:lstStyle/>
+          <a:p>
+            <a:pPr algn="ctr"/>
+            <a:endParaRPr lang="en-US"/>
+          </a:p>
+        </p:txBody>
+      </p:sp>
+      <p:sp>
+        <p:nvSpPr>
+          <p:cNvPr id="106" name="Rectangle 105">
+            <a:extLst>
+              <a:ext uri="{FF2B5EF4-FFF2-40B4-BE49-F238E27FC236}">
+                <a16:creationId xmlns:a16="http://schemas.microsoft.com/office/drawing/2014/main" id="{F9E99BFA-B1E5-AE43-9C14-4485F43CE620}"/>
+              </a:ext>
+            </a:extLst>
+          </p:cNvPr>
+          <p:cNvSpPr/>
+          <p:nvPr/>
+        </p:nvSpPr>
+        <p:spPr>
+          <a:xfrm>
+            <a:off x="4299424" y="2342935"/>
+            <a:ext cx="90826" cy="90826"/>
+          </a:xfrm>
+          <a:prstGeom prst="rect">
+            <a:avLst/>
+          </a:prstGeom>
+          <a:solidFill>
+            <a:schemeClr val="tx1">
+              <a:lumMod val="85000"/>
+              <a:lumOff val="15000"/>
+            </a:schemeClr>
+          </a:solidFill>
+          <a:ln>
+            <a:noFill/>
+          </a:ln>
+        </p:spPr>
+        <p:style>
+          <a:lnRef idx="2">
+            <a:schemeClr val="accent1">
+              <a:shade val="50000"/>
+            </a:schemeClr>
+          </a:lnRef>
+          <a:fillRef idx="1">
+            <a:schemeClr val="accent1"/>
+          </a:fillRef>
+          <a:effectRef idx="0">
+            <a:schemeClr val="accent1"/>
+          </a:effectRef>
+          <a:fontRef idx="minor">
+            <a:schemeClr val="lt1"/>
+          </a:fontRef>
+        </p:style>
+        <p:txBody>
+          <a:bodyPr rtlCol="0" anchor="ctr"/>
+          <a:lstStyle/>
+          <a:p>
+            <a:pPr algn="ctr"/>
+            <a:endParaRPr lang="en-US"/>
+          </a:p>
+        </p:txBody>
+      </p:sp>
+      <p:sp>
+        <p:nvSpPr>
+          <p:cNvPr id="107" name="Rectangle 106">
+            <a:extLst>
+              <a:ext uri="{FF2B5EF4-FFF2-40B4-BE49-F238E27FC236}">
+                <a16:creationId xmlns:a16="http://schemas.microsoft.com/office/drawing/2014/main" id="{326CCAF4-6BA3-ED4D-9B38-39D3FC1D4A39}"/>
+              </a:ext>
+            </a:extLst>
+          </p:cNvPr>
+          <p:cNvSpPr/>
+          <p:nvPr/>
+        </p:nvSpPr>
+        <p:spPr>
+          <a:xfrm>
+            <a:off x="4141575" y="2503280"/>
+            <a:ext cx="90826" cy="90826"/>
+          </a:xfrm>
+          <a:prstGeom prst="rect">
+            <a:avLst/>
+          </a:prstGeom>
+          <a:solidFill>
+            <a:schemeClr val="accent2">
+              <a:lumMod val="40000"/>
+              <a:lumOff val="60000"/>
+            </a:schemeClr>
+          </a:solidFill>
+          <a:ln>
+            <a:noFill/>
+          </a:ln>
+        </p:spPr>
+        <p:style>
+          <a:lnRef idx="2">
+            <a:schemeClr val="accent1">
+              <a:shade val="50000"/>
+            </a:schemeClr>
+          </a:lnRef>
+          <a:fillRef idx="1">
+            <a:schemeClr val="accent1"/>
+          </a:fillRef>
+          <a:effectRef idx="0">
+            <a:schemeClr val="accent1"/>
+          </a:effectRef>
+          <a:fontRef idx="minor">
+            <a:schemeClr val="lt1"/>
+          </a:fontRef>
+        </p:style>
+        <p:txBody>
+          <a:bodyPr rtlCol="0" anchor="ctr"/>
+          <a:lstStyle/>
+          <a:p>
+            <a:pPr algn="ctr"/>
+            <a:endParaRPr lang="en-US"/>
+          </a:p>
+        </p:txBody>
+      </p:sp>
+      <p:sp>
+        <p:nvSpPr>
+          <p:cNvPr id="108" name="Rectangle 107">
+            <a:extLst>
+              <a:ext uri="{FF2B5EF4-FFF2-40B4-BE49-F238E27FC236}">
+                <a16:creationId xmlns:a16="http://schemas.microsoft.com/office/drawing/2014/main" id="{2AF22C70-EB5B-6D47-802B-679FC81E2C16}"/>
+              </a:ext>
+            </a:extLst>
+          </p:cNvPr>
+          <p:cNvSpPr/>
+          <p:nvPr/>
+        </p:nvSpPr>
+        <p:spPr>
+          <a:xfrm>
+            <a:off x="4299424" y="2503280"/>
+            <a:ext cx="90826" cy="90826"/>
+          </a:xfrm>
+          <a:prstGeom prst="rect">
+            <a:avLst/>
+          </a:prstGeom>
+          <a:solidFill>
+            <a:srgbClr val="C00000"/>
+          </a:solidFill>
+          <a:ln>
+            <a:noFill/>
+          </a:ln>
+        </p:spPr>
+        <p:style>
+          <a:lnRef idx="2">
+            <a:schemeClr val="accent1">
+              <a:shade val="50000"/>
+            </a:schemeClr>
+          </a:lnRef>
+          <a:fillRef idx="1">
+            <a:schemeClr val="accent1"/>
+          </a:fillRef>
+          <a:effectRef idx="0">
+            <a:schemeClr val="accent1"/>
+          </a:effectRef>
+          <a:fontRef idx="minor">
+            <a:schemeClr val="lt1"/>
+          </a:fontRef>
+        </p:style>
+        <p:txBody>
+          <a:bodyPr rtlCol="0" anchor="ctr"/>
+          <a:lstStyle/>
+          <a:p>
+            <a:pPr algn="ctr"/>
+            <a:endParaRPr lang="en-US"/>
+          </a:p>
+        </p:txBody>
+      </p:sp>
+      <p:sp>
+        <p:nvSpPr>
+          <p:cNvPr id="109" name="Rectangle 108">
+            <a:extLst>
+              <a:ext uri="{FF2B5EF4-FFF2-40B4-BE49-F238E27FC236}">
+                <a16:creationId xmlns:a16="http://schemas.microsoft.com/office/drawing/2014/main" id="{503EB814-6A7C-704F-B410-8B817A271D02}"/>
+              </a:ext>
+            </a:extLst>
+          </p:cNvPr>
+          <p:cNvSpPr/>
+          <p:nvPr/>
+        </p:nvSpPr>
+        <p:spPr>
+          <a:xfrm>
+            <a:off x="4500718" y="1824556"/>
+            <a:ext cx="342753" cy="798873"/>
+          </a:xfrm>
+          <a:prstGeom prst="rect">
+            <a:avLst/>
+          </a:prstGeom>
+          <a:solidFill>
+            <a:schemeClr val="bg1"/>
+          </a:solidFill>
+          <a:ln>
+            <a:solidFill>
+              <a:srgbClr val="C00000"/>
+            </a:solidFill>
+          </a:ln>
+        </p:spPr>
+        <p:style>
+          <a:lnRef idx="2">
+            <a:schemeClr val="accent1">
+              <a:shade val="50000"/>
+            </a:schemeClr>
+          </a:lnRef>
+          <a:fillRef idx="1">
+            <a:schemeClr val="accent1"/>
+          </a:fillRef>
+          <a:effectRef idx="0">
+            <a:schemeClr val="accent1"/>
+          </a:effectRef>
+          <a:fontRef idx="minor">
+            <a:schemeClr val="lt1"/>
+          </a:fontRef>
+        </p:style>
+        <p:txBody>
+          <a:bodyPr rtlCol="0" anchor="ctr"/>
+          <a:lstStyle/>
+          <a:p>
+            <a:pPr algn="ctr"/>
+            <a:endParaRPr lang="en-US">
+              <a:latin typeface="Avenir Book" panose="02000503020000020003" pitchFamily="2" charset="0"/>
+            </a:endParaRPr>
+          </a:p>
+        </p:txBody>
+      </p:sp>
+      <p:sp>
+        <p:nvSpPr>
+          <p:cNvPr id="110" name="Rectangle 109">
+            <a:extLst>
+              <a:ext uri="{FF2B5EF4-FFF2-40B4-BE49-F238E27FC236}">
+                <a16:creationId xmlns:a16="http://schemas.microsoft.com/office/drawing/2014/main" id="{535DB666-4BC7-274F-B117-52F920E53D01}"/>
+              </a:ext>
+            </a:extLst>
+          </p:cNvPr>
+          <p:cNvSpPr/>
+          <p:nvPr/>
+        </p:nvSpPr>
+        <p:spPr>
+          <a:xfrm>
+            <a:off x="4557622" y="1861903"/>
+            <a:ext cx="90826" cy="90826"/>
+          </a:xfrm>
+          <a:prstGeom prst="rect">
+            <a:avLst/>
+          </a:prstGeom>
+          <a:solidFill>
+            <a:schemeClr val="accent1"/>
+          </a:solidFill>
+          <a:ln>
+            <a:noFill/>
+          </a:ln>
+        </p:spPr>
+        <p:style>
+          <a:lnRef idx="2">
+            <a:schemeClr val="accent1">
+              <a:shade val="50000"/>
+            </a:schemeClr>
+          </a:lnRef>
+          <a:fillRef idx="1">
+            <a:schemeClr val="accent1"/>
+          </a:fillRef>
+          <a:effectRef idx="0">
+            <a:schemeClr val="accent1"/>
+          </a:effectRef>
+          <a:fontRef idx="minor">
+            <a:schemeClr val="lt1"/>
+          </a:fontRef>
+        </p:style>
+        <p:txBody>
+          <a:bodyPr rtlCol="0" anchor="ctr"/>
+          <a:lstStyle/>
+          <a:p>
+            <a:pPr algn="ctr"/>
+            <a:endParaRPr lang="en-US"/>
+          </a:p>
+        </p:txBody>
+      </p:sp>
+      <p:sp>
+        <p:nvSpPr>
+          <p:cNvPr id="111" name="Rectangle 110">
+            <a:extLst>
+              <a:ext uri="{FF2B5EF4-FFF2-40B4-BE49-F238E27FC236}">
+                <a16:creationId xmlns:a16="http://schemas.microsoft.com/office/drawing/2014/main" id="{9FCDD2B3-3B8A-4446-9179-E62E91EF6EC8}"/>
+              </a:ext>
+            </a:extLst>
+          </p:cNvPr>
+          <p:cNvSpPr/>
+          <p:nvPr/>
+        </p:nvSpPr>
+        <p:spPr>
+          <a:xfrm>
+            <a:off x="4705311" y="1861903"/>
+            <a:ext cx="90826" cy="90826"/>
+          </a:xfrm>
+          <a:prstGeom prst="rect">
+            <a:avLst/>
+          </a:prstGeom>
+          <a:solidFill>
+            <a:schemeClr val="accent1"/>
+          </a:solidFill>
+          <a:ln>
+            <a:noFill/>
+          </a:ln>
+        </p:spPr>
+        <p:style>
+          <a:lnRef idx="2">
+            <a:schemeClr val="accent1">
+              <a:shade val="50000"/>
+            </a:schemeClr>
+          </a:lnRef>
+          <a:fillRef idx="1">
+            <a:schemeClr val="accent1"/>
+          </a:fillRef>
+          <a:effectRef idx="0">
+            <a:schemeClr val="accent1"/>
+          </a:effectRef>
+          <a:fontRef idx="minor">
+            <a:schemeClr val="lt1"/>
+          </a:fontRef>
+        </p:style>
+        <p:txBody>
+          <a:bodyPr rtlCol="0" anchor="ctr"/>
+          <a:lstStyle/>
+          <a:p>
+            <a:pPr algn="ctr"/>
+            <a:endParaRPr lang="en-US"/>
+          </a:p>
+        </p:txBody>
+      </p:sp>
+      <p:sp>
+        <p:nvSpPr>
+          <p:cNvPr id="112" name="Rectangle 111">
+            <a:extLst>
+              <a:ext uri="{FF2B5EF4-FFF2-40B4-BE49-F238E27FC236}">
+                <a16:creationId xmlns:a16="http://schemas.microsoft.com/office/drawing/2014/main" id="{DD33327A-658B-8B4A-81DE-E84088731873}"/>
+              </a:ext>
+            </a:extLst>
+          </p:cNvPr>
+          <p:cNvSpPr/>
+          <p:nvPr/>
+        </p:nvSpPr>
+        <p:spPr>
+          <a:xfrm>
+            <a:off x="4557622" y="2022247"/>
+            <a:ext cx="90826" cy="90826"/>
+          </a:xfrm>
+          <a:prstGeom prst="rect">
+            <a:avLst/>
+          </a:prstGeom>
+          <a:solidFill>
+            <a:schemeClr val="accent1"/>
+          </a:solidFill>
+          <a:ln>
+            <a:noFill/>
+          </a:ln>
+        </p:spPr>
+        <p:style>
+          <a:lnRef idx="2">
+            <a:schemeClr val="accent1">
+              <a:shade val="50000"/>
+            </a:schemeClr>
+          </a:lnRef>
+          <a:fillRef idx="1">
+            <a:schemeClr val="accent1"/>
+          </a:fillRef>
+          <a:effectRef idx="0">
+            <a:schemeClr val="accent1"/>
+          </a:effectRef>
+          <a:fontRef idx="minor">
+            <a:schemeClr val="lt1"/>
+          </a:fontRef>
+        </p:style>
+        <p:txBody>
+          <a:bodyPr rtlCol="0" anchor="ctr"/>
+          <a:lstStyle/>
+          <a:p>
+            <a:pPr algn="ctr"/>
+            <a:endParaRPr lang="en-US"/>
+          </a:p>
+        </p:txBody>
+      </p:sp>
+      <p:sp>
+        <p:nvSpPr>
+          <p:cNvPr id="113" name="Rectangle 112">
+            <a:extLst>
+              <a:ext uri="{FF2B5EF4-FFF2-40B4-BE49-F238E27FC236}">
+                <a16:creationId xmlns:a16="http://schemas.microsoft.com/office/drawing/2014/main" id="{56E91A03-4D02-294C-A63C-36B93121EDD6}"/>
+              </a:ext>
+            </a:extLst>
+          </p:cNvPr>
+          <p:cNvSpPr/>
+          <p:nvPr/>
+        </p:nvSpPr>
+        <p:spPr>
+          <a:xfrm>
+            <a:off x="4705311" y="2022247"/>
+            <a:ext cx="90826" cy="90826"/>
+          </a:xfrm>
+          <a:prstGeom prst="rect">
+            <a:avLst/>
+          </a:prstGeom>
+          <a:solidFill>
+            <a:schemeClr val="accent1"/>
+          </a:solidFill>
+          <a:ln>
+            <a:noFill/>
+          </a:ln>
+        </p:spPr>
+        <p:style>
+          <a:lnRef idx="2">
+            <a:schemeClr val="accent1">
+              <a:shade val="50000"/>
+            </a:schemeClr>
+          </a:lnRef>
+          <a:fillRef idx="1">
+            <a:schemeClr val="accent1"/>
+          </a:fillRef>
+          <a:effectRef idx="0">
+            <a:schemeClr val="accent1"/>
+          </a:effectRef>
+          <a:fontRef idx="minor">
+            <a:schemeClr val="lt1"/>
+          </a:fontRef>
+        </p:style>
+        <p:txBody>
+          <a:bodyPr rtlCol="0" anchor="ctr"/>
+          <a:lstStyle/>
+          <a:p>
+            <a:pPr algn="ctr"/>
+            <a:endParaRPr lang="en-US"/>
+          </a:p>
+        </p:txBody>
+      </p:sp>
+      <p:sp>
+        <p:nvSpPr>
+          <p:cNvPr id="114" name="Rectangle 113">
+            <a:extLst>
+              <a:ext uri="{FF2B5EF4-FFF2-40B4-BE49-F238E27FC236}">
+                <a16:creationId xmlns:a16="http://schemas.microsoft.com/office/drawing/2014/main" id="{3D751314-1E90-884E-9E0F-EB03F194ACD2}"/>
+              </a:ext>
+            </a:extLst>
+          </p:cNvPr>
+          <p:cNvSpPr/>
+          <p:nvPr/>
+        </p:nvSpPr>
+        <p:spPr>
+          <a:xfrm>
+            <a:off x="4557622" y="2182591"/>
+            <a:ext cx="90826" cy="90826"/>
+          </a:xfrm>
+          <a:prstGeom prst="rect">
+            <a:avLst/>
+          </a:prstGeom>
+          <a:solidFill>
+            <a:schemeClr val="accent1"/>
+          </a:solidFill>
+          <a:ln>
+            <a:noFill/>
+          </a:ln>
+        </p:spPr>
+        <p:style>
+          <a:lnRef idx="2">
+            <a:schemeClr val="accent1">
+              <a:shade val="50000"/>
+            </a:schemeClr>
+          </a:lnRef>
+          <a:fillRef idx="1">
+            <a:schemeClr val="accent1"/>
+          </a:fillRef>
+          <a:effectRef idx="0">
+            <a:schemeClr val="accent1"/>
+          </a:effectRef>
+          <a:fontRef idx="minor">
+            <a:schemeClr val="lt1"/>
+          </a:fontRef>
+        </p:style>
+        <p:txBody>
+          <a:bodyPr rtlCol="0" anchor="ctr"/>
+          <a:lstStyle/>
+          <a:p>
+            <a:pPr algn="ctr"/>
+            <a:endParaRPr lang="en-US"/>
+          </a:p>
+        </p:txBody>
+      </p:sp>
+      <p:sp>
+        <p:nvSpPr>
+          <p:cNvPr id="115" name="Rectangle 114">
+            <a:extLst>
+              <a:ext uri="{FF2B5EF4-FFF2-40B4-BE49-F238E27FC236}">
+                <a16:creationId xmlns:a16="http://schemas.microsoft.com/office/drawing/2014/main" id="{D2DE7619-5807-8A49-A2EF-5EC9129F703A}"/>
+              </a:ext>
+            </a:extLst>
+          </p:cNvPr>
+          <p:cNvSpPr/>
+          <p:nvPr/>
+        </p:nvSpPr>
+        <p:spPr>
+          <a:xfrm>
+            <a:off x="4705311" y="2182591"/>
+            <a:ext cx="90826" cy="90826"/>
+          </a:xfrm>
+          <a:prstGeom prst="rect">
+            <a:avLst/>
+          </a:prstGeom>
+          <a:solidFill>
+            <a:schemeClr val="accent1"/>
+          </a:solidFill>
+          <a:ln>
+            <a:noFill/>
+          </a:ln>
+        </p:spPr>
+        <p:style>
+          <a:lnRef idx="2">
+            <a:schemeClr val="accent1">
+              <a:shade val="50000"/>
+            </a:schemeClr>
+          </a:lnRef>
+          <a:fillRef idx="1">
+            <a:schemeClr val="accent1"/>
+          </a:fillRef>
+          <a:effectRef idx="0">
+            <a:schemeClr val="accent1"/>
+          </a:effectRef>
+          <a:fontRef idx="minor">
+            <a:schemeClr val="lt1"/>
+          </a:fontRef>
+        </p:style>
+        <p:txBody>
+          <a:bodyPr rtlCol="0" anchor="ctr"/>
+          <a:lstStyle/>
+          <a:p>
+            <a:pPr algn="ctr"/>
+            <a:endParaRPr lang="en-US"/>
+          </a:p>
+        </p:txBody>
+      </p:sp>
+      <p:sp>
+        <p:nvSpPr>
+          <p:cNvPr id="116" name="Rectangle 115">
+            <a:extLst>
+              <a:ext uri="{FF2B5EF4-FFF2-40B4-BE49-F238E27FC236}">
+                <a16:creationId xmlns:a16="http://schemas.microsoft.com/office/drawing/2014/main" id="{C8174E66-1649-2049-8A33-213AD2837191}"/>
+              </a:ext>
+            </a:extLst>
+          </p:cNvPr>
+          <p:cNvSpPr/>
+          <p:nvPr/>
+        </p:nvSpPr>
+        <p:spPr>
+          <a:xfrm>
+            <a:off x="4557622" y="2342935"/>
+            <a:ext cx="90826" cy="90826"/>
+          </a:xfrm>
+          <a:prstGeom prst="rect">
+            <a:avLst/>
+          </a:prstGeom>
+          <a:solidFill>
+            <a:schemeClr val="accent1"/>
+          </a:solidFill>
+          <a:ln>
+            <a:noFill/>
+          </a:ln>
+        </p:spPr>
+        <p:style>
+          <a:lnRef idx="2">
+            <a:schemeClr val="accent1">
+              <a:shade val="50000"/>
+            </a:schemeClr>
+          </a:lnRef>
+          <a:fillRef idx="1">
+            <a:schemeClr val="accent1"/>
+          </a:fillRef>
+          <a:effectRef idx="0">
+            <a:schemeClr val="accent1"/>
+          </a:effectRef>
+          <a:fontRef idx="minor">
+            <a:schemeClr val="lt1"/>
+          </a:fontRef>
+        </p:style>
+        <p:txBody>
+          <a:bodyPr rtlCol="0" anchor="ctr"/>
+          <a:lstStyle/>
+          <a:p>
+            <a:pPr algn="ctr"/>
+            <a:endParaRPr lang="en-US"/>
+          </a:p>
+        </p:txBody>
+      </p:sp>
+      <p:sp>
+        <p:nvSpPr>
+          <p:cNvPr id="117" name="Rectangle 116">
+            <a:extLst>
+              <a:ext uri="{FF2B5EF4-FFF2-40B4-BE49-F238E27FC236}">
+                <a16:creationId xmlns:a16="http://schemas.microsoft.com/office/drawing/2014/main" id="{9AEF7CF0-3900-9D4E-AD0B-60DB25400F39}"/>
+              </a:ext>
+            </a:extLst>
+          </p:cNvPr>
+          <p:cNvSpPr/>
+          <p:nvPr/>
+        </p:nvSpPr>
+        <p:spPr>
+          <a:xfrm>
+            <a:off x="4705311" y="2342935"/>
+            <a:ext cx="90826" cy="90826"/>
+          </a:xfrm>
+          <a:prstGeom prst="rect">
+            <a:avLst/>
+          </a:prstGeom>
+          <a:solidFill>
+            <a:schemeClr val="accent1"/>
+          </a:solidFill>
+          <a:ln>
+            <a:noFill/>
+          </a:ln>
+        </p:spPr>
+        <p:style>
+          <a:lnRef idx="2">
+            <a:schemeClr val="accent1">
+              <a:shade val="50000"/>
+            </a:schemeClr>
+          </a:lnRef>
+          <a:fillRef idx="1">
+            <a:schemeClr val="accent1"/>
+          </a:fillRef>
+          <a:effectRef idx="0">
+            <a:schemeClr val="accent1"/>
+          </a:effectRef>
+          <a:fontRef idx="minor">
+            <a:schemeClr val="lt1"/>
+          </a:fontRef>
+        </p:style>
+        <p:txBody>
+          <a:bodyPr rtlCol="0" anchor="ctr"/>
+          <a:lstStyle/>
+          <a:p>
+            <a:pPr algn="ctr"/>
+            <a:endParaRPr lang="en-US"/>
+          </a:p>
+        </p:txBody>
+      </p:sp>
+      <p:sp>
+        <p:nvSpPr>
+          <p:cNvPr id="119" name="Rectangle 118">
+            <a:extLst>
+              <a:ext uri="{FF2B5EF4-FFF2-40B4-BE49-F238E27FC236}">
+                <a16:creationId xmlns:a16="http://schemas.microsoft.com/office/drawing/2014/main" id="{424E3653-6C1D-5344-BA54-651F5478369C}"/>
+              </a:ext>
+            </a:extLst>
+          </p:cNvPr>
+          <p:cNvSpPr/>
+          <p:nvPr/>
+        </p:nvSpPr>
+        <p:spPr>
+          <a:xfrm>
+            <a:off x="4557622" y="2503280"/>
+            <a:ext cx="90826" cy="90826"/>
+          </a:xfrm>
+          <a:prstGeom prst="rect">
+            <a:avLst/>
+          </a:prstGeom>
+          <a:solidFill>
+            <a:schemeClr val="accent1"/>
+          </a:solidFill>
+          <a:ln>
+            <a:noFill/>
+          </a:ln>
+        </p:spPr>
+        <p:style>
+          <a:lnRef idx="2">
+            <a:schemeClr val="accent1">
+              <a:shade val="50000"/>
+            </a:schemeClr>
+          </a:lnRef>
+          <a:fillRef idx="1">
+            <a:schemeClr val="accent1"/>
+          </a:fillRef>
+          <a:effectRef idx="0">
+            <a:schemeClr val="accent1"/>
+          </a:effectRef>
+          <a:fontRef idx="minor">
+            <a:schemeClr val="lt1"/>
+          </a:fontRef>
+        </p:style>
+        <p:txBody>
+          <a:bodyPr rtlCol="0" anchor="ctr"/>
+          <a:lstStyle/>
+          <a:p>
+            <a:pPr algn="ctr"/>
+            <a:endParaRPr lang="en-US"/>
+          </a:p>
+        </p:txBody>
+      </p:sp>
+      <p:sp>
+        <p:nvSpPr>
+          <p:cNvPr id="120" name="Rectangle 119">
+            <a:extLst>
+              <a:ext uri="{FF2B5EF4-FFF2-40B4-BE49-F238E27FC236}">
+                <a16:creationId xmlns:a16="http://schemas.microsoft.com/office/drawing/2014/main" id="{05626A7E-770D-C242-9238-655541C18501}"/>
+              </a:ext>
+            </a:extLst>
+          </p:cNvPr>
+          <p:cNvSpPr/>
+          <p:nvPr/>
+        </p:nvSpPr>
+        <p:spPr>
+          <a:xfrm>
+            <a:off x="4705311" y="2503280"/>
+            <a:ext cx="90826" cy="90826"/>
+          </a:xfrm>
+          <a:prstGeom prst="rect">
+            <a:avLst/>
+          </a:prstGeom>
+          <a:solidFill>
+            <a:schemeClr val="accent1"/>
+          </a:solidFill>
+          <a:ln>
+            <a:noFill/>
+          </a:ln>
+        </p:spPr>
+        <p:style>
+          <a:lnRef idx="2">
+            <a:schemeClr val="accent1">
+              <a:shade val="50000"/>
+            </a:schemeClr>
+          </a:lnRef>
+          <a:fillRef idx="1">
+            <a:schemeClr val="accent1"/>
+          </a:fillRef>
+          <a:effectRef idx="0">
+            <a:schemeClr val="accent1"/>
+          </a:effectRef>
+          <a:fontRef idx="minor">
+            <a:schemeClr val="lt1"/>
+          </a:fontRef>
+        </p:style>
+        <p:txBody>
+          <a:bodyPr rtlCol="0" anchor="ctr"/>
+          <a:lstStyle/>
+          <a:p>
+            <a:pPr algn="ctr"/>
+            <a:endParaRPr lang="en-US"/>
+          </a:p>
+        </p:txBody>
+      </p:sp>
+      <p:sp>
+        <p:nvSpPr>
+          <p:cNvPr id="121" name="Rectangle 120">
+            <a:extLst>
+              <a:ext uri="{FF2B5EF4-FFF2-40B4-BE49-F238E27FC236}">
+                <a16:creationId xmlns:a16="http://schemas.microsoft.com/office/drawing/2014/main" id="{15C2F8BC-CC4E-CC4B-8DB4-80F5C0F2C155}"/>
+              </a:ext>
+            </a:extLst>
+          </p:cNvPr>
+          <p:cNvSpPr/>
+          <p:nvPr/>
+        </p:nvSpPr>
+        <p:spPr>
+          <a:xfrm>
+            <a:off x="4906001" y="1824556"/>
+            <a:ext cx="342753" cy="798873"/>
+          </a:xfrm>
+          <a:prstGeom prst="rect">
+            <a:avLst/>
+          </a:prstGeom>
+          <a:solidFill>
+            <a:schemeClr val="bg1"/>
+          </a:solidFill>
+          <a:ln>
+            <a:solidFill>
+              <a:srgbClr val="C00000"/>
+            </a:solidFill>
+          </a:ln>
+        </p:spPr>
+        <p:style>
+          <a:lnRef idx="2">
+            <a:schemeClr val="accent1">
+              <a:shade val="50000"/>
+            </a:schemeClr>
+          </a:lnRef>
+          <a:fillRef idx="1">
+            <a:schemeClr val="accent1"/>
+          </a:fillRef>
+          <a:effectRef idx="0">
+            <a:schemeClr val="accent1"/>
+          </a:effectRef>
+          <a:fontRef idx="minor">
+            <a:schemeClr val="lt1"/>
+          </a:fontRef>
+        </p:style>
+        <p:txBody>
+          <a:bodyPr rtlCol="0" anchor="ctr"/>
+          <a:lstStyle/>
+          <a:p>
+            <a:pPr algn="ctr"/>
+            <a:endParaRPr lang="en-US">
+              <a:latin typeface="Avenir Book" panose="02000503020000020003" pitchFamily="2" charset="0"/>
+            </a:endParaRPr>
+          </a:p>
+        </p:txBody>
+      </p:sp>
+      <p:sp>
+        <p:nvSpPr>
+          <p:cNvPr id="122" name="Rectangle 121">
+            <a:extLst>
+              <a:ext uri="{FF2B5EF4-FFF2-40B4-BE49-F238E27FC236}">
+                <a16:creationId xmlns:a16="http://schemas.microsoft.com/office/drawing/2014/main" id="{2764EABD-29B3-CB4A-BD49-915F21175211}"/>
+              </a:ext>
+            </a:extLst>
+          </p:cNvPr>
+          <p:cNvSpPr/>
+          <p:nvPr/>
+        </p:nvSpPr>
+        <p:spPr>
+          <a:xfrm>
+            <a:off x="4959657" y="1861903"/>
+            <a:ext cx="90826" cy="90826"/>
+          </a:xfrm>
+          <a:prstGeom prst="rect">
+            <a:avLst/>
+          </a:prstGeom>
+          <a:solidFill>
+            <a:schemeClr val="accent6"/>
+          </a:solidFill>
+          <a:ln>
+            <a:noFill/>
+          </a:ln>
+        </p:spPr>
+        <p:style>
+          <a:lnRef idx="2">
+            <a:schemeClr val="accent1">
+              <a:shade val="50000"/>
+            </a:schemeClr>
+          </a:lnRef>
+          <a:fillRef idx="1">
+            <a:schemeClr val="accent1"/>
+          </a:fillRef>
+          <a:effectRef idx="0">
+            <a:schemeClr val="accent1"/>
+          </a:effectRef>
+          <a:fontRef idx="minor">
+            <a:schemeClr val="lt1"/>
+          </a:fontRef>
+        </p:style>
+        <p:txBody>
+          <a:bodyPr rtlCol="0" anchor="ctr"/>
+          <a:lstStyle/>
+          <a:p>
+            <a:pPr algn="ctr"/>
+            <a:endParaRPr lang="en-US"/>
+          </a:p>
+        </p:txBody>
+      </p:sp>
+      <p:sp>
+        <p:nvSpPr>
+          <p:cNvPr id="123" name="Rectangle 122">
+            <a:extLst>
+              <a:ext uri="{FF2B5EF4-FFF2-40B4-BE49-F238E27FC236}">
+                <a16:creationId xmlns:a16="http://schemas.microsoft.com/office/drawing/2014/main" id="{B58BB5ED-C896-D14A-80D6-43790EC35061}"/>
+              </a:ext>
+            </a:extLst>
+          </p:cNvPr>
+          <p:cNvSpPr/>
+          <p:nvPr/>
+        </p:nvSpPr>
+        <p:spPr>
+          <a:xfrm>
+            <a:off x="5117506" y="1861903"/>
+            <a:ext cx="90826" cy="90826"/>
+          </a:xfrm>
+          <a:prstGeom prst="rect">
+            <a:avLst/>
+          </a:prstGeom>
+          <a:solidFill>
+            <a:schemeClr val="accent6"/>
+          </a:solidFill>
+          <a:ln>
+            <a:noFill/>
+          </a:ln>
+        </p:spPr>
+        <p:style>
+          <a:lnRef idx="2">
+            <a:schemeClr val="accent1">
+              <a:shade val="50000"/>
+            </a:schemeClr>
+          </a:lnRef>
+          <a:fillRef idx="1">
+            <a:schemeClr val="accent1"/>
+          </a:fillRef>
+          <a:effectRef idx="0">
+            <a:schemeClr val="accent1"/>
+          </a:effectRef>
+          <a:fontRef idx="minor">
+            <a:schemeClr val="lt1"/>
+          </a:fontRef>
+        </p:style>
+        <p:txBody>
+          <a:bodyPr rtlCol="0" anchor="ctr"/>
+          <a:lstStyle/>
+          <a:p>
+            <a:pPr algn="ctr"/>
+            <a:endParaRPr lang="en-US"/>
+          </a:p>
+        </p:txBody>
+      </p:sp>
+      <p:sp>
+        <p:nvSpPr>
+          <p:cNvPr id="124" name="Rectangle 123">
+            <a:extLst>
+              <a:ext uri="{FF2B5EF4-FFF2-40B4-BE49-F238E27FC236}">
+                <a16:creationId xmlns:a16="http://schemas.microsoft.com/office/drawing/2014/main" id="{AEA2923A-DB42-8745-9809-43357F7D4245}"/>
+              </a:ext>
+            </a:extLst>
+          </p:cNvPr>
+          <p:cNvSpPr/>
+          <p:nvPr/>
+        </p:nvSpPr>
+        <p:spPr>
+          <a:xfrm>
+            <a:off x="4959657" y="2022247"/>
+            <a:ext cx="90826" cy="90826"/>
+          </a:xfrm>
+          <a:prstGeom prst="rect">
+            <a:avLst/>
+          </a:prstGeom>
+          <a:solidFill>
+            <a:schemeClr val="accent6"/>
+          </a:solidFill>
+          <a:ln>
+            <a:noFill/>
+          </a:ln>
+        </p:spPr>
+        <p:style>
+          <a:lnRef idx="2">
+            <a:schemeClr val="accent1">
+              <a:shade val="50000"/>
+            </a:schemeClr>
+          </a:lnRef>
+          <a:fillRef idx="1">
+            <a:schemeClr val="accent1"/>
+          </a:fillRef>
+          <a:effectRef idx="0">
+            <a:schemeClr val="accent1"/>
+          </a:effectRef>
+          <a:fontRef idx="minor">
+            <a:schemeClr val="lt1"/>
+          </a:fontRef>
+        </p:style>
+        <p:txBody>
+          <a:bodyPr rtlCol="0" anchor="ctr"/>
+          <a:lstStyle/>
+          <a:p>
+            <a:pPr algn="ctr"/>
+            <a:endParaRPr lang="en-US"/>
+          </a:p>
+        </p:txBody>
+      </p:sp>
+      <p:sp>
+        <p:nvSpPr>
+          <p:cNvPr id="125" name="Rectangle 124">
+            <a:extLst>
+              <a:ext uri="{FF2B5EF4-FFF2-40B4-BE49-F238E27FC236}">
+                <a16:creationId xmlns:a16="http://schemas.microsoft.com/office/drawing/2014/main" id="{29059C62-619A-7148-BF61-CC70F0648F39}"/>
+              </a:ext>
+            </a:extLst>
+          </p:cNvPr>
+          <p:cNvSpPr/>
+          <p:nvPr/>
+        </p:nvSpPr>
+        <p:spPr>
+          <a:xfrm>
+            <a:off x="5117506" y="2022247"/>
+            <a:ext cx="90826" cy="90826"/>
+          </a:xfrm>
+          <a:prstGeom prst="rect">
+            <a:avLst/>
+          </a:prstGeom>
+          <a:solidFill>
+            <a:schemeClr val="accent6"/>
+          </a:solidFill>
+          <a:ln>
+            <a:noFill/>
+          </a:ln>
+        </p:spPr>
+        <p:style>
+          <a:lnRef idx="2">
+            <a:schemeClr val="accent1">
+              <a:shade val="50000"/>
+            </a:schemeClr>
+          </a:lnRef>
+          <a:fillRef idx="1">
+            <a:schemeClr val="accent1"/>
+          </a:fillRef>
+          <a:effectRef idx="0">
+            <a:schemeClr val="accent1"/>
+          </a:effectRef>
+          <a:fontRef idx="minor">
+            <a:schemeClr val="lt1"/>
+          </a:fontRef>
+        </p:style>
+        <p:txBody>
+          <a:bodyPr rtlCol="0" anchor="ctr"/>
+          <a:lstStyle/>
+          <a:p>
+            <a:pPr algn="ctr"/>
+            <a:endParaRPr lang="en-US"/>
+          </a:p>
+        </p:txBody>
+      </p:sp>
+      <p:sp>
+        <p:nvSpPr>
+          <p:cNvPr id="126" name="Rectangle 125">
+            <a:extLst>
+              <a:ext uri="{FF2B5EF4-FFF2-40B4-BE49-F238E27FC236}">
+                <a16:creationId xmlns:a16="http://schemas.microsoft.com/office/drawing/2014/main" id="{3C0FC4E4-207A-7C4B-B243-184AD51802B0}"/>
+              </a:ext>
+            </a:extLst>
+          </p:cNvPr>
+          <p:cNvSpPr/>
+          <p:nvPr/>
+        </p:nvSpPr>
+        <p:spPr>
+          <a:xfrm>
+            <a:off x="4959657" y="2182591"/>
+            <a:ext cx="90826" cy="90826"/>
+          </a:xfrm>
+          <a:prstGeom prst="rect">
+            <a:avLst/>
+          </a:prstGeom>
+          <a:solidFill>
+            <a:schemeClr val="accent6"/>
+          </a:solidFill>
+          <a:ln>
+            <a:noFill/>
+          </a:ln>
+        </p:spPr>
+        <p:style>
+          <a:lnRef idx="2">
+            <a:schemeClr val="accent1">
+              <a:shade val="50000"/>
+            </a:schemeClr>
+          </a:lnRef>
+          <a:fillRef idx="1">
+            <a:schemeClr val="accent1"/>
+          </a:fillRef>
+          <a:effectRef idx="0">
+            <a:schemeClr val="accent1"/>
+          </a:effectRef>
+          <a:fontRef idx="minor">
+            <a:schemeClr val="lt1"/>
+          </a:fontRef>
+        </p:style>
+        <p:txBody>
+          <a:bodyPr rtlCol="0" anchor="ctr"/>
+          <a:lstStyle/>
+          <a:p>
+            <a:pPr algn="ctr"/>
+            <a:endParaRPr lang="en-US"/>
+          </a:p>
+        </p:txBody>
+      </p:sp>
+      <p:sp>
+        <p:nvSpPr>
+          <p:cNvPr id="127" name="Rectangle 126">
+            <a:extLst>
+              <a:ext uri="{FF2B5EF4-FFF2-40B4-BE49-F238E27FC236}">
+                <a16:creationId xmlns:a16="http://schemas.microsoft.com/office/drawing/2014/main" id="{D46478E0-C289-C443-8528-8DECCE151675}"/>
+              </a:ext>
+            </a:extLst>
+          </p:cNvPr>
+          <p:cNvSpPr/>
+          <p:nvPr/>
+        </p:nvSpPr>
+        <p:spPr>
+          <a:xfrm>
+            <a:off x="5117506" y="2182591"/>
+            <a:ext cx="90826" cy="90826"/>
+          </a:xfrm>
+          <a:prstGeom prst="rect">
+            <a:avLst/>
+          </a:prstGeom>
+          <a:solidFill>
+            <a:schemeClr val="accent6"/>
+          </a:solidFill>
+          <a:ln>
+            <a:noFill/>
+          </a:ln>
+        </p:spPr>
+        <p:style>
+          <a:lnRef idx="2">
+            <a:schemeClr val="accent1">
+              <a:shade val="50000"/>
+            </a:schemeClr>
+          </a:lnRef>
+          <a:fillRef idx="1">
+            <a:schemeClr val="accent1"/>
+          </a:fillRef>
+          <a:effectRef idx="0">
+            <a:schemeClr val="accent1"/>
+          </a:effectRef>
+          <a:fontRef idx="minor">
+            <a:schemeClr val="lt1"/>
+          </a:fontRef>
+        </p:style>
+        <p:txBody>
+          <a:bodyPr rtlCol="0" anchor="ctr"/>
+          <a:lstStyle/>
+          <a:p>
+            <a:pPr algn="ctr"/>
+            <a:endParaRPr lang="en-US"/>
+          </a:p>
+        </p:txBody>
+      </p:sp>
+      <p:sp>
+        <p:nvSpPr>
+          <p:cNvPr id="130" name="Rectangle 129">
+            <a:extLst>
+              <a:ext uri="{FF2B5EF4-FFF2-40B4-BE49-F238E27FC236}">
+                <a16:creationId xmlns:a16="http://schemas.microsoft.com/office/drawing/2014/main" id="{8324D791-843D-DD4C-89A2-62C5CF041E72}"/>
+              </a:ext>
+            </a:extLst>
+          </p:cNvPr>
+          <p:cNvSpPr/>
+          <p:nvPr/>
+        </p:nvSpPr>
+        <p:spPr>
+          <a:xfrm>
+            <a:off x="4959657" y="2342935"/>
+            <a:ext cx="90826" cy="90826"/>
+          </a:xfrm>
+          <a:prstGeom prst="rect">
+            <a:avLst/>
+          </a:prstGeom>
+          <a:solidFill>
+            <a:schemeClr val="accent6"/>
+          </a:solidFill>
+          <a:ln>
+            <a:noFill/>
+          </a:ln>
+        </p:spPr>
+        <p:style>
+          <a:lnRef idx="2">
+            <a:schemeClr val="accent1">
+              <a:shade val="50000"/>
+            </a:schemeClr>
+          </a:lnRef>
+          <a:fillRef idx="1">
+            <a:schemeClr val="accent1"/>
+          </a:fillRef>
+          <a:effectRef idx="0">
+            <a:schemeClr val="accent1"/>
+          </a:effectRef>
+          <a:fontRef idx="minor">
+            <a:schemeClr val="lt1"/>
+          </a:fontRef>
+        </p:style>
+        <p:txBody>
+          <a:bodyPr rtlCol="0" anchor="ctr"/>
+          <a:lstStyle/>
+          <a:p>
+            <a:pPr algn="ctr"/>
+            <a:endParaRPr lang="en-US"/>
+          </a:p>
+        </p:txBody>
+      </p:sp>
+      <p:sp>
+        <p:nvSpPr>
+          <p:cNvPr id="131" name="Rectangle 130">
+            <a:extLst>
+              <a:ext uri="{FF2B5EF4-FFF2-40B4-BE49-F238E27FC236}">
+                <a16:creationId xmlns:a16="http://schemas.microsoft.com/office/drawing/2014/main" id="{78362B35-1616-8643-84A2-339AA7784DB1}"/>
+              </a:ext>
+            </a:extLst>
+          </p:cNvPr>
+          <p:cNvSpPr/>
+          <p:nvPr/>
+        </p:nvSpPr>
+        <p:spPr>
+          <a:xfrm>
+            <a:off x="5117506" y="2342935"/>
+            <a:ext cx="90826" cy="90826"/>
+          </a:xfrm>
+          <a:prstGeom prst="rect">
+            <a:avLst/>
+          </a:prstGeom>
+          <a:solidFill>
+            <a:schemeClr val="accent6"/>
+          </a:solidFill>
+          <a:ln>
+            <a:noFill/>
+          </a:ln>
+        </p:spPr>
+        <p:style>
+          <a:lnRef idx="2">
+            <a:schemeClr val="accent1">
+              <a:shade val="50000"/>
+            </a:schemeClr>
+          </a:lnRef>
+          <a:fillRef idx="1">
+            <a:schemeClr val="accent1"/>
+          </a:fillRef>
+          <a:effectRef idx="0">
+            <a:schemeClr val="accent1"/>
+          </a:effectRef>
+          <a:fontRef idx="minor">
+            <a:schemeClr val="lt1"/>
+          </a:fontRef>
+        </p:style>
+        <p:txBody>
+          <a:bodyPr rtlCol="0" anchor="ctr"/>
+          <a:lstStyle/>
+          <a:p>
+            <a:pPr algn="ctr"/>
+            <a:endParaRPr lang="en-US"/>
+          </a:p>
+        </p:txBody>
+      </p:sp>
+      <p:sp>
+        <p:nvSpPr>
+          <p:cNvPr id="132" name="Rectangle 131">
+            <a:extLst>
+              <a:ext uri="{FF2B5EF4-FFF2-40B4-BE49-F238E27FC236}">
+                <a16:creationId xmlns:a16="http://schemas.microsoft.com/office/drawing/2014/main" id="{ADDBF5CF-DDA2-4B48-809E-0474F1CE9D75}"/>
+              </a:ext>
+            </a:extLst>
+          </p:cNvPr>
+          <p:cNvSpPr/>
+          <p:nvPr/>
+        </p:nvSpPr>
+        <p:spPr>
+          <a:xfrm>
+            <a:off x="4959657" y="2503280"/>
+            <a:ext cx="90826" cy="90826"/>
+          </a:xfrm>
+          <a:prstGeom prst="rect">
+            <a:avLst/>
+          </a:prstGeom>
+          <a:solidFill>
+            <a:schemeClr val="accent6"/>
+          </a:solidFill>
+          <a:ln>
+            <a:noFill/>
+          </a:ln>
+        </p:spPr>
+        <p:style>
+          <a:lnRef idx="2">
+            <a:schemeClr val="accent1">
+              <a:shade val="50000"/>
+            </a:schemeClr>
+          </a:lnRef>
+          <a:fillRef idx="1">
+            <a:schemeClr val="accent1"/>
+          </a:fillRef>
+          <a:effectRef idx="0">
+            <a:schemeClr val="accent1"/>
+          </a:effectRef>
+          <a:fontRef idx="minor">
+            <a:schemeClr val="lt1"/>
+          </a:fontRef>
+        </p:style>
+        <p:txBody>
+          <a:bodyPr rtlCol="0" anchor="ctr"/>
+          <a:lstStyle/>
+          <a:p>
+            <a:pPr algn="ctr"/>
+            <a:endParaRPr lang="en-US"/>
+          </a:p>
+        </p:txBody>
+      </p:sp>
+      <p:sp>
+        <p:nvSpPr>
+          <p:cNvPr id="133" name="Rectangle 132">
+            <a:extLst>
+              <a:ext uri="{FF2B5EF4-FFF2-40B4-BE49-F238E27FC236}">
+                <a16:creationId xmlns:a16="http://schemas.microsoft.com/office/drawing/2014/main" id="{36D9319D-FA64-4C46-B7BD-558FB664A881}"/>
+              </a:ext>
+            </a:extLst>
+          </p:cNvPr>
+          <p:cNvSpPr/>
+          <p:nvPr/>
+        </p:nvSpPr>
+        <p:spPr>
+          <a:xfrm>
+            <a:off x="5117506" y="2503280"/>
+            <a:ext cx="90826" cy="90826"/>
+          </a:xfrm>
+          <a:prstGeom prst="rect">
+            <a:avLst/>
+          </a:prstGeom>
+          <a:solidFill>
+            <a:schemeClr val="accent6"/>
+          </a:solidFill>
+          <a:ln>
+            <a:noFill/>
+          </a:ln>
+        </p:spPr>
+        <p:style>
+          <a:lnRef idx="2">
+            <a:schemeClr val="accent1">
+              <a:shade val="50000"/>
+            </a:schemeClr>
+          </a:lnRef>
+          <a:fillRef idx="1">
+            <a:schemeClr val="accent1"/>
+          </a:fillRef>
+          <a:effectRef idx="0">
+            <a:schemeClr val="accent1"/>
+          </a:effectRef>
+          <a:fontRef idx="minor">
+            <a:schemeClr val="lt1"/>
+          </a:fontRef>
+        </p:style>
+        <p:txBody>
+          <a:bodyPr rtlCol="0" anchor="ctr"/>
+          <a:lstStyle/>
+          <a:p>
+            <a:pPr algn="ctr"/>
+            <a:endParaRPr lang="en-US"/>
+          </a:p>
+        </p:txBody>
+      </p:sp>
+      <p:sp>
+        <p:nvSpPr>
+          <p:cNvPr id="134" name="Rectangle 133">
+            <a:extLst>
+              <a:ext uri="{FF2B5EF4-FFF2-40B4-BE49-F238E27FC236}">
+                <a16:creationId xmlns:a16="http://schemas.microsoft.com/office/drawing/2014/main" id="{43F65931-BCA8-3E40-9F91-B634AD8656A5}"/>
+              </a:ext>
+            </a:extLst>
+          </p:cNvPr>
+          <p:cNvSpPr/>
+          <p:nvPr/>
+        </p:nvSpPr>
+        <p:spPr>
+          <a:xfrm>
+            <a:off x="5311284" y="1824556"/>
+            <a:ext cx="359390" cy="798873"/>
+          </a:xfrm>
+          <a:prstGeom prst="rect">
+            <a:avLst/>
+          </a:prstGeom>
+          <a:solidFill>
+            <a:schemeClr val="bg1"/>
+          </a:solidFill>
+          <a:ln>
+            <a:solidFill>
+              <a:srgbClr val="C00000"/>
+            </a:solidFill>
+          </a:ln>
+        </p:spPr>
+        <p:style>
+          <a:lnRef idx="2">
+            <a:schemeClr val="accent1">
+              <a:shade val="50000"/>
+            </a:schemeClr>
+          </a:lnRef>
+          <a:fillRef idx="1">
+            <a:schemeClr val="accent1"/>
+          </a:fillRef>
+          <a:effectRef idx="0">
+            <a:schemeClr val="accent1"/>
+          </a:effectRef>
+          <a:fontRef idx="minor">
+            <a:schemeClr val="lt1"/>
+          </a:fontRef>
+        </p:style>
+        <p:txBody>
+          <a:bodyPr rtlCol="0" anchor="ctr"/>
+          <a:lstStyle/>
+          <a:p>
+            <a:pPr algn="ctr"/>
+            <a:endParaRPr lang="en-US">
+              <a:latin typeface="Avenir Book" panose="02000503020000020003" pitchFamily="2" charset="0"/>
+            </a:endParaRPr>
+          </a:p>
+        </p:txBody>
+      </p:sp>
+      <p:sp>
+        <p:nvSpPr>
+          <p:cNvPr id="135" name="Rectangle 134">
+            <a:extLst>
+              <a:ext uri="{FF2B5EF4-FFF2-40B4-BE49-F238E27FC236}">
+                <a16:creationId xmlns:a16="http://schemas.microsoft.com/office/drawing/2014/main" id="{99C952B5-DE52-D049-8DFE-2436115BC27D}"/>
+              </a:ext>
+            </a:extLst>
+          </p:cNvPr>
+          <p:cNvSpPr/>
+          <p:nvPr/>
+        </p:nvSpPr>
+        <p:spPr>
+          <a:xfrm>
+            <a:off x="5369351" y="1861903"/>
+            <a:ext cx="90826" cy="90826"/>
+          </a:xfrm>
+          <a:prstGeom prst="rect">
+            <a:avLst/>
+          </a:prstGeom>
+          <a:solidFill>
+            <a:srgbClr val="C00000"/>
+          </a:solidFill>
+          <a:ln>
+            <a:noFill/>
+          </a:ln>
+        </p:spPr>
+        <p:style>
+          <a:lnRef idx="2">
+            <a:schemeClr val="accent1">
+              <a:shade val="50000"/>
+            </a:schemeClr>
+          </a:lnRef>
+          <a:fillRef idx="1">
+            <a:schemeClr val="accent1"/>
+          </a:fillRef>
+          <a:effectRef idx="0">
+            <a:schemeClr val="accent1"/>
+          </a:effectRef>
+          <a:fontRef idx="minor">
+            <a:schemeClr val="lt1"/>
+          </a:fontRef>
+        </p:style>
+        <p:txBody>
+          <a:bodyPr rtlCol="0" anchor="ctr"/>
+          <a:lstStyle/>
+          <a:p>
+            <a:pPr algn="ctr"/>
+            <a:endParaRPr lang="en-US"/>
+          </a:p>
+        </p:txBody>
+      </p:sp>
+      <p:sp>
+        <p:nvSpPr>
+          <p:cNvPr id="136" name="Rectangle 135">
+            <a:extLst>
+              <a:ext uri="{FF2B5EF4-FFF2-40B4-BE49-F238E27FC236}">
+                <a16:creationId xmlns:a16="http://schemas.microsoft.com/office/drawing/2014/main" id="{E999B5DC-3017-7F4C-9E91-0355F6367FFB}"/>
+              </a:ext>
+            </a:extLst>
+          </p:cNvPr>
+          <p:cNvSpPr/>
+          <p:nvPr/>
+        </p:nvSpPr>
+        <p:spPr>
+          <a:xfrm>
+            <a:off x="5527200" y="1861903"/>
+            <a:ext cx="90826" cy="90826"/>
+          </a:xfrm>
+          <a:prstGeom prst="rect">
+            <a:avLst/>
+          </a:prstGeom>
+          <a:solidFill>
+            <a:srgbClr val="C00000"/>
+          </a:solidFill>
+          <a:ln>
+            <a:noFill/>
+          </a:ln>
+        </p:spPr>
+        <p:style>
+          <a:lnRef idx="2">
+            <a:schemeClr val="accent1">
+              <a:shade val="50000"/>
+            </a:schemeClr>
+          </a:lnRef>
+          <a:fillRef idx="1">
+            <a:schemeClr val="accent1"/>
+          </a:fillRef>
+          <a:effectRef idx="0">
+            <a:schemeClr val="accent1"/>
+          </a:effectRef>
+          <a:fontRef idx="minor">
+            <a:schemeClr val="lt1"/>
+          </a:fontRef>
+        </p:style>
+        <p:txBody>
+          <a:bodyPr rtlCol="0" anchor="ctr"/>
+          <a:lstStyle/>
+          <a:p>
+            <a:pPr algn="ctr"/>
+            <a:endParaRPr lang="en-US"/>
+          </a:p>
+        </p:txBody>
+      </p:sp>
+      <p:sp>
+        <p:nvSpPr>
+          <p:cNvPr id="137" name="Rectangle 136">
+            <a:extLst>
+              <a:ext uri="{FF2B5EF4-FFF2-40B4-BE49-F238E27FC236}">
+                <a16:creationId xmlns:a16="http://schemas.microsoft.com/office/drawing/2014/main" id="{3617543A-2B00-D54E-8B5E-D923D62A47DF}"/>
+              </a:ext>
+            </a:extLst>
+          </p:cNvPr>
+          <p:cNvSpPr/>
+          <p:nvPr/>
+        </p:nvSpPr>
+        <p:spPr>
+          <a:xfrm>
+            <a:off x="5368047" y="2022247"/>
+            <a:ext cx="90826" cy="90826"/>
+          </a:xfrm>
+          <a:prstGeom prst="rect">
+            <a:avLst/>
+          </a:prstGeom>
+          <a:solidFill>
+            <a:srgbClr val="C00000"/>
+          </a:solidFill>
+          <a:ln>
+            <a:noFill/>
+          </a:ln>
+        </p:spPr>
+        <p:style>
+          <a:lnRef idx="2">
+            <a:schemeClr val="accent1">
+              <a:shade val="50000"/>
+            </a:schemeClr>
+          </a:lnRef>
+          <a:fillRef idx="1">
+            <a:schemeClr val="accent1"/>
+          </a:fillRef>
+          <a:effectRef idx="0">
+            <a:schemeClr val="accent1"/>
+          </a:effectRef>
+          <a:fontRef idx="minor">
+            <a:schemeClr val="lt1"/>
+          </a:fontRef>
+        </p:style>
+        <p:txBody>
+          <a:bodyPr rtlCol="0" anchor="ctr"/>
+          <a:lstStyle/>
+          <a:p>
+            <a:pPr algn="ctr"/>
+            <a:endParaRPr lang="en-US"/>
+          </a:p>
+        </p:txBody>
+      </p:sp>
+      <p:sp>
+        <p:nvSpPr>
+          <p:cNvPr id="140" name="Rectangle 139">
+            <a:extLst>
+              <a:ext uri="{FF2B5EF4-FFF2-40B4-BE49-F238E27FC236}">
+                <a16:creationId xmlns:a16="http://schemas.microsoft.com/office/drawing/2014/main" id="{D1CF45F1-856D-3D43-8D16-1C5047E7E458}"/>
+              </a:ext>
+            </a:extLst>
+          </p:cNvPr>
+          <p:cNvSpPr/>
+          <p:nvPr/>
+        </p:nvSpPr>
+        <p:spPr>
+          <a:xfrm>
+            <a:off x="5525896" y="2022247"/>
+            <a:ext cx="90826" cy="90826"/>
+          </a:xfrm>
+          <a:prstGeom prst="rect">
+            <a:avLst/>
+          </a:prstGeom>
+          <a:solidFill>
+            <a:srgbClr val="C00000"/>
+          </a:solidFill>
+          <a:ln>
+            <a:noFill/>
+          </a:ln>
+        </p:spPr>
+        <p:style>
+          <a:lnRef idx="2">
+            <a:schemeClr val="accent1">
+              <a:shade val="50000"/>
+            </a:schemeClr>
+          </a:lnRef>
+          <a:fillRef idx="1">
+            <a:schemeClr val="accent1"/>
+          </a:fillRef>
+          <a:effectRef idx="0">
+            <a:schemeClr val="accent1"/>
+          </a:effectRef>
+          <a:fontRef idx="minor">
+            <a:schemeClr val="lt1"/>
+          </a:fontRef>
+        </p:style>
+        <p:txBody>
+          <a:bodyPr rtlCol="0" anchor="ctr"/>
+          <a:lstStyle/>
+          <a:p>
+            <a:pPr algn="ctr"/>
+            <a:endParaRPr lang="en-US"/>
+          </a:p>
+        </p:txBody>
+      </p:sp>
+      <p:sp>
+        <p:nvSpPr>
+          <p:cNvPr id="201" name="Rectangle 200">
+            <a:extLst>
+              <a:ext uri="{FF2B5EF4-FFF2-40B4-BE49-F238E27FC236}">
+                <a16:creationId xmlns:a16="http://schemas.microsoft.com/office/drawing/2014/main" id="{6768CE02-D416-B648-BE8B-A067F3DA452A}"/>
+              </a:ext>
+            </a:extLst>
+          </p:cNvPr>
+          <p:cNvSpPr/>
+          <p:nvPr/>
+        </p:nvSpPr>
+        <p:spPr>
+          <a:xfrm>
+            <a:off x="5373954" y="2182591"/>
+            <a:ext cx="90826" cy="90826"/>
+          </a:xfrm>
+          <a:prstGeom prst="rect">
+            <a:avLst/>
+          </a:prstGeom>
+          <a:solidFill>
+            <a:srgbClr val="C00000"/>
+          </a:solidFill>
+          <a:ln>
+            <a:noFill/>
+          </a:ln>
+        </p:spPr>
+        <p:style>
+          <a:lnRef idx="2">
+            <a:schemeClr val="accent1">
+              <a:shade val="50000"/>
+            </a:schemeClr>
+          </a:lnRef>
+          <a:fillRef idx="1">
+            <a:schemeClr val="accent1"/>
+          </a:fillRef>
+          <a:effectRef idx="0">
+            <a:schemeClr val="accent1"/>
+          </a:effectRef>
+          <a:fontRef idx="minor">
+            <a:schemeClr val="lt1"/>
+          </a:fontRef>
+        </p:style>
+        <p:txBody>
+          <a:bodyPr rtlCol="0" anchor="ctr"/>
+          <a:lstStyle/>
+          <a:p>
+            <a:pPr algn="ctr"/>
+            <a:endParaRPr lang="en-US"/>
+          </a:p>
+        </p:txBody>
+      </p:sp>
+      <p:sp>
+        <p:nvSpPr>
+          <p:cNvPr id="202" name="Rectangle 201">
+            <a:extLst>
+              <a:ext uri="{FF2B5EF4-FFF2-40B4-BE49-F238E27FC236}">
+                <a16:creationId xmlns:a16="http://schemas.microsoft.com/office/drawing/2014/main" id="{38ADE777-14CB-B443-9489-FF4E89591DAB}"/>
+              </a:ext>
+            </a:extLst>
+          </p:cNvPr>
+          <p:cNvSpPr/>
+          <p:nvPr/>
+        </p:nvSpPr>
+        <p:spPr>
+          <a:xfrm>
+            <a:off x="5531803" y="2182591"/>
+            <a:ext cx="90826" cy="90826"/>
+          </a:xfrm>
+          <a:prstGeom prst="rect">
+            <a:avLst/>
+          </a:prstGeom>
+          <a:solidFill>
+            <a:srgbClr val="C00000"/>
+          </a:solidFill>
+          <a:ln>
+            <a:noFill/>
+          </a:ln>
+        </p:spPr>
+        <p:style>
+          <a:lnRef idx="2">
+            <a:schemeClr val="accent1">
+              <a:shade val="50000"/>
+            </a:schemeClr>
+          </a:lnRef>
+          <a:fillRef idx="1">
+            <a:schemeClr val="accent1"/>
+          </a:fillRef>
+          <a:effectRef idx="0">
+            <a:schemeClr val="accent1"/>
+          </a:effectRef>
+          <a:fontRef idx="minor">
+            <a:schemeClr val="lt1"/>
+          </a:fontRef>
+        </p:style>
+        <p:txBody>
+          <a:bodyPr rtlCol="0" anchor="ctr"/>
+          <a:lstStyle/>
+          <a:p>
+            <a:pPr algn="ctr"/>
+            <a:endParaRPr lang="en-US"/>
+          </a:p>
+        </p:txBody>
+      </p:sp>
+      <p:sp>
+        <p:nvSpPr>
+          <p:cNvPr id="206" name="Rectangle 205">
+            <a:extLst>
+              <a:ext uri="{FF2B5EF4-FFF2-40B4-BE49-F238E27FC236}">
+                <a16:creationId xmlns:a16="http://schemas.microsoft.com/office/drawing/2014/main" id="{5E98F8B0-563A-5344-A1C7-D94F47E5D521}"/>
+              </a:ext>
+            </a:extLst>
+          </p:cNvPr>
+          <p:cNvSpPr/>
+          <p:nvPr/>
+        </p:nvSpPr>
+        <p:spPr>
+          <a:xfrm>
+            <a:off x="5368047" y="2342935"/>
+            <a:ext cx="90826" cy="90826"/>
+          </a:xfrm>
+          <a:prstGeom prst="rect">
+            <a:avLst/>
+          </a:prstGeom>
+          <a:solidFill>
+            <a:srgbClr val="C00000"/>
+          </a:solidFill>
+          <a:ln>
+            <a:noFill/>
+          </a:ln>
+        </p:spPr>
+        <p:style>
+          <a:lnRef idx="2">
+            <a:schemeClr val="accent1">
+              <a:shade val="50000"/>
+            </a:schemeClr>
+          </a:lnRef>
+          <a:fillRef idx="1">
+            <a:schemeClr val="accent1"/>
+          </a:fillRef>
+          <a:effectRef idx="0">
+            <a:schemeClr val="accent1"/>
+          </a:effectRef>
+          <a:fontRef idx="minor">
+            <a:schemeClr val="lt1"/>
+          </a:fontRef>
+        </p:style>
+        <p:txBody>
+          <a:bodyPr rtlCol="0" anchor="ctr"/>
+          <a:lstStyle/>
+          <a:p>
+            <a:pPr algn="ctr"/>
+            <a:endParaRPr lang="en-US"/>
+          </a:p>
+        </p:txBody>
+      </p:sp>
+      <p:sp>
+        <p:nvSpPr>
+          <p:cNvPr id="207" name="Rectangle 206">
+            <a:extLst>
+              <a:ext uri="{FF2B5EF4-FFF2-40B4-BE49-F238E27FC236}">
+                <a16:creationId xmlns:a16="http://schemas.microsoft.com/office/drawing/2014/main" id="{A84D3076-337A-1E40-B27F-5977058EDC78}"/>
+              </a:ext>
+            </a:extLst>
+          </p:cNvPr>
+          <p:cNvSpPr/>
+          <p:nvPr/>
+        </p:nvSpPr>
+        <p:spPr>
+          <a:xfrm>
+            <a:off x="5525896" y="2342935"/>
+            <a:ext cx="90826" cy="90826"/>
+          </a:xfrm>
+          <a:prstGeom prst="rect">
+            <a:avLst/>
+          </a:prstGeom>
+          <a:solidFill>
+            <a:srgbClr val="C00000"/>
+          </a:solidFill>
+          <a:ln>
+            <a:noFill/>
+          </a:ln>
+        </p:spPr>
+        <p:style>
+          <a:lnRef idx="2">
+            <a:schemeClr val="accent1">
+              <a:shade val="50000"/>
+            </a:schemeClr>
+          </a:lnRef>
+          <a:fillRef idx="1">
+            <a:schemeClr val="accent1"/>
+          </a:fillRef>
+          <a:effectRef idx="0">
+            <a:schemeClr val="accent1"/>
+          </a:effectRef>
+          <a:fontRef idx="minor">
+            <a:schemeClr val="lt1"/>
+          </a:fontRef>
+        </p:style>
+        <p:txBody>
+          <a:bodyPr rtlCol="0" anchor="ctr"/>
+          <a:lstStyle/>
+          <a:p>
+            <a:pPr algn="ctr"/>
+            <a:endParaRPr lang="en-US"/>
+          </a:p>
+        </p:txBody>
+      </p:sp>
+      <p:sp>
+        <p:nvSpPr>
+          <p:cNvPr id="208" name="Rectangle 207">
+            <a:extLst>
+              <a:ext uri="{FF2B5EF4-FFF2-40B4-BE49-F238E27FC236}">
+                <a16:creationId xmlns:a16="http://schemas.microsoft.com/office/drawing/2014/main" id="{B6D49C68-0C71-404D-8864-9E19147BA2C2}"/>
+              </a:ext>
+            </a:extLst>
+          </p:cNvPr>
+          <p:cNvSpPr/>
+          <p:nvPr/>
+        </p:nvSpPr>
+        <p:spPr>
+          <a:xfrm>
+            <a:off x="5368047" y="2503280"/>
+            <a:ext cx="90826" cy="90826"/>
+          </a:xfrm>
+          <a:prstGeom prst="rect">
+            <a:avLst/>
+          </a:prstGeom>
+          <a:solidFill>
+            <a:srgbClr val="C00000"/>
+          </a:solidFill>
+          <a:ln>
+            <a:noFill/>
+          </a:ln>
+        </p:spPr>
+        <p:style>
+          <a:lnRef idx="2">
+            <a:schemeClr val="accent1">
+              <a:shade val="50000"/>
+            </a:schemeClr>
+          </a:lnRef>
+          <a:fillRef idx="1">
+            <a:schemeClr val="accent1"/>
+          </a:fillRef>
+          <a:effectRef idx="0">
+            <a:schemeClr val="accent1"/>
+          </a:effectRef>
+          <a:fontRef idx="minor">
+            <a:schemeClr val="lt1"/>
+          </a:fontRef>
+        </p:style>
+        <p:txBody>
+          <a:bodyPr rtlCol="0" anchor="ctr"/>
+          <a:lstStyle/>
+          <a:p>
+            <a:pPr algn="ctr"/>
+            <a:endParaRPr lang="en-US"/>
+          </a:p>
+        </p:txBody>
+      </p:sp>
+      <p:sp>
+        <p:nvSpPr>
+          <p:cNvPr id="210" name="Rectangle 209">
+            <a:extLst>
+              <a:ext uri="{FF2B5EF4-FFF2-40B4-BE49-F238E27FC236}">
+                <a16:creationId xmlns:a16="http://schemas.microsoft.com/office/drawing/2014/main" id="{65962EBB-152B-D14B-8888-184C5B75D84A}"/>
+              </a:ext>
+            </a:extLst>
+          </p:cNvPr>
+          <p:cNvSpPr/>
+          <p:nvPr/>
+        </p:nvSpPr>
+        <p:spPr>
+          <a:xfrm>
+            <a:off x="5525896" y="2503280"/>
+            <a:ext cx="90826" cy="90826"/>
+          </a:xfrm>
+          <a:prstGeom prst="rect">
+            <a:avLst/>
+          </a:prstGeom>
+          <a:solidFill>
+            <a:srgbClr val="C00000"/>
+          </a:solidFill>
+          <a:ln>
+            <a:noFill/>
+          </a:ln>
+        </p:spPr>
+        <p:style>
+          <a:lnRef idx="2">
+            <a:schemeClr val="accent1">
+              <a:shade val="50000"/>
+            </a:schemeClr>
+          </a:lnRef>
+          <a:fillRef idx="1">
+            <a:schemeClr val="accent1"/>
+          </a:fillRef>
+          <a:effectRef idx="0">
+            <a:schemeClr val="accent1"/>
+          </a:effectRef>
+          <a:fontRef idx="minor">
+            <a:schemeClr val="lt1"/>
+          </a:fontRef>
+        </p:style>
+        <p:txBody>
+          <a:bodyPr rtlCol="0" anchor="ctr"/>
+          <a:lstStyle/>
+          <a:p>
+            <a:pPr algn="ctr"/>
+            <a:endParaRPr lang="en-US"/>
+          </a:p>
+        </p:txBody>
+      </p:sp>
+      <p:sp>
+        <p:nvSpPr>
+          <p:cNvPr id="211" name="Rectangle 210">
+            <a:extLst>
+              <a:ext uri="{FF2B5EF4-FFF2-40B4-BE49-F238E27FC236}">
+                <a16:creationId xmlns:a16="http://schemas.microsoft.com/office/drawing/2014/main" id="{6187B804-DD39-B745-935C-DE445BC21E78}"/>
+              </a:ext>
+            </a:extLst>
+          </p:cNvPr>
+          <p:cNvSpPr/>
+          <p:nvPr/>
+        </p:nvSpPr>
+        <p:spPr>
+          <a:xfrm>
+            <a:off x="5733203" y="1824556"/>
+            <a:ext cx="353585" cy="798873"/>
+          </a:xfrm>
+          <a:prstGeom prst="rect">
+            <a:avLst/>
+          </a:prstGeom>
+          <a:solidFill>
+            <a:schemeClr val="bg1"/>
+          </a:solidFill>
+          <a:ln>
+            <a:solidFill>
+              <a:srgbClr val="C00000"/>
+            </a:solidFill>
+          </a:ln>
+        </p:spPr>
+        <p:style>
+          <a:lnRef idx="2">
+            <a:schemeClr val="accent1">
+              <a:shade val="50000"/>
+            </a:schemeClr>
+          </a:lnRef>
+          <a:fillRef idx="1">
+            <a:schemeClr val="accent1"/>
+          </a:fillRef>
+          <a:effectRef idx="0">
+            <a:schemeClr val="accent1"/>
+          </a:effectRef>
+          <a:fontRef idx="minor">
+            <a:schemeClr val="lt1"/>
+          </a:fontRef>
+        </p:style>
+        <p:txBody>
+          <a:bodyPr rtlCol="0" anchor="ctr"/>
+          <a:lstStyle/>
+          <a:p>
+            <a:pPr algn="ctr"/>
+            <a:endParaRPr lang="en-US">
+              <a:latin typeface="Avenir Book" panose="02000503020000020003" pitchFamily="2" charset="0"/>
+            </a:endParaRPr>
+          </a:p>
+        </p:txBody>
+      </p:sp>
+      <p:sp>
+        <p:nvSpPr>
+          <p:cNvPr id="212" name="Rectangle 211">
+            <a:extLst>
+              <a:ext uri="{FF2B5EF4-FFF2-40B4-BE49-F238E27FC236}">
+                <a16:creationId xmlns:a16="http://schemas.microsoft.com/office/drawing/2014/main" id="{343C2999-A952-C24F-B1EE-2A0B27EFF9F7}"/>
+              </a:ext>
+            </a:extLst>
+          </p:cNvPr>
+          <p:cNvSpPr/>
+          <p:nvPr/>
+        </p:nvSpPr>
+        <p:spPr>
+          <a:xfrm>
+            <a:off x="5783195" y="1861903"/>
+            <a:ext cx="90826" cy="90826"/>
+          </a:xfrm>
+          <a:prstGeom prst="rect">
+            <a:avLst/>
+          </a:prstGeom>
+          <a:solidFill>
+            <a:schemeClr val="accent1">
+              <a:lumMod val="20000"/>
+              <a:lumOff val="80000"/>
+            </a:schemeClr>
+          </a:solidFill>
+          <a:ln>
+            <a:noFill/>
+          </a:ln>
+        </p:spPr>
+        <p:style>
+          <a:lnRef idx="2">
+            <a:schemeClr val="accent1">
+              <a:shade val="50000"/>
+            </a:schemeClr>
+          </a:lnRef>
+          <a:fillRef idx="1">
+            <a:schemeClr val="accent1"/>
+          </a:fillRef>
+          <a:effectRef idx="0">
+            <a:schemeClr val="accent1"/>
+          </a:effectRef>
+          <a:fontRef idx="minor">
+            <a:schemeClr val="lt1"/>
+          </a:fontRef>
+        </p:style>
+        <p:txBody>
+          <a:bodyPr rtlCol="0" anchor="ctr"/>
+          <a:lstStyle/>
+          <a:p>
+            <a:pPr algn="ctr"/>
+            <a:endParaRPr lang="en-US"/>
+          </a:p>
+        </p:txBody>
+      </p:sp>
+      <p:sp>
+        <p:nvSpPr>
+          <p:cNvPr id="213" name="Rectangle 212">
+            <a:extLst>
+              <a:ext uri="{FF2B5EF4-FFF2-40B4-BE49-F238E27FC236}">
+                <a16:creationId xmlns:a16="http://schemas.microsoft.com/office/drawing/2014/main" id="{52550977-F14E-2244-BB0E-53B803F37A5A}"/>
+              </a:ext>
+            </a:extLst>
+          </p:cNvPr>
+          <p:cNvSpPr/>
+          <p:nvPr/>
+        </p:nvSpPr>
+        <p:spPr>
+          <a:xfrm>
+            <a:off x="5941044" y="1861903"/>
+            <a:ext cx="90826" cy="90826"/>
+          </a:xfrm>
+          <a:prstGeom prst="rect">
+            <a:avLst/>
+          </a:prstGeom>
+          <a:solidFill>
+            <a:schemeClr val="accent1">
+              <a:lumMod val="20000"/>
+              <a:lumOff val="80000"/>
+            </a:schemeClr>
+          </a:solidFill>
+          <a:ln>
+            <a:noFill/>
+          </a:ln>
+        </p:spPr>
+        <p:style>
+          <a:lnRef idx="2">
+            <a:schemeClr val="accent1">
+              <a:shade val="50000"/>
+            </a:schemeClr>
+          </a:lnRef>
+          <a:fillRef idx="1">
+            <a:schemeClr val="accent1"/>
+          </a:fillRef>
+          <a:effectRef idx="0">
+            <a:schemeClr val="accent1"/>
+          </a:effectRef>
+          <a:fontRef idx="minor">
+            <a:schemeClr val="lt1"/>
+          </a:fontRef>
+        </p:style>
+        <p:txBody>
+          <a:bodyPr rtlCol="0" anchor="ctr"/>
+          <a:lstStyle/>
+          <a:p>
+            <a:pPr algn="ctr"/>
+            <a:endParaRPr lang="en-US"/>
+          </a:p>
+        </p:txBody>
+      </p:sp>
+      <p:sp>
+        <p:nvSpPr>
+          <p:cNvPr id="215" name="Rectangle 214">
+            <a:extLst>
+              <a:ext uri="{FF2B5EF4-FFF2-40B4-BE49-F238E27FC236}">
+                <a16:creationId xmlns:a16="http://schemas.microsoft.com/office/drawing/2014/main" id="{63730608-9C42-F24D-A4C3-FF027004996E}"/>
+              </a:ext>
+            </a:extLst>
+          </p:cNvPr>
+          <p:cNvSpPr/>
+          <p:nvPr/>
+        </p:nvSpPr>
+        <p:spPr>
+          <a:xfrm>
+            <a:off x="5783195" y="2022247"/>
+            <a:ext cx="90826" cy="90826"/>
+          </a:xfrm>
+          <a:prstGeom prst="rect">
+            <a:avLst/>
+          </a:prstGeom>
+          <a:solidFill>
+            <a:schemeClr val="accent1">
+              <a:lumMod val="20000"/>
+              <a:lumOff val="80000"/>
+            </a:schemeClr>
+          </a:solidFill>
+          <a:ln>
+            <a:noFill/>
+          </a:ln>
+        </p:spPr>
+        <p:style>
+          <a:lnRef idx="2">
+            <a:schemeClr val="accent1">
+              <a:shade val="50000"/>
+            </a:schemeClr>
+          </a:lnRef>
+          <a:fillRef idx="1">
+            <a:schemeClr val="accent1"/>
+          </a:fillRef>
+          <a:effectRef idx="0">
+            <a:schemeClr val="accent1"/>
+          </a:effectRef>
+          <a:fontRef idx="minor">
+            <a:schemeClr val="lt1"/>
+          </a:fontRef>
+        </p:style>
+        <p:txBody>
+          <a:bodyPr rtlCol="0" anchor="ctr"/>
+          <a:lstStyle/>
+          <a:p>
+            <a:pPr algn="ctr"/>
+            <a:endParaRPr lang="en-US"/>
+          </a:p>
+        </p:txBody>
+      </p:sp>
+      <p:sp>
+        <p:nvSpPr>
+          <p:cNvPr id="216" name="Rectangle 215">
+            <a:extLst>
+              <a:ext uri="{FF2B5EF4-FFF2-40B4-BE49-F238E27FC236}">
+                <a16:creationId xmlns:a16="http://schemas.microsoft.com/office/drawing/2014/main" id="{1C898B88-DA00-1646-AA47-D94FAF8A96C5}"/>
+              </a:ext>
+            </a:extLst>
+          </p:cNvPr>
+          <p:cNvSpPr/>
+          <p:nvPr/>
+        </p:nvSpPr>
+        <p:spPr>
+          <a:xfrm>
+            <a:off x="5941044" y="2022247"/>
+            <a:ext cx="90826" cy="90826"/>
+          </a:xfrm>
+          <a:prstGeom prst="rect">
+            <a:avLst/>
+          </a:prstGeom>
+          <a:solidFill>
+            <a:schemeClr val="accent1">
+              <a:lumMod val="20000"/>
+              <a:lumOff val="80000"/>
+            </a:schemeClr>
+          </a:solidFill>
+          <a:ln>
+            <a:noFill/>
+          </a:ln>
+        </p:spPr>
+        <p:style>
+          <a:lnRef idx="2">
+            <a:schemeClr val="accent1">
+              <a:shade val="50000"/>
+            </a:schemeClr>
+          </a:lnRef>
+          <a:fillRef idx="1">
+            <a:schemeClr val="accent1"/>
+          </a:fillRef>
+          <a:effectRef idx="0">
+            <a:schemeClr val="accent1"/>
+          </a:effectRef>
+          <a:fontRef idx="minor">
+            <a:schemeClr val="lt1"/>
+          </a:fontRef>
+        </p:style>
+        <p:txBody>
+          <a:bodyPr rtlCol="0" anchor="ctr"/>
+          <a:lstStyle/>
+          <a:p>
+            <a:pPr algn="ctr"/>
+            <a:endParaRPr lang="en-US"/>
+          </a:p>
+        </p:txBody>
+      </p:sp>
+      <p:sp>
+        <p:nvSpPr>
+          <p:cNvPr id="217" name="Rectangle 216">
+            <a:extLst>
+              <a:ext uri="{FF2B5EF4-FFF2-40B4-BE49-F238E27FC236}">
+                <a16:creationId xmlns:a16="http://schemas.microsoft.com/office/drawing/2014/main" id="{6A268ACC-590C-8649-A717-A81E0D3A77D2}"/>
+              </a:ext>
+            </a:extLst>
+          </p:cNvPr>
+          <p:cNvSpPr/>
+          <p:nvPr/>
+        </p:nvSpPr>
+        <p:spPr>
+          <a:xfrm>
+            <a:off x="5783195" y="2182591"/>
+            <a:ext cx="90826" cy="90826"/>
+          </a:xfrm>
+          <a:prstGeom prst="rect">
+            <a:avLst/>
+          </a:prstGeom>
+          <a:solidFill>
+            <a:schemeClr val="accent1">
+              <a:lumMod val="20000"/>
+              <a:lumOff val="80000"/>
+            </a:schemeClr>
+          </a:solidFill>
+          <a:ln>
+            <a:noFill/>
+          </a:ln>
+        </p:spPr>
+        <p:style>
+          <a:lnRef idx="2">
+            <a:schemeClr val="accent1">
+              <a:shade val="50000"/>
+            </a:schemeClr>
+          </a:lnRef>
+          <a:fillRef idx="1">
+            <a:schemeClr val="accent1"/>
+          </a:fillRef>
+          <a:effectRef idx="0">
+            <a:schemeClr val="accent1"/>
+          </a:effectRef>
+          <a:fontRef idx="minor">
+            <a:schemeClr val="lt1"/>
+          </a:fontRef>
+        </p:style>
+        <p:txBody>
+          <a:bodyPr rtlCol="0" anchor="ctr"/>
+          <a:lstStyle/>
+          <a:p>
+            <a:pPr algn="ctr"/>
+            <a:endParaRPr lang="en-US"/>
+          </a:p>
+        </p:txBody>
+      </p:sp>
+      <p:sp>
+        <p:nvSpPr>
+          <p:cNvPr id="218" name="Rectangle 217">
+            <a:extLst>
+              <a:ext uri="{FF2B5EF4-FFF2-40B4-BE49-F238E27FC236}">
+                <a16:creationId xmlns:a16="http://schemas.microsoft.com/office/drawing/2014/main" id="{1DA65738-EE1F-2E46-B180-0AD3A4CAC28A}"/>
+              </a:ext>
+            </a:extLst>
+          </p:cNvPr>
+          <p:cNvSpPr/>
+          <p:nvPr/>
+        </p:nvSpPr>
+        <p:spPr>
+          <a:xfrm>
+            <a:off x="5941044" y="2182591"/>
+            <a:ext cx="90826" cy="90826"/>
+          </a:xfrm>
+          <a:prstGeom prst="rect">
+            <a:avLst/>
+          </a:prstGeom>
+          <a:solidFill>
+            <a:schemeClr val="accent1">
+              <a:lumMod val="20000"/>
+              <a:lumOff val="80000"/>
+            </a:schemeClr>
+          </a:solidFill>
+          <a:ln>
+            <a:noFill/>
+          </a:ln>
+        </p:spPr>
+        <p:style>
+          <a:lnRef idx="2">
+            <a:schemeClr val="accent1">
+              <a:shade val="50000"/>
+            </a:schemeClr>
+          </a:lnRef>
+          <a:fillRef idx="1">
+            <a:schemeClr val="accent1"/>
+          </a:fillRef>
+          <a:effectRef idx="0">
+            <a:schemeClr val="accent1"/>
+          </a:effectRef>
+          <a:fontRef idx="minor">
+            <a:schemeClr val="lt1"/>
+          </a:fontRef>
+        </p:style>
+        <p:txBody>
+          <a:bodyPr rtlCol="0" anchor="ctr"/>
+          <a:lstStyle/>
+          <a:p>
+            <a:pPr algn="ctr"/>
+            <a:endParaRPr lang="en-US"/>
+          </a:p>
+        </p:txBody>
+      </p:sp>
+      <p:sp>
+        <p:nvSpPr>
+          <p:cNvPr id="219" name="Rectangle 218">
+            <a:extLst>
+              <a:ext uri="{FF2B5EF4-FFF2-40B4-BE49-F238E27FC236}">
+                <a16:creationId xmlns:a16="http://schemas.microsoft.com/office/drawing/2014/main" id="{82108B80-FF0F-9E46-A4B4-71404826C6F0}"/>
+              </a:ext>
+            </a:extLst>
+          </p:cNvPr>
+          <p:cNvSpPr/>
+          <p:nvPr/>
+        </p:nvSpPr>
+        <p:spPr>
+          <a:xfrm>
+            <a:off x="5783195" y="2342935"/>
+            <a:ext cx="90826" cy="90826"/>
+          </a:xfrm>
+          <a:prstGeom prst="rect">
+            <a:avLst/>
+          </a:prstGeom>
+          <a:solidFill>
+            <a:schemeClr val="accent1">
+              <a:lumMod val="20000"/>
+              <a:lumOff val="80000"/>
+            </a:schemeClr>
+          </a:solidFill>
+          <a:ln>
+            <a:noFill/>
+          </a:ln>
+        </p:spPr>
+        <p:style>
+          <a:lnRef idx="2">
+            <a:schemeClr val="accent1">
+              <a:shade val="50000"/>
+            </a:schemeClr>
+          </a:lnRef>
+          <a:fillRef idx="1">
+            <a:schemeClr val="accent1"/>
+          </a:fillRef>
+          <a:effectRef idx="0">
+            <a:schemeClr val="accent1"/>
+          </a:effectRef>
+          <a:fontRef idx="minor">
+            <a:schemeClr val="lt1"/>
+          </a:fontRef>
+        </p:style>
+        <p:txBody>
+          <a:bodyPr rtlCol="0" anchor="ctr"/>
+          <a:lstStyle/>
+          <a:p>
+            <a:pPr algn="ctr"/>
+            <a:endParaRPr lang="en-US"/>
+          </a:p>
+        </p:txBody>
+      </p:sp>
+      <p:sp>
+        <p:nvSpPr>
+          <p:cNvPr id="220" name="Rectangle 219">
+            <a:extLst>
+              <a:ext uri="{FF2B5EF4-FFF2-40B4-BE49-F238E27FC236}">
+                <a16:creationId xmlns:a16="http://schemas.microsoft.com/office/drawing/2014/main" id="{F2A0FDAC-7340-034A-90E7-4CED8820C120}"/>
+              </a:ext>
+            </a:extLst>
+          </p:cNvPr>
+          <p:cNvSpPr/>
+          <p:nvPr/>
+        </p:nvSpPr>
+        <p:spPr>
+          <a:xfrm>
+            <a:off x="5941044" y="2342935"/>
+            <a:ext cx="90826" cy="90826"/>
+          </a:xfrm>
+          <a:prstGeom prst="rect">
+            <a:avLst/>
+          </a:prstGeom>
+          <a:solidFill>
+            <a:schemeClr val="accent1">
+              <a:lumMod val="20000"/>
+              <a:lumOff val="80000"/>
+            </a:schemeClr>
+          </a:solidFill>
+          <a:ln>
+            <a:noFill/>
+          </a:ln>
+        </p:spPr>
+        <p:style>
+          <a:lnRef idx="2">
+            <a:schemeClr val="accent1">
+              <a:shade val="50000"/>
+            </a:schemeClr>
+          </a:lnRef>
+          <a:fillRef idx="1">
+            <a:schemeClr val="accent1"/>
+          </a:fillRef>
+          <a:effectRef idx="0">
+            <a:schemeClr val="accent1"/>
+          </a:effectRef>
+          <a:fontRef idx="minor">
+            <a:schemeClr val="lt1"/>
+          </a:fontRef>
+        </p:style>
+        <p:txBody>
+          <a:bodyPr rtlCol="0" anchor="ctr"/>
+          <a:lstStyle/>
+          <a:p>
+            <a:pPr algn="ctr"/>
+            <a:endParaRPr lang="en-US"/>
+          </a:p>
+        </p:txBody>
+      </p:sp>
+      <p:sp>
+        <p:nvSpPr>
+          <p:cNvPr id="221" name="Rectangle 220">
+            <a:extLst>
+              <a:ext uri="{FF2B5EF4-FFF2-40B4-BE49-F238E27FC236}">
+                <a16:creationId xmlns:a16="http://schemas.microsoft.com/office/drawing/2014/main" id="{D7692322-9C2F-CF42-B26A-FFBE39F106DB}"/>
+              </a:ext>
+            </a:extLst>
+          </p:cNvPr>
+          <p:cNvSpPr/>
+          <p:nvPr/>
+        </p:nvSpPr>
+        <p:spPr>
+          <a:xfrm>
+            <a:off x="5783195" y="2503280"/>
+            <a:ext cx="90826" cy="90826"/>
+          </a:xfrm>
+          <a:prstGeom prst="rect">
+            <a:avLst/>
+          </a:prstGeom>
+          <a:solidFill>
+            <a:schemeClr val="accent1">
+              <a:lumMod val="20000"/>
+              <a:lumOff val="80000"/>
+            </a:schemeClr>
+          </a:solidFill>
+          <a:ln>
+            <a:noFill/>
+          </a:ln>
+        </p:spPr>
+        <p:style>
+          <a:lnRef idx="2">
+            <a:schemeClr val="accent1">
+              <a:shade val="50000"/>
+            </a:schemeClr>
+          </a:lnRef>
+          <a:fillRef idx="1">
+            <a:schemeClr val="accent1"/>
+          </a:fillRef>
+          <a:effectRef idx="0">
+            <a:schemeClr val="accent1"/>
+          </a:effectRef>
+          <a:fontRef idx="minor">
+            <a:schemeClr val="lt1"/>
+          </a:fontRef>
+        </p:style>
+        <p:txBody>
+          <a:bodyPr rtlCol="0" anchor="ctr"/>
+          <a:lstStyle/>
+          <a:p>
+            <a:pPr algn="ctr"/>
+            <a:endParaRPr lang="en-US"/>
+          </a:p>
+        </p:txBody>
+      </p:sp>
+      <p:sp>
+        <p:nvSpPr>
+          <p:cNvPr id="222" name="Rectangle 221">
+            <a:extLst>
+              <a:ext uri="{FF2B5EF4-FFF2-40B4-BE49-F238E27FC236}">
+                <a16:creationId xmlns:a16="http://schemas.microsoft.com/office/drawing/2014/main" id="{CF776D57-C2A7-BB42-9FE4-CF69A5015D3E}"/>
+              </a:ext>
+            </a:extLst>
+          </p:cNvPr>
+          <p:cNvSpPr/>
+          <p:nvPr/>
+        </p:nvSpPr>
+        <p:spPr>
+          <a:xfrm>
+            <a:off x="5941044" y="2503280"/>
+            <a:ext cx="90826" cy="90826"/>
+          </a:xfrm>
+          <a:prstGeom prst="rect">
+            <a:avLst/>
+          </a:prstGeom>
+          <a:solidFill>
+            <a:schemeClr val="accent1">
+              <a:lumMod val="20000"/>
+              <a:lumOff val="80000"/>
+            </a:schemeClr>
+          </a:solidFill>
+          <a:ln>
+            <a:noFill/>
+          </a:ln>
+        </p:spPr>
+        <p:style>
+          <a:lnRef idx="2">
+            <a:schemeClr val="accent1">
+              <a:shade val="50000"/>
+            </a:schemeClr>
+          </a:lnRef>
+          <a:fillRef idx="1">
+            <a:schemeClr val="accent1"/>
+          </a:fillRef>
+          <a:effectRef idx="0">
+            <a:schemeClr val="accent1"/>
+          </a:effectRef>
+          <a:fontRef idx="minor">
+            <a:schemeClr val="lt1"/>
+          </a:fontRef>
+        </p:style>
+        <p:txBody>
+          <a:bodyPr rtlCol="0" anchor="ctr"/>
+          <a:lstStyle/>
+          <a:p>
+            <a:pPr algn="ctr"/>
+            <a:endParaRPr lang="en-US"/>
+          </a:p>
+        </p:txBody>
+      </p:sp>
+      <p:sp>
+        <p:nvSpPr>
+          <p:cNvPr id="223" name="TextBox 222">
+            <a:extLst>
+              <a:ext uri="{FF2B5EF4-FFF2-40B4-BE49-F238E27FC236}">
+                <a16:creationId xmlns:a16="http://schemas.microsoft.com/office/drawing/2014/main" id="{5653F323-1058-E346-96B2-7019B67C7B33}"/>
+              </a:ext>
+            </a:extLst>
+          </p:cNvPr>
+          <p:cNvSpPr txBox="1"/>
+          <p:nvPr/>
+        </p:nvSpPr>
+        <p:spPr>
+          <a:xfrm>
+            <a:off x="6074242" y="2067660"/>
+            <a:ext cx="340158" cy="276999"/>
+          </a:xfrm>
+          <a:prstGeom prst="rect">
+            <a:avLst/>
+          </a:prstGeom>
+          <a:noFill/>
+        </p:spPr>
+        <p:txBody>
+          <a:bodyPr wrap="none" rtlCol="0">
+            <a:spAutoFit/>
+          </a:bodyPr>
+          <a:lstStyle/>
+          <a:p>
+            <a:r>
+              <a:rPr lang="en-US" sz="1200" dirty="0"/>
+              <a:t>+6</a:t>
+            </a:r>
           </a:p>
         </p:txBody>
       </p:sp>

</xml_diff>

<commit_message>
Updated readme and SOD slurm script
</commit_message>
<xml_diff>
--- a/Figures/Figure1_full.pptx
+++ b/Figures/Figure1_full.pptx
@@ -197,7 +197,7 @@
           <a:p>
             <a:fld id="{B81506D6-8878-0945-9216-E4F5AFA6BC99}" type="datetimeFigureOut">
               <a:rPr lang="en-US" smtClean="0"/>
-              <a:t>4/22/21</a:t>
+              <a:t>6/22/21</a:t>
             </a:fld>
             <a:endParaRPr lang="en-US"/>
           </a:p>
@@ -679,7 +679,7 @@
           <a:p>
             <a:fld id="{B5B0AC65-3CE8-4749-B0D7-AFCFDEE36239}" type="datetimeFigureOut">
               <a:rPr lang="en-US" smtClean="0"/>
-              <a:t>4/22/21</a:t>
+              <a:t>6/22/21</a:t>
             </a:fld>
             <a:endParaRPr lang="en-US"/>
           </a:p>
@@ -849,7 +849,7 @@
           <a:p>
             <a:fld id="{B5B0AC65-3CE8-4749-B0D7-AFCFDEE36239}" type="datetimeFigureOut">
               <a:rPr lang="en-US" smtClean="0"/>
-              <a:t>4/22/21</a:t>
+              <a:t>6/22/21</a:t>
             </a:fld>
             <a:endParaRPr lang="en-US"/>
           </a:p>
@@ -1029,7 +1029,7 @@
           <a:p>
             <a:fld id="{B5B0AC65-3CE8-4749-B0D7-AFCFDEE36239}" type="datetimeFigureOut">
               <a:rPr lang="en-US" smtClean="0"/>
-              <a:t>4/22/21</a:t>
+              <a:t>6/22/21</a:t>
             </a:fld>
             <a:endParaRPr lang="en-US"/>
           </a:p>
@@ -1199,7 +1199,7 @@
           <a:p>
             <a:fld id="{B5B0AC65-3CE8-4749-B0D7-AFCFDEE36239}" type="datetimeFigureOut">
               <a:rPr lang="en-US" smtClean="0"/>
-              <a:t>4/22/21</a:t>
+              <a:t>6/22/21</a:t>
             </a:fld>
             <a:endParaRPr lang="en-US"/>
           </a:p>
@@ -1445,7 +1445,7 @@
           <a:p>
             <a:fld id="{B5B0AC65-3CE8-4749-B0D7-AFCFDEE36239}" type="datetimeFigureOut">
               <a:rPr lang="en-US" smtClean="0"/>
-              <a:t>4/22/21</a:t>
+              <a:t>6/22/21</a:t>
             </a:fld>
             <a:endParaRPr lang="en-US"/>
           </a:p>
@@ -1677,7 +1677,7 @@
           <a:p>
             <a:fld id="{B5B0AC65-3CE8-4749-B0D7-AFCFDEE36239}" type="datetimeFigureOut">
               <a:rPr lang="en-US" smtClean="0"/>
-              <a:t>4/22/21</a:t>
+              <a:t>6/22/21</a:t>
             </a:fld>
             <a:endParaRPr lang="en-US"/>
           </a:p>
@@ -2044,7 +2044,7 @@
           <a:p>
             <a:fld id="{B5B0AC65-3CE8-4749-B0D7-AFCFDEE36239}" type="datetimeFigureOut">
               <a:rPr lang="en-US" smtClean="0"/>
-              <a:t>4/22/21</a:t>
+              <a:t>6/22/21</a:t>
             </a:fld>
             <a:endParaRPr lang="en-US"/>
           </a:p>
@@ -2162,7 +2162,7 @@
           <a:p>
             <a:fld id="{B5B0AC65-3CE8-4749-B0D7-AFCFDEE36239}" type="datetimeFigureOut">
               <a:rPr lang="en-US" smtClean="0"/>
-              <a:t>4/22/21</a:t>
+              <a:t>6/22/21</a:t>
             </a:fld>
             <a:endParaRPr lang="en-US"/>
           </a:p>
@@ -2257,7 +2257,7 @@
           <a:p>
             <a:fld id="{B5B0AC65-3CE8-4749-B0D7-AFCFDEE36239}" type="datetimeFigureOut">
               <a:rPr lang="en-US" smtClean="0"/>
-              <a:t>4/22/21</a:t>
+              <a:t>6/22/21</a:t>
             </a:fld>
             <a:endParaRPr lang="en-US"/>
           </a:p>
@@ -2534,7 +2534,7 @@
           <a:p>
             <a:fld id="{B5B0AC65-3CE8-4749-B0D7-AFCFDEE36239}" type="datetimeFigureOut">
               <a:rPr lang="en-US" smtClean="0"/>
-              <a:t>4/22/21</a:t>
+              <a:t>6/22/21</a:t>
             </a:fld>
             <a:endParaRPr lang="en-US"/>
           </a:p>
@@ -2791,7 +2791,7 @@
           <a:p>
             <a:fld id="{B5B0AC65-3CE8-4749-B0D7-AFCFDEE36239}" type="datetimeFigureOut">
               <a:rPr lang="en-US" smtClean="0"/>
-              <a:t>4/22/21</a:t>
+              <a:t>6/22/21</a:t>
             </a:fld>
             <a:endParaRPr lang="en-US"/>
           </a:p>
@@ -3004,7 +3004,7 @@
           <a:p>
             <a:fld id="{B5B0AC65-3CE8-4749-B0D7-AFCFDEE36239}" type="datetimeFigureOut">
               <a:rPr lang="en-US" smtClean="0"/>
-              <a:t>4/22/21</a:t>
+              <a:t>6/22/21</a:t>
             </a:fld>
             <a:endParaRPr lang="en-US"/>
           </a:p>
@@ -3644,7 +3644,7 @@
           <a:solidFill>
             <a:schemeClr val="bg1"/>
           </a:solidFill>
-          <a:ln>
+          <a:ln w="38100">
             <a:solidFill>
               <a:schemeClr val="tx1"/>
             </a:solidFill>
@@ -4226,7 +4226,7 @@
           <a:solidFill>
             <a:schemeClr val="bg1"/>
           </a:solidFill>
-          <a:ln>
+          <a:ln w="38100">
             <a:solidFill>
               <a:schemeClr val="tx1"/>
             </a:solidFill>
@@ -4802,7 +4802,7 @@
           <a:solidFill>
             <a:schemeClr val="bg1"/>
           </a:solidFill>
-          <a:ln>
+          <a:ln w="38100">
             <a:solidFill>
               <a:schemeClr val="tx1"/>
             </a:solidFill>
@@ -5378,7 +5378,7 @@
           <a:solidFill>
             <a:schemeClr val="bg1"/>
           </a:solidFill>
-          <a:ln>
+          <a:ln w="38100">
             <a:solidFill>
               <a:schemeClr val="tx1"/>
             </a:solidFill>
@@ -5954,7 +5954,7 @@
           <a:solidFill>
             <a:schemeClr val="bg1"/>
           </a:solidFill>
-          <a:ln>
+          <a:ln w="38100">
             <a:solidFill>
               <a:schemeClr val="tx1"/>
             </a:solidFill>
@@ -6595,7 +6595,7 @@
           <a:solidFill>
             <a:schemeClr val="bg1"/>
           </a:solidFill>
-          <a:ln>
+          <a:ln w="38100">
             <a:solidFill>
               <a:schemeClr val="tx1"/>
             </a:solidFill>
@@ -6630,58 +6630,6 @@
       </p:sp>
       <p:sp>
         <p:nvSpPr>
-          <p:cNvPr id="203" name="Oval 202">
-            <a:extLst>
-              <a:ext uri="{FF2B5EF4-FFF2-40B4-BE49-F238E27FC236}">
-                <a16:creationId xmlns:a16="http://schemas.microsoft.com/office/drawing/2014/main" id="{8F65404E-AFCA-684E-9967-A6D89CBC56D1}"/>
-              </a:ext>
-            </a:extLst>
-          </p:cNvPr>
-          <p:cNvSpPr/>
-          <p:nvPr/>
-        </p:nvSpPr>
-        <p:spPr>
-          <a:xfrm rot="2562045">
-            <a:off x="4234215" y="152769"/>
-            <a:ext cx="79505" cy="162622"/>
-          </a:xfrm>
-          <a:prstGeom prst="ellipse">
-            <a:avLst/>
-          </a:prstGeom>
-          <a:solidFill>
-            <a:srgbClr val="E67E38"/>
-          </a:solidFill>
-          <a:ln>
-            <a:noFill/>
-          </a:ln>
-        </p:spPr>
-        <p:style>
-          <a:lnRef idx="2">
-            <a:schemeClr val="accent1">
-              <a:shade val="50000"/>
-            </a:schemeClr>
-          </a:lnRef>
-          <a:fillRef idx="1">
-            <a:schemeClr val="accent1"/>
-          </a:fillRef>
-          <a:effectRef idx="0">
-            <a:schemeClr val="accent1"/>
-          </a:effectRef>
-          <a:fontRef idx="minor">
-            <a:schemeClr val="lt1"/>
-          </a:fontRef>
-        </p:style>
-        <p:txBody>
-          <a:bodyPr rtlCol="0" anchor="ctr"/>
-          <a:lstStyle/>
-          <a:p>
-            <a:pPr algn="ctr"/>
-            <a:endParaRPr lang="en-US"/>
-          </a:p>
-        </p:txBody>
-      </p:sp>
-      <p:sp>
-        <p:nvSpPr>
           <p:cNvPr id="204" name="Rectangle 203">
             <a:extLst>
               <a:ext uri="{FF2B5EF4-FFF2-40B4-BE49-F238E27FC236}">
@@ -6703,7 +6651,7 @@
           <a:solidFill>
             <a:schemeClr val="bg1"/>
           </a:solidFill>
-          <a:ln>
+          <a:ln w="38100">
             <a:solidFill>
               <a:schemeClr val="tx1"/>
             </a:solidFill>
@@ -6759,7 +6707,7 @@
           <a:solidFill>
             <a:schemeClr val="bg1"/>
           </a:solidFill>
-          <a:ln>
+          <a:ln w="38100">
             <a:solidFill>
               <a:schemeClr val="tx1"/>
             </a:solidFill>
@@ -6815,7 +6763,7 @@
           <a:solidFill>
             <a:schemeClr val="bg1"/>
           </a:solidFill>
-          <a:ln>
+          <a:ln w="38100">
             <a:solidFill>
               <a:schemeClr val="tx1"/>
             </a:solidFill>
@@ -7512,7 +7460,7 @@
           <a:solidFill>
             <a:schemeClr val="bg1"/>
           </a:solidFill>
-          <a:ln>
+          <a:ln w="38100">
             <a:solidFill>
               <a:srgbClr val="C00000"/>
             </a:solidFill>
@@ -7547,58 +7495,6 @@
       </p:sp>
       <p:sp>
         <p:nvSpPr>
-          <p:cNvPr id="83" name="Oval 82">
-            <a:extLst>
-              <a:ext uri="{FF2B5EF4-FFF2-40B4-BE49-F238E27FC236}">
-                <a16:creationId xmlns:a16="http://schemas.microsoft.com/office/drawing/2014/main" id="{80FB36F6-BA30-2F49-949B-E2CCE7D82D27}"/>
-              </a:ext>
-            </a:extLst>
-          </p:cNvPr>
-          <p:cNvSpPr/>
-          <p:nvPr/>
-        </p:nvSpPr>
-        <p:spPr>
-          <a:xfrm rot="2562045">
-            <a:off x="4235150" y="563218"/>
-            <a:ext cx="79505" cy="162622"/>
-          </a:xfrm>
-          <a:prstGeom prst="ellipse">
-            <a:avLst/>
-          </a:prstGeom>
-          <a:solidFill>
-            <a:srgbClr val="E67E38"/>
-          </a:solidFill>
-          <a:ln>
-            <a:noFill/>
-          </a:ln>
-        </p:spPr>
-        <p:style>
-          <a:lnRef idx="2">
-            <a:schemeClr val="accent1">
-              <a:shade val="50000"/>
-            </a:schemeClr>
-          </a:lnRef>
-          <a:fillRef idx="1">
-            <a:schemeClr val="accent1"/>
-          </a:fillRef>
-          <a:effectRef idx="0">
-            <a:schemeClr val="accent1"/>
-          </a:effectRef>
-          <a:fontRef idx="minor">
-            <a:schemeClr val="lt1"/>
-          </a:fontRef>
-        </p:style>
-        <p:txBody>
-          <a:bodyPr rtlCol="0" anchor="ctr"/>
-          <a:lstStyle/>
-          <a:p>
-            <a:pPr algn="ctr"/>
-            <a:endParaRPr lang="en-US"/>
-          </a:p>
-        </p:txBody>
-      </p:sp>
-      <p:sp>
-        <p:nvSpPr>
           <p:cNvPr id="84" name="Rectangle 83">
             <a:extLst>
               <a:ext uri="{FF2B5EF4-FFF2-40B4-BE49-F238E27FC236}">
@@ -7620,7 +7516,7 @@
           <a:solidFill>
             <a:schemeClr val="bg1"/>
           </a:solidFill>
-          <a:ln>
+          <a:ln w="38100">
             <a:solidFill>
               <a:srgbClr val="C00000"/>
             </a:solidFill>
@@ -7676,7 +7572,7 @@
           <a:solidFill>
             <a:schemeClr val="bg1"/>
           </a:solidFill>
-          <a:ln>
+          <a:ln w="38100">
             <a:solidFill>
               <a:srgbClr val="C00000"/>
             </a:solidFill>
@@ -7732,7 +7628,7 @@
           <a:solidFill>
             <a:schemeClr val="bg1"/>
           </a:solidFill>
-          <a:ln>
+          <a:ln w="38100">
             <a:solidFill>
               <a:srgbClr val="C00000"/>
             </a:solidFill>
@@ -8360,7 +8256,7 @@
           <a:solidFill>
             <a:schemeClr val="bg1"/>
           </a:solidFill>
-          <a:ln>
+          <a:ln w="38100">
             <a:solidFill>
               <a:srgbClr val="C00000"/>
             </a:solidFill>
@@ -8942,7 +8838,7 @@
           <a:solidFill>
             <a:schemeClr val="bg1"/>
           </a:solidFill>
-          <a:ln>
+          <a:ln w="38100">
             <a:solidFill>
               <a:srgbClr val="C00000"/>
             </a:solidFill>
@@ -9518,7 +9414,7 @@
           <a:solidFill>
             <a:schemeClr val="bg1"/>
           </a:solidFill>
-          <a:ln>
+          <a:ln w="38100">
             <a:solidFill>
               <a:srgbClr val="C00000"/>
             </a:solidFill>
@@ -10094,7 +9990,7 @@
           <a:solidFill>
             <a:schemeClr val="bg1"/>
           </a:solidFill>
-          <a:ln>
+          <a:ln w="38100">
             <a:solidFill>
               <a:srgbClr val="C00000"/>
             </a:solidFill>
@@ -10670,7 +10566,7 @@
           <a:solidFill>
             <a:schemeClr val="bg1"/>
           </a:solidFill>
-          <a:ln>
+          <a:ln w="38100">
             <a:solidFill>
               <a:srgbClr val="C00000"/>
             </a:solidFill>
@@ -11285,6 +11181,110 @@
               <a:rPr lang="en-US" sz="1200" dirty="0"/>
               <a:t>+6</a:t>
             </a:r>
+          </a:p>
+        </p:txBody>
+      </p:sp>
+      <p:sp>
+        <p:nvSpPr>
+          <p:cNvPr id="224" name="Oval 223">
+            <a:extLst>
+              <a:ext uri="{FF2B5EF4-FFF2-40B4-BE49-F238E27FC236}">
+                <a16:creationId xmlns:a16="http://schemas.microsoft.com/office/drawing/2014/main" id="{55B9901B-562D-3440-833A-89B456E4DDC5}"/>
+              </a:ext>
+            </a:extLst>
+          </p:cNvPr>
+          <p:cNvSpPr/>
+          <p:nvPr/>
+        </p:nvSpPr>
+        <p:spPr>
+          <a:xfrm rot="2562045">
+            <a:off x="4229662" y="598834"/>
+            <a:ext cx="79505" cy="162622"/>
+          </a:xfrm>
+          <a:prstGeom prst="ellipse">
+            <a:avLst/>
+          </a:prstGeom>
+          <a:solidFill>
+            <a:srgbClr val="7F7F7F"/>
+          </a:solidFill>
+          <a:ln>
+            <a:noFill/>
+          </a:ln>
+        </p:spPr>
+        <p:style>
+          <a:lnRef idx="2">
+            <a:schemeClr val="accent1">
+              <a:shade val="50000"/>
+            </a:schemeClr>
+          </a:lnRef>
+          <a:fillRef idx="1">
+            <a:schemeClr val="accent1"/>
+          </a:fillRef>
+          <a:effectRef idx="0">
+            <a:schemeClr val="accent1"/>
+          </a:effectRef>
+          <a:fontRef idx="minor">
+            <a:schemeClr val="lt1"/>
+          </a:fontRef>
+        </p:style>
+        <p:txBody>
+          <a:bodyPr rtlCol="0" anchor="ctr"/>
+          <a:lstStyle/>
+          <a:p>
+            <a:pPr algn="ctr"/>
+            <a:endParaRPr lang="en-US"/>
+          </a:p>
+        </p:txBody>
+      </p:sp>
+      <p:sp>
+        <p:nvSpPr>
+          <p:cNvPr id="225" name="Oval 224">
+            <a:extLst>
+              <a:ext uri="{FF2B5EF4-FFF2-40B4-BE49-F238E27FC236}">
+                <a16:creationId xmlns:a16="http://schemas.microsoft.com/office/drawing/2014/main" id="{99BA3EAA-3330-7146-A908-2E85707CC2A3}"/>
+              </a:ext>
+            </a:extLst>
+          </p:cNvPr>
+          <p:cNvSpPr/>
+          <p:nvPr/>
+        </p:nvSpPr>
+        <p:spPr>
+          <a:xfrm rot="2562045">
+            <a:off x="4236203" y="184639"/>
+            <a:ext cx="79505" cy="162622"/>
+          </a:xfrm>
+          <a:prstGeom prst="ellipse">
+            <a:avLst/>
+          </a:prstGeom>
+          <a:solidFill>
+            <a:srgbClr val="7F7F7F"/>
+          </a:solidFill>
+          <a:ln>
+            <a:noFill/>
+          </a:ln>
+        </p:spPr>
+        <p:style>
+          <a:lnRef idx="2">
+            <a:schemeClr val="accent1">
+              <a:shade val="50000"/>
+            </a:schemeClr>
+          </a:lnRef>
+          <a:fillRef idx="1">
+            <a:schemeClr val="accent1"/>
+          </a:fillRef>
+          <a:effectRef idx="0">
+            <a:schemeClr val="accent1"/>
+          </a:effectRef>
+          <a:fontRef idx="minor">
+            <a:schemeClr val="lt1"/>
+          </a:fontRef>
+        </p:style>
+        <p:txBody>
+          <a:bodyPr rtlCol="0" anchor="ctr"/>
+          <a:lstStyle/>
+          <a:p>
+            <a:pPr algn="ctr"/>
+            <a:endParaRPr lang="en-US"/>
           </a:p>
         </p:txBody>
       </p:sp>

</xml_diff>